<commit_message>
Changing presentation and 097
</commit_message>
<xml_diff>
--- a/makarow2.pptx
+++ b/makarow2.pptx
@@ -2,7 +2,7 @@
 <file path=ppt/presentation.xml><?xml version="1.0" encoding="utf-8"?>
 <p:presentation xmlns:a="http://schemas.openxmlformats.org/drawingml/2006/main" xmlns:r="http://schemas.openxmlformats.org/officeDocument/2006/relationships" xmlns:p="http://schemas.openxmlformats.org/presentationml/2006/main" saveSubsetFonts="1">
   <p:sldMasterIdLst>
-    <p:sldMasterId id="2147483660" r:id="rId1"/>
+    <p:sldMasterId id="2147483672" r:id="rId1"/>
   </p:sldMasterIdLst>
   <p:sldIdLst>
     <p:sldId id="256" r:id="rId2"/>
@@ -109,8 +109,13 @@
 </file>
 
 <file path=ppt/slideLayouts/slideLayout1.xml><?xml version="1.0" encoding="utf-8"?>
-<p:sldLayout xmlns:a="http://schemas.openxmlformats.org/drawingml/2006/main" xmlns:r="http://schemas.openxmlformats.org/officeDocument/2006/relationships" xmlns:p="http://schemas.openxmlformats.org/presentationml/2006/main" type="title" preserve="1">
+<p:sldLayout xmlns:a="http://schemas.openxmlformats.org/drawingml/2006/main" xmlns:r="http://schemas.openxmlformats.org/officeDocument/2006/relationships" xmlns:p="http://schemas.openxmlformats.org/presentationml/2006/main" showMasterSp="0" type="title" preserve="1">
   <p:cSld name="Титульный слайд">
+    <p:bg>
+      <p:bgRef idx="1002">
+        <a:schemeClr val="bg2"/>
+      </p:bgRef>
+    </p:bg>
     <p:spTree>
       <p:nvGrpSpPr>
         <p:cNvPr id="1" name=""/>
@@ -127,7 +132,54 @@
       </p:grpSpPr>
       <p:sp>
         <p:nvSpPr>
-          <p:cNvPr id="8" name="Заголовок 7"/>
+          <p:cNvPr id="9" name="Прямоугольник 8"/>
+          <p:cNvSpPr/>
+          <p:nvPr/>
+        </p:nvSpPr>
+        <p:spPr bwMode="ltGray">
+          <a:xfrm>
+            <a:off x="0" y="0"/>
+            <a:ext cx="9143999" cy="5135430"/>
+          </a:xfrm>
+          <a:prstGeom prst="rect">
+            <a:avLst/>
+          </a:prstGeom>
+          <a:solidFill>
+            <a:srgbClr val="000000"/>
+          </a:solidFill>
+          <a:ln w="48000" cap="flat" cmpd="thickThin" algn="ctr">
+            <a:noFill/>
+            <a:prstDash val="solid"/>
+          </a:ln>
+        </p:spPr>
+        <p:style>
+          <a:lnRef idx="2">
+            <a:schemeClr val="accent1"/>
+          </a:lnRef>
+          <a:fillRef idx="1">
+            <a:schemeClr val="accent1"/>
+          </a:fillRef>
+          <a:effectRef idx="0">
+            <a:schemeClr val="accent1"/>
+          </a:effectRef>
+          <a:fontRef idx="minor">
+            <a:schemeClr val="lt1"/>
+          </a:fontRef>
+        </p:style>
+        <p:txBody>
+          <a:bodyPr rtlCol="0" anchor="ctr"/>
+          <a:lstStyle>
+            <a:extLst/>
+          </a:lstStyle>
+          <a:p>
+            <a:pPr algn="ctr" eaLnBrk="1" latinLnBrk="0" hangingPunct="1"/>
+            <a:endParaRPr kumimoji="0" lang="en-US"/>
+          </a:p>
+        </p:txBody>
+      </p:sp>
+      <p:sp>
+        <p:nvSpPr>
+          <p:cNvPr id="2" name="Заголовок 1"/>
           <p:cNvSpPr>
             <a:spLocks noGrp="1"/>
           </p:cNvSpPr>
@@ -137,66 +189,151 @@
         </p:nvSpPr>
         <p:spPr>
           <a:xfrm>
-            <a:off x="422030" y="1371600"/>
-            <a:ext cx="8229600" cy="1828800"/>
+            <a:off x="685800" y="3355848"/>
+            <a:ext cx="8077200" cy="1673352"/>
           </a:xfrm>
         </p:spPr>
         <p:txBody>
-          <a:bodyPr vert="horz" lIns="45720" tIns="0" rIns="45720" bIns="0" anchor="b">
+          <a:bodyPr vert="horz" lIns="91440" tIns="0" rIns="45720" bIns="0" rtlCol="0" anchor="t">
             <a:normAutofit/>
             <a:scene3d>
               <a:camera prst="orthographicFront"/>
-              <a:lightRig rig="soft" dir="t">
-                <a:rot lat="0" lon="0" rev="17220000"/>
+              <a:lightRig rig="threePt" dir="t">
+                <a:rot lat="0" lon="0" rev="4800000"/>
               </a:lightRig>
             </a:scene3d>
-            <a:sp3d prstMaterial="softEdge">
-              <a:bevelT w="38100" h="38100"/>
+            <a:sp3d prstMaterial="matte">
+              <a:bevelT w="50800" h="10160"/>
             </a:sp3d>
           </a:bodyPr>
           <a:lstStyle>
-            <a:lvl1pPr>
-              <a:defRPr sz="4800" b="1" cap="all" baseline="0">
-                <a:ln w="6350">
-                  <a:noFill/>
-                </a:ln>
-                <a:gradFill>
-                  <a:gsLst>
-                    <a:gs pos="0">
-                      <a:schemeClr val="accent1">
-                        <a:tint val="73000"/>
-                        <a:satMod val="145000"/>
-                      </a:schemeClr>
-                    </a:gs>
-                    <a:gs pos="73000">
-                      <a:schemeClr val="accent1">
-                        <a:tint val="73000"/>
-                        <a:satMod val="145000"/>
-                      </a:schemeClr>
-                    </a:gs>
-                    <a:gs pos="100000">
-                      <a:schemeClr val="accent1">
-                        <a:tint val="83000"/>
-                        <a:satMod val="143000"/>
-                      </a:schemeClr>
-                    </a:gs>
-                  </a:gsLst>
-                  <a:lin ang="4800000" scaled="1"/>
-                </a:gradFill>
-                <a:effectLst>
-                  <a:outerShdw blurRad="127000" dist="200000" dir="2700000" algn="tl" rotWithShape="0">
-                    <a:srgbClr val="000000">
-                      <a:alpha val="30000"/>
-                    </a:srgbClr>
-                  </a:outerShdw>
-                </a:effectLst>
+            <a:lvl1pPr algn="l">
+              <a:defRPr sz="4700" b="1"/>
+            </a:lvl1pPr>
+            <a:extLst/>
+          </a:lstStyle>
+          <a:p>
+            <a:r>
+              <a:rPr kumimoji="0" lang="ru-RU" smtClean="0"/>
+              <a:t>Образец заголовка</a:t>
+            </a:r>
+            <a:endParaRPr kumimoji="0" lang="en-US"/>
+          </a:p>
+        </p:txBody>
+      </p:sp>
+      <p:sp>
+        <p:nvSpPr>
+          <p:cNvPr id="3" name="Подзаголовок 2"/>
+          <p:cNvSpPr>
+            <a:spLocks noGrp="1"/>
+          </p:cNvSpPr>
+          <p:nvPr>
+            <p:ph type="subTitle" idx="1"/>
+          </p:nvPr>
+        </p:nvSpPr>
+        <p:spPr>
+          <a:xfrm>
+            <a:off x="685800" y="1828800"/>
+            <a:ext cx="8077200" cy="1499616"/>
+          </a:xfrm>
+        </p:spPr>
+        <p:txBody>
+          <a:bodyPr lIns="118872" tIns="0" rIns="45720" bIns="0" anchor="b"/>
+          <a:lstStyle>
+            <a:lvl1pPr marL="0" indent="0" algn="l">
+              <a:buNone/>
+              <a:defRPr sz="2000">
+                <a:solidFill>
+                  <a:srgbClr val="FFFFFF"/>
+                </a:solidFill>
               </a:defRPr>
             </a:lvl1pPr>
+            <a:lvl2pPr marL="457200" indent="0" algn="ctr">
+              <a:buNone/>
+              <a:defRPr>
+                <a:solidFill>
+                  <a:schemeClr val="tx1">
+                    <a:tint val="75000"/>
+                  </a:schemeClr>
+                </a:solidFill>
+              </a:defRPr>
+            </a:lvl2pPr>
+            <a:lvl3pPr marL="914400" indent="0" algn="ctr">
+              <a:buNone/>
+              <a:defRPr>
+                <a:solidFill>
+                  <a:schemeClr val="tx1">
+                    <a:tint val="75000"/>
+                  </a:schemeClr>
+                </a:solidFill>
+              </a:defRPr>
+            </a:lvl3pPr>
+            <a:lvl4pPr marL="1371600" indent="0" algn="ctr">
+              <a:buNone/>
+              <a:defRPr>
+                <a:solidFill>
+                  <a:schemeClr val="tx1">
+                    <a:tint val="75000"/>
+                  </a:schemeClr>
+                </a:solidFill>
+              </a:defRPr>
+            </a:lvl4pPr>
+            <a:lvl5pPr marL="1828800" indent="0" algn="ctr">
+              <a:buNone/>
+              <a:defRPr>
+                <a:solidFill>
+                  <a:schemeClr val="tx1">
+                    <a:tint val="75000"/>
+                  </a:schemeClr>
+                </a:solidFill>
+              </a:defRPr>
+            </a:lvl5pPr>
+            <a:lvl6pPr marL="2286000" indent="0" algn="ctr">
+              <a:buNone/>
+              <a:defRPr>
+                <a:solidFill>
+                  <a:schemeClr val="tx1">
+                    <a:tint val="75000"/>
+                  </a:schemeClr>
+                </a:solidFill>
+              </a:defRPr>
+            </a:lvl6pPr>
+            <a:lvl7pPr marL="2743200" indent="0" algn="ctr">
+              <a:buNone/>
+              <a:defRPr>
+                <a:solidFill>
+                  <a:schemeClr val="tx1">
+                    <a:tint val="75000"/>
+                  </a:schemeClr>
+                </a:solidFill>
+              </a:defRPr>
+            </a:lvl7pPr>
+            <a:lvl8pPr marL="3200400" indent="0" algn="ctr">
+              <a:buNone/>
+              <a:defRPr>
+                <a:solidFill>
+                  <a:schemeClr val="tx1">
+                    <a:tint val="75000"/>
+                  </a:schemeClr>
+                </a:solidFill>
+              </a:defRPr>
+            </a:lvl8pPr>
+            <a:lvl9pPr marL="3657600" indent="0" algn="ctr">
+              <a:buNone/>
+              <a:defRPr>
+                <a:solidFill>
+                  <a:schemeClr val="tx1">
+                    <a:tint val="75000"/>
+                  </a:schemeClr>
+                </a:solidFill>
+              </a:defRPr>
+            </a:lvl9pPr>
+            <a:extLst/>
           </a:lstStyle>
           <a:p>
             <a:r>
               <a:rPr kumimoji="0" lang="ru-RU" smtClean="0"/>
-              <a:t>Образец заголовка</a:t>
+              <a:t>Образец подзаголовка</a:t>
             </a:r>
             <a:endParaRPr kumimoji="0" lang="en-US"/>
           </a:p>
@@ -204,7 +341,7 @@
       </p:sp>
       <p:sp>
         <p:nvSpPr>
-          <p:cNvPr id="28" name="Дата 27"/>
+          <p:cNvPr id="4" name="Дата 3"/>
           <p:cNvSpPr>
             <a:spLocks noGrp="1"/>
           </p:cNvSpPr>
@@ -228,7 +365,7 @@
       </p:sp>
       <p:sp>
         <p:nvSpPr>
-          <p:cNvPr id="17" name="Нижний колонтитул 16"/>
+          <p:cNvPr id="5" name="Нижний колонтитул 4"/>
           <p:cNvSpPr>
             <a:spLocks noGrp="1"/>
           </p:cNvSpPr>
@@ -247,7 +384,7 @@
       </p:sp>
       <p:sp>
         <p:nvSpPr>
-          <p:cNvPr id="29" name="Номер слайда 28"/>
+          <p:cNvPr id="6" name="Номер слайда 5"/>
           <p:cNvSpPr>
             <a:spLocks noGrp="1"/>
           </p:cNvSpPr>
@@ -271,61 +408,54 @@
       </p:sp>
       <p:sp>
         <p:nvSpPr>
-          <p:cNvPr id="9" name="Подзаголовок 8"/>
-          <p:cNvSpPr>
-            <a:spLocks noGrp="1"/>
-          </p:cNvSpPr>
-          <p:nvPr>
-            <p:ph type="subTitle" idx="1"/>
-          </p:nvPr>
-        </p:nvSpPr>
-        <p:spPr>
+          <p:cNvPr id="10" name="Прямоугольник 9"/>
+          <p:cNvSpPr/>
+          <p:nvPr/>
+        </p:nvSpPr>
+        <p:spPr bwMode="invGray">
           <a:xfrm>
-            <a:off x="1371600" y="3331698"/>
-            <a:ext cx="6400800" cy="1752600"/>
+            <a:off x="0" y="5128334"/>
+            <a:ext cx="9144000" cy="45720"/>
           </a:xfrm>
+          <a:prstGeom prst="rect">
+            <a:avLst/>
+          </a:prstGeom>
+          <a:solidFill>
+            <a:srgbClr val="FFFFFF"/>
+          </a:solidFill>
+          <a:ln w="48000" cap="flat" cmpd="thickThin" algn="ctr">
+            <a:noFill/>
+            <a:prstDash val="solid"/>
+          </a:ln>
+          <a:effectLst>
+            <a:outerShdw blurRad="31750" dist="10160" dir="5400000" algn="tl" rotWithShape="0">
+              <a:srgbClr val="000000">
+                <a:alpha val="60000"/>
+              </a:srgbClr>
+            </a:outerShdw>
+          </a:effectLst>
         </p:spPr>
-        <p:txBody>
-          <a:bodyPr/>
+        <p:style>
+          <a:lnRef idx="2">
+            <a:schemeClr val="accent1"/>
+          </a:lnRef>
+          <a:fillRef idx="1">
+            <a:schemeClr val="accent1"/>
+          </a:fillRef>
+          <a:effectRef idx="0">
+            <a:schemeClr val="accent1"/>
+          </a:effectRef>
+          <a:fontRef idx="minor">
+            <a:schemeClr val="lt1"/>
+          </a:fontRef>
+        </p:style>
+        <p:txBody>
+          <a:bodyPr rtlCol="0" anchor="ctr"/>
           <a:lstStyle>
-            <a:lvl1pPr marL="0" indent="0" algn="ctr">
-              <a:buNone/>
-              <a:defRPr>
-                <a:solidFill>
-                  <a:schemeClr val="tx1"/>
-                </a:solidFill>
-              </a:defRPr>
-            </a:lvl1pPr>
-            <a:lvl2pPr marL="457200" indent="0" algn="ctr">
-              <a:buNone/>
-            </a:lvl2pPr>
-            <a:lvl3pPr marL="914400" indent="0" algn="ctr">
-              <a:buNone/>
-            </a:lvl3pPr>
-            <a:lvl4pPr marL="1371600" indent="0" algn="ctr">
-              <a:buNone/>
-            </a:lvl4pPr>
-            <a:lvl5pPr marL="1828800" indent="0" algn="ctr">
-              <a:buNone/>
-            </a:lvl5pPr>
-            <a:lvl6pPr marL="2286000" indent="0" algn="ctr">
-              <a:buNone/>
-            </a:lvl6pPr>
-            <a:lvl7pPr marL="2743200" indent="0" algn="ctr">
-              <a:buNone/>
-            </a:lvl7pPr>
-            <a:lvl8pPr marL="3200400" indent="0" algn="ctr">
-              <a:buNone/>
-            </a:lvl8pPr>
-            <a:lvl9pPr marL="3657600" indent="0" algn="ctr">
-              <a:buNone/>
-            </a:lvl9pPr>
+            <a:extLst/>
           </a:lstStyle>
           <a:p>
-            <a:r>
-              <a:rPr kumimoji="0" lang="ru-RU" smtClean="0"/>
-              <a:t>Образец подзаголовка</a:t>
-            </a:r>
+            <a:pPr algn="ctr" eaLnBrk="1" latinLnBrk="0" hangingPunct="1"/>
             <a:endParaRPr kumimoji="0" lang="en-US"/>
           </a:p>
         </p:txBody>
@@ -333,7 +463,7 @@
     </p:spTree>
   </p:cSld>
   <p:clrMapOvr>
-    <a:masterClrMapping/>
+    <a:overrideClrMapping bg1="dk1" tx1="lt1" bg2="dk2" tx2="lt2" accent1="accent1" accent2="accent2" accent3="accent3" accent4="accent4" accent5="accent5" accent6="accent6" hlink="hlink" folHlink="folHlink"/>
   </p:clrMapOvr>
 </p:sldLayout>
 </file>
@@ -368,7 +498,9 @@
         <p:spPr/>
         <p:txBody>
           <a:bodyPr/>
-          <a:lstStyle/>
+          <a:lstStyle>
+            <a:extLst/>
+          </a:lstStyle>
           <a:p>
             <a:r>
               <a:rPr kumimoji="0" lang="ru-RU" smtClean="0"/>
@@ -391,7 +523,9 @@
         <p:spPr/>
         <p:txBody>
           <a:bodyPr vert="eaVert"/>
-          <a:lstStyle/>
+          <a:lstStyle>
+            <a:extLst/>
+          </a:lstStyle>
           <a:p>
             <a:pPr lvl="0" eaLnBrk="1" latinLnBrk="0" hangingPunct="1"/>
             <a:r>
@@ -506,7 +640,7 @@
 </file>
 
 <file path=ppt/slideLayouts/slideLayout11.xml><?xml version="1.0" encoding="utf-8"?>
-<p:sldLayout xmlns:a="http://schemas.openxmlformats.org/drawingml/2006/main" xmlns:r="http://schemas.openxmlformats.org/officeDocument/2006/relationships" xmlns:p="http://schemas.openxmlformats.org/presentationml/2006/main" type="vertTitleAndTx" preserve="1">
+<p:sldLayout xmlns:a="http://schemas.openxmlformats.org/drawingml/2006/main" xmlns:r="http://schemas.openxmlformats.org/officeDocument/2006/relationships" xmlns:p="http://schemas.openxmlformats.org/presentationml/2006/main" showMasterSp="0" type="vertTitleAndTx" preserve="1">
   <p:cSld name="Вертикальный заголовок и текст">
     <p:spTree>
       <p:nvGrpSpPr>
@@ -524,6 +658,107 @@
       </p:grpSpPr>
       <p:sp>
         <p:nvSpPr>
+          <p:cNvPr id="9" name="Прямоугольник 8"/>
+          <p:cNvSpPr/>
+          <p:nvPr/>
+        </p:nvSpPr>
+        <p:spPr bwMode="invGray">
+          <a:xfrm>
+            <a:off x="6598920" y="0"/>
+            <a:ext cx="45720" cy="6858000"/>
+          </a:xfrm>
+          <a:prstGeom prst="rect">
+            <a:avLst/>
+          </a:prstGeom>
+          <a:solidFill>
+            <a:srgbClr val="FFFFFF"/>
+          </a:solidFill>
+          <a:ln w="48000" cap="flat" cmpd="thickThin" algn="ctr">
+            <a:noFill/>
+            <a:prstDash val="solid"/>
+          </a:ln>
+          <a:effectLst>
+            <a:outerShdw blurRad="31750" dist="10160" dir="10800000" algn="tl" rotWithShape="0">
+              <a:srgbClr val="000000">
+                <a:alpha val="60000"/>
+              </a:srgbClr>
+            </a:outerShdw>
+          </a:effectLst>
+        </p:spPr>
+        <p:style>
+          <a:lnRef idx="2">
+            <a:schemeClr val="accent1"/>
+          </a:lnRef>
+          <a:fillRef idx="1">
+            <a:schemeClr val="accent1"/>
+          </a:fillRef>
+          <a:effectRef idx="0">
+            <a:schemeClr val="accent1"/>
+          </a:effectRef>
+          <a:fontRef idx="minor">
+            <a:schemeClr val="lt1"/>
+          </a:fontRef>
+        </p:style>
+        <p:txBody>
+          <a:bodyPr rtlCol="0" anchor="ctr"/>
+          <a:lstStyle>
+            <a:extLst/>
+          </a:lstStyle>
+          <a:p>
+            <a:pPr algn="ctr" eaLnBrk="1" latinLnBrk="0" hangingPunct="1"/>
+            <a:endParaRPr kumimoji="0" lang="en-US"/>
+          </a:p>
+        </p:txBody>
+      </p:sp>
+      <p:sp>
+        <p:nvSpPr>
+          <p:cNvPr id="8" name="Прямоугольник 7"/>
+          <p:cNvSpPr/>
+          <p:nvPr/>
+        </p:nvSpPr>
+        <p:spPr bwMode="ltGray">
+          <a:xfrm>
+            <a:off x="6647687" y="0"/>
+            <a:ext cx="2514601" cy="6858000"/>
+          </a:xfrm>
+          <a:prstGeom prst="rect">
+            <a:avLst/>
+          </a:prstGeom>
+          <a:solidFill>
+            <a:srgbClr val="000000"/>
+          </a:solidFill>
+          <a:ln w="48000" cap="flat" cmpd="thickThin" algn="ctr">
+            <a:noFill/>
+            <a:prstDash val="solid"/>
+          </a:ln>
+        </p:spPr>
+        <p:style>
+          <a:lnRef idx="2">
+            <a:schemeClr val="accent1"/>
+          </a:lnRef>
+          <a:fillRef idx="1">
+            <a:schemeClr val="accent1"/>
+          </a:fillRef>
+          <a:effectRef idx="0">
+            <a:schemeClr val="accent1"/>
+          </a:effectRef>
+          <a:fontRef idx="minor">
+            <a:schemeClr val="lt1"/>
+          </a:fontRef>
+        </p:style>
+        <p:txBody>
+          <a:bodyPr rtlCol="0" anchor="ctr"/>
+          <a:lstStyle>
+            <a:extLst/>
+          </a:lstStyle>
+          <a:p>
+            <a:pPr algn="ctr" eaLnBrk="1" latinLnBrk="0" hangingPunct="1"/>
+            <a:endParaRPr kumimoji="0" lang="en-US"/>
+          </a:p>
+        </p:txBody>
+      </p:sp>
+      <p:sp>
+        <p:nvSpPr>
           <p:cNvPr id="2" name="Вертикальный заголовок 1"/>
           <p:cNvSpPr>
             <a:spLocks noGrp="1"/>
@@ -534,13 +769,15 @@
         </p:nvSpPr>
         <p:spPr>
           <a:xfrm>
-            <a:off x="6629400" y="274638"/>
-            <a:ext cx="2057400" cy="5851525"/>
+            <a:off x="6781800" y="274640"/>
+            <a:ext cx="1905000" cy="5851525"/>
           </a:xfrm>
         </p:spPr>
         <p:txBody>
           <a:bodyPr vert="eaVert"/>
-          <a:lstStyle/>
+          <a:lstStyle>
+            <a:extLst/>
+          </a:lstStyle>
           <a:p>
             <a:r>
               <a:rPr kumimoji="0" lang="ru-RU" smtClean="0"/>
@@ -562,13 +799,15 @@
         </p:nvSpPr>
         <p:spPr>
           <a:xfrm>
-            <a:off x="457200" y="274638"/>
+            <a:off x="457200" y="304800"/>
             <a:ext cx="6019800" cy="5851525"/>
           </a:xfrm>
         </p:spPr>
         <p:txBody>
           <a:bodyPr vert="eaVert"/>
-          <a:lstStyle/>
+          <a:lstStyle>
+            <a:extLst/>
+          </a:lstStyle>
           <a:p>
             <a:pPr lvl="0" eaLnBrk="1" latinLnBrk="0" hangingPunct="1"/>
             <a:r>
@@ -641,7 +880,12 @@
             <p:ph type="ftr" sz="quarter" idx="11"/>
           </p:nvPr>
         </p:nvSpPr>
-        <p:spPr/>
+        <p:spPr>
+          <a:xfrm>
+            <a:off x="2640597" y="6377459"/>
+            <a:ext cx="3836404" cy="365125"/>
+          </a:xfrm>
+        </p:spPr>
         <p:txBody>
           <a:bodyPr/>
           <a:lstStyle/>
@@ -709,10 +953,17 @@
             <p:ph type="title"/>
           </p:nvPr>
         </p:nvSpPr>
-        <p:spPr/>
-        <p:txBody>
-          <a:bodyPr/>
-          <a:lstStyle/>
+        <p:spPr>
+          <a:xfrm>
+            <a:off x="457200" y="155448"/>
+            <a:ext cx="8229600" cy="1252728"/>
+          </a:xfrm>
+        </p:spPr>
+        <p:txBody>
+          <a:bodyPr/>
+          <a:lstStyle>
+            <a:extLst/>
+          </a:lstStyle>
           <a:p>
             <a:r>
               <a:rPr kumimoji="0" lang="ru-RU" smtClean="0"/>
@@ -735,7 +986,9 @@
         <p:spPr/>
         <p:txBody>
           <a:bodyPr/>
-          <a:lstStyle/>
+          <a:lstStyle>
+            <a:extLst/>
+          </a:lstStyle>
           <a:p>
             <a:pPr lvl="0" eaLnBrk="1" latinLnBrk="0" hangingPunct="1"/>
             <a:r>
@@ -850,10 +1103,10 @@
 </file>
 
 <file path=ppt/slideLayouts/slideLayout3.xml><?xml version="1.0" encoding="utf-8"?>
-<p:sldLayout xmlns:a="http://schemas.openxmlformats.org/drawingml/2006/main" xmlns:r="http://schemas.openxmlformats.org/officeDocument/2006/relationships" xmlns:p="http://schemas.openxmlformats.org/presentationml/2006/main" type="secHead" preserve="1">
+<p:sldLayout xmlns:a="http://schemas.openxmlformats.org/drawingml/2006/main" xmlns:r="http://schemas.openxmlformats.org/officeDocument/2006/relationships" xmlns:p="http://schemas.openxmlformats.org/presentationml/2006/main" showMasterSp="0" type="secHead" preserve="1">
   <p:cSld name="Заголовок раздела">
     <p:bg>
-      <p:bgRef idx="1003">
+      <p:bgRef idx="1002">
         <a:schemeClr val="bg2"/>
       </p:bgRef>
     </p:bg>
@@ -873,6 +1126,107 @@
       </p:grpSpPr>
       <p:sp>
         <p:nvSpPr>
+          <p:cNvPr id="9" name="Прямоугольник 8"/>
+          <p:cNvSpPr/>
+          <p:nvPr/>
+        </p:nvSpPr>
+        <p:spPr bwMode="ltGray">
+          <a:xfrm>
+            <a:off x="0" y="1"/>
+            <a:ext cx="9144000" cy="2602520"/>
+          </a:xfrm>
+          <a:prstGeom prst="rect">
+            <a:avLst/>
+          </a:prstGeom>
+          <a:solidFill>
+            <a:srgbClr val="000000"/>
+          </a:solidFill>
+          <a:ln w="48000" cap="flat" cmpd="thickThin" algn="ctr">
+            <a:noFill/>
+            <a:prstDash val="solid"/>
+          </a:ln>
+        </p:spPr>
+        <p:style>
+          <a:lnRef idx="2">
+            <a:schemeClr val="accent1"/>
+          </a:lnRef>
+          <a:fillRef idx="1">
+            <a:schemeClr val="accent1"/>
+          </a:fillRef>
+          <a:effectRef idx="0">
+            <a:schemeClr val="accent1"/>
+          </a:effectRef>
+          <a:fontRef idx="minor">
+            <a:schemeClr val="lt1"/>
+          </a:fontRef>
+        </p:style>
+        <p:txBody>
+          <a:bodyPr rtlCol="0" anchor="ctr"/>
+          <a:lstStyle>
+            <a:extLst/>
+          </a:lstStyle>
+          <a:p>
+            <a:pPr algn="ctr" eaLnBrk="1" latinLnBrk="0" hangingPunct="1"/>
+            <a:endParaRPr kumimoji="0" lang="en-US"/>
+          </a:p>
+        </p:txBody>
+      </p:sp>
+      <p:sp>
+        <p:nvSpPr>
+          <p:cNvPr id="12" name="Прямоугольник 11"/>
+          <p:cNvSpPr/>
+          <p:nvPr/>
+        </p:nvSpPr>
+        <p:spPr bwMode="invGray">
+          <a:xfrm>
+            <a:off x="0" y="2602520"/>
+            <a:ext cx="9144000" cy="45720"/>
+          </a:xfrm>
+          <a:prstGeom prst="rect">
+            <a:avLst/>
+          </a:prstGeom>
+          <a:solidFill>
+            <a:srgbClr val="FFFFFF"/>
+          </a:solidFill>
+          <a:ln w="48000" cap="flat" cmpd="thickThin" algn="ctr">
+            <a:noFill/>
+            <a:prstDash val="solid"/>
+          </a:ln>
+          <a:effectLst>
+            <a:outerShdw blurRad="31750" dist="10160" dir="5400000" algn="tl" rotWithShape="0">
+              <a:srgbClr val="000000">
+                <a:alpha val="60000"/>
+              </a:srgbClr>
+            </a:outerShdw>
+          </a:effectLst>
+        </p:spPr>
+        <p:style>
+          <a:lnRef idx="2">
+            <a:schemeClr val="accent1"/>
+          </a:lnRef>
+          <a:fillRef idx="1">
+            <a:schemeClr val="accent1"/>
+          </a:fillRef>
+          <a:effectRef idx="0">
+            <a:schemeClr val="accent1"/>
+          </a:effectRef>
+          <a:fontRef idx="minor">
+            <a:schemeClr val="lt1"/>
+          </a:fontRef>
+        </p:style>
+        <p:txBody>
+          <a:bodyPr rtlCol="0" anchor="ctr"/>
+          <a:lstStyle>
+            <a:extLst/>
+          </a:lstStyle>
+          <a:p>
+            <a:pPr algn="ctr" eaLnBrk="1" latinLnBrk="0" hangingPunct="1"/>
+            <a:endParaRPr kumimoji="0" lang="en-US"/>
+          </a:p>
+        </p:txBody>
+      </p:sp>
+      <p:sp>
+        <p:nvSpPr>
           <p:cNvPr id="2" name="Заголовок 1"/>
           <p:cNvSpPr>
             <a:spLocks noGrp="1"/>
@@ -883,56 +1237,28 @@
         </p:nvSpPr>
         <p:spPr>
           <a:xfrm>
-            <a:off x="1600200" y="609600"/>
-            <a:ext cx="7086600" cy="1828800"/>
+            <a:off x="749808" y="118872"/>
+            <a:ext cx="8013192" cy="1636776"/>
           </a:xfrm>
         </p:spPr>
         <p:txBody>
-          <a:bodyPr vert="horz" bIns="0" anchor="b">
-            <a:noAutofit/>
+          <a:bodyPr vert="horz" lIns="91440" tIns="0" rIns="91440" bIns="0" rtlCol="0" anchor="b">
+            <a:normAutofit/>
             <a:scene3d>
               <a:camera prst="orthographicFront"/>
-              <a:lightRig rig="soft" dir="t">
-                <a:rot lat="0" lon="0" rev="17220000"/>
+              <a:lightRig rig="threePt" dir="t">
+                <a:rot lat="0" lon="0" rev="4800000"/>
               </a:lightRig>
             </a:scene3d>
-            <a:sp3d prstMaterial="softEdge">
-              <a:bevelT w="38100" h="38100"/>
-              <a:contourClr>
-                <a:schemeClr val="tx2">
-                  <a:shade val="50000"/>
-                </a:schemeClr>
-              </a:contourClr>
+            <a:sp3d prstMaterial="matte">
+              <a:bevelT w="50800" h="10160"/>
             </a:sp3d>
           </a:bodyPr>
           <a:lstStyle>
-            <a:lvl1pPr algn="l" rtl="0">
-              <a:spcBef>
-                <a:spcPct val="0"/>
-              </a:spcBef>
-              <a:buNone/>
-              <a:defRPr sz="4800" b="1" cap="none" baseline="0">
-                <a:ln w="6350">
-                  <a:noFill/>
-                </a:ln>
-                <a:solidFill>
-                  <a:schemeClr val="accent1">
-                    <a:tint val="90000"/>
-                    <a:satMod val="120000"/>
-                  </a:schemeClr>
-                </a:solidFill>
-                <a:effectLst>
-                  <a:outerShdw blurRad="114300" dist="101600" dir="2700000" algn="tl" rotWithShape="0">
-                    <a:srgbClr val="000000">
-                      <a:alpha val="40000"/>
-                    </a:srgbClr>
-                  </a:outerShdw>
-                </a:effectLst>
-                <a:latin typeface="+mj-lt"/>
-                <a:ea typeface="+mj-ea"/>
-                <a:cs typeface="+mj-cs"/>
-              </a:defRPr>
+            <a:lvl1pPr algn="l">
+              <a:defRPr sz="4700" b="1" cap="none" baseline="0"/>
             </a:lvl1pPr>
+            <a:extLst/>
           </a:lstStyle>
           <a:p>
             <a:r>
@@ -955,22 +1281,22 @@
         </p:nvSpPr>
         <p:spPr>
           <a:xfrm>
-            <a:off x="1600200" y="2507786"/>
-            <a:ext cx="7086600" cy="1509712"/>
+            <a:off x="740664" y="1828800"/>
+            <a:ext cx="8022336" cy="685800"/>
           </a:xfrm>
         </p:spPr>
         <p:txBody>
-          <a:bodyPr anchor="t"/>
+          <a:bodyPr lIns="146304" tIns="0" rIns="45720" bIns="0" anchor="t"/>
           <a:lstStyle>
-            <a:lvl1pPr marL="73152" indent="0" algn="l">
+            <a:lvl1pPr marL="0" indent="0">
               <a:buNone/>
               <a:defRPr sz="2000">
                 <a:solidFill>
-                  <a:schemeClr val="tx1"/>
+                  <a:srgbClr val="FFFFFF"/>
                 </a:solidFill>
               </a:defRPr>
             </a:lvl1pPr>
-            <a:lvl2pPr>
+            <a:lvl2pPr marL="457200" indent="0">
               <a:buNone/>
               <a:defRPr sz="1800">
                 <a:solidFill>
@@ -980,7 +1306,7 @@
                 </a:solidFill>
               </a:defRPr>
             </a:lvl2pPr>
-            <a:lvl3pPr>
+            <a:lvl3pPr marL="914400" indent="0">
               <a:buNone/>
               <a:defRPr sz="1600">
                 <a:solidFill>
@@ -990,7 +1316,7 @@
                 </a:solidFill>
               </a:defRPr>
             </a:lvl3pPr>
-            <a:lvl4pPr>
+            <a:lvl4pPr marL="1371600" indent="0">
               <a:buNone/>
               <a:defRPr sz="1400">
                 <a:solidFill>
@@ -1000,7 +1326,7 @@
                 </a:solidFill>
               </a:defRPr>
             </a:lvl4pPr>
-            <a:lvl5pPr>
+            <a:lvl5pPr marL="1828800" indent="0">
               <a:buNone/>
               <a:defRPr sz="1400">
                 <a:solidFill>
@@ -1010,6 +1336,47 @@
                 </a:solidFill>
               </a:defRPr>
             </a:lvl5pPr>
+            <a:lvl6pPr marL="2286000" indent="0">
+              <a:buNone/>
+              <a:defRPr sz="1400">
+                <a:solidFill>
+                  <a:schemeClr val="tx1">
+                    <a:tint val="75000"/>
+                  </a:schemeClr>
+                </a:solidFill>
+              </a:defRPr>
+            </a:lvl6pPr>
+            <a:lvl7pPr marL="2743200" indent="0">
+              <a:buNone/>
+              <a:defRPr sz="1400">
+                <a:solidFill>
+                  <a:schemeClr val="tx1">
+                    <a:tint val="75000"/>
+                  </a:schemeClr>
+                </a:solidFill>
+              </a:defRPr>
+            </a:lvl7pPr>
+            <a:lvl8pPr marL="3200400" indent="0">
+              <a:buNone/>
+              <a:defRPr sz="1400">
+                <a:solidFill>
+                  <a:schemeClr val="tx1">
+                    <a:tint val="75000"/>
+                  </a:schemeClr>
+                </a:solidFill>
+              </a:defRPr>
+            </a:lvl8pPr>
+            <a:lvl9pPr marL="3657600" indent="0">
+              <a:buNone/>
+              <a:defRPr sz="1400">
+                <a:solidFill>
+                  <a:schemeClr val="tx1">
+                    <a:tint val="75000"/>
+                  </a:schemeClr>
+                </a:solidFill>
+              </a:defRPr>
+            </a:lvl9pPr>
+            <a:extLst/>
           </a:lstStyle>
           <a:p>
             <a:pPr lvl="0" eaLnBrk="1" latinLnBrk="0" hangingPunct="1"/>
@@ -1073,12 +1440,7 @@
             <p:ph type="sldNum" sz="quarter" idx="12"/>
           </p:nvPr>
         </p:nvSpPr>
-        <p:spPr>
-          <a:xfrm>
-            <a:off x="7924800" y="6416675"/>
-            <a:ext cx="762000" cy="365125"/>
-          </a:xfrm>
-        </p:spPr>
+        <p:spPr/>
         <p:txBody>
           <a:bodyPr/>
           <a:lstStyle/>
@@ -1130,7 +1492,9 @@
         <p:spPr/>
         <p:txBody>
           <a:bodyPr/>
-          <a:lstStyle/>
+          <a:lstStyle>
+            <a:extLst/>
+          </a:lstStyle>
           <a:p>
             <a:r>
               <a:rPr kumimoji="0" lang="ru-RU" smtClean="0"/>
@@ -1152,15 +1516,15 @@
         </p:nvSpPr>
         <p:spPr>
           <a:xfrm>
-            <a:off x="457200" y="1600200"/>
-            <a:ext cx="4038600" cy="4525963"/>
+            <a:off x="457200" y="1773936"/>
+            <a:ext cx="4038600" cy="4623816"/>
           </a:xfrm>
         </p:spPr>
         <p:txBody>
-          <a:bodyPr/>
+          <a:bodyPr lIns="91440"/>
           <a:lstStyle>
             <a:lvl1pPr>
-              <a:defRPr sz="2600"/>
+              <a:defRPr sz="2800"/>
             </a:lvl1pPr>
             <a:lvl2pPr>
               <a:defRPr sz="2400"/>
@@ -1174,6 +1538,19 @@
             <a:lvl5pPr>
               <a:defRPr sz="1800"/>
             </a:lvl5pPr>
+            <a:lvl6pPr>
+              <a:defRPr sz="1800"/>
+            </a:lvl6pPr>
+            <a:lvl7pPr>
+              <a:defRPr sz="1800"/>
+            </a:lvl7pPr>
+            <a:lvl8pPr>
+              <a:defRPr sz="1800"/>
+            </a:lvl8pPr>
+            <a:lvl9pPr>
+              <a:defRPr sz="1800"/>
+            </a:lvl9pPr>
+            <a:extLst/>
           </a:lstStyle>
           <a:p>
             <a:pPr lvl="0" eaLnBrk="1" latinLnBrk="0" hangingPunct="1"/>
@@ -1225,15 +1602,15 @@
         </p:nvSpPr>
         <p:spPr>
           <a:xfrm>
-            <a:off x="4648200" y="1600200"/>
-            <a:ext cx="4038600" cy="4525963"/>
+            <a:off x="4648200" y="1773936"/>
+            <a:ext cx="4038600" cy="4623816"/>
           </a:xfrm>
         </p:spPr>
         <p:txBody>
           <a:bodyPr/>
           <a:lstStyle>
             <a:lvl1pPr>
-              <a:defRPr sz="2600"/>
+              <a:defRPr sz="2800"/>
             </a:lvl1pPr>
             <a:lvl2pPr>
               <a:defRPr sz="2400"/>
@@ -1247,6 +1624,19 @@
             <a:lvl5pPr>
               <a:defRPr sz="1800"/>
             </a:lvl5pPr>
+            <a:lvl6pPr>
+              <a:defRPr sz="1800"/>
+            </a:lvl6pPr>
+            <a:lvl7pPr>
+              <a:defRPr sz="1800"/>
+            </a:lvl7pPr>
+            <a:lvl8pPr>
+              <a:defRPr sz="1800"/>
+            </a:lvl8pPr>
+            <a:lvl9pPr>
+              <a:defRPr sz="1800"/>
+            </a:lvl9pPr>
+            <a:extLst/>
           </a:lstStyle>
           <a:p>
             <a:pPr lvl="0" eaLnBrk="1" latinLnBrk="0" hangingPunct="1"/>
@@ -1388,18 +1778,14 @@
             <p:ph type="title"/>
           </p:nvPr>
         </p:nvSpPr>
-        <p:spPr>
-          <a:xfrm>
-            <a:off x="457200" y="273050"/>
-            <a:ext cx="8229600" cy="1143000"/>
-          </a:xfrm>
-        </p:spPr>
-        <p:txBody>
-          <a:bodyPr anchor="ctr"/>
+        <p:spPr/>
+        <p:txBody>
+          <a:bodyPr/>
           <a:lstStyle>
             <a:lvl1pPr>
               <a:defRPr/>
             </a:lvl1pPr>
+            <a:extLst/>
           </a:lstStyle>
           <a:p>
             <a:r>
@@ -1422,37 +1808,50 @@
         </p:nvSpPr>
         <p:spPr>
           <a:xfrm>
-            <a:off x="457200" y="1535112"/>
-            <a:ext cx="4040188" cy="750887"/>
+            <a:off x="457200" y="1698987"/>
+            <a:ext cx="4040188" cy="715355"/>
           </a:xfrm>
         </p:spPr>
         <p:txBody>
-          <a:bodyPr anchor="ctr"/>
+          <a:bodyPr lIns="146304" anchor="ctr"/>
           <a:lstStyle>
             <a:lvl1pPr marL="0" indent="0">
               <a:buNone/>
-              <a:defRPr sz="2400" b="0" cap="all" baseline="0">
-                <a:solidFill>
-                  <a:schemeClr val="tx1"/>
-                </a:solidFill>
-              </a:defRPr>
+              <a:defRPr sz="2300" b="1" cap="all" baseline="0"/>
             </a:lvl1pPr>
-            <a:lvl2pPr>
+            <a:lvl2pPr marL="457200" indent="0">
               <a:buNone/>
               <a:defRPr sz="2000" b="1"/>
             </a:lvl2pPr>
-            <a:lvl3pPr>
+            <a:lvl3pPr marL="914400" indent="0">
               <a:buNone/>
               <a:defRPr sz="1800" b="1"/>
             </a:lvl3pPr>
-            <a:lvl4pPr>
+            <a:lvl4pPr marL="1371600" indent="0">
               <a:buNone/>
               <a:defRPr sz="1600" b="1"/>
             </a:lvl4pPr>
-            <a:lvl5pPr>
+            <a:lvl5pPr marL="1828800" indent="0">
               <a:buNone/>
               <a:defRPr sz="1600" b="1"/>
             </a:lvl5pPr>
+            <a:lvl6pPr marL="2286000" indent="0">
+              <a:buNone/>
+              <a:defRPr sz="1600" b="1"/>
+            </a:lvl6pPr>
+            <a:lvl7pPr marL="2743200" indent="0">
+              <a:buNone/>
+              <a:defRPr sz="1600" b="1"/>
+            </a:lvl7pPr>
+            <a:lvl8pPr marL="3200400" indent="0">
+              <a:buNone/>
+              <a:defRPr sz="1600" b="1"/>
+            </a:lvl8pPr>
+            <a:lvl9pPr marL="3657600" indent="0">
+              <a:buNone/>
+              <a:defRPr sz="1600" b="1"/>
+            </a:lvl9pPr>
+            <a:extLst/>
           </a:lstStyle>
           <a:p>
             <a:pPr lvl="0" eaLnBrk="1" latinLnBrk="0" hangingPunct="1"/>
@@ -1465,71 +1864,18 @@
       </p:sp>
       <p:sp>
         <p:nvSpPr>
-          <p:cNvPr id="4" name="Текст 3"/>
-          <p:cNvSpPr>
-            <a:spLocks noGrp="1"/>
-          </p:cNvSpPr>
-          <p:nvPr>
-            <p:ph type="body" sz="half" idx="3"/>
+          <p:cNvPr id="4" name="Содержимое 3"/>
+          <p:cNvSpPr>
+            <a:spLocks noGrp="1"/>
+          </p:cNvSpPr>
+          <p:nvPr>
+            <p:ph sz="half" idx="2"/>
           </p:nvPr>
         </p:nvSpPr>
         <p:spPr>
           <a:xfrm>
-            <a:off x="4645025" y="1535112"/>
-            <a:ext cx="4041775" cy="750887"/>
-          </a:xfrm>
-        </p:spPr>
-        <p:txBody>
-          <a:bodyPr anchor="ctr"/>
-          <a:lstStyle>
-            <a:lvl1pPr marL="0" indent="0">
-              <a:buNone/>
-              <a:defRPr sz="2400" b="0" cap="all" baseline="0">
-                <a:solidFill>
-                  <a:schemeClr val="tx1"/>
-                </a:solidFill>
-              </a:defRPr>
-            </a:lvl1pPr>
-            <a:lvl2pPr>
-              <a:buNone/>
-              <a:defRPr sz="2000" b="1"/>
-            </a:lvl2pPr>
-            <a:lvl3pPr>
-              <a:buNone/>
-              <a:defRPr sz="1800" b="1"/>
-            </a:lvl3pPr>
-            <a:lvl4pPr>
-              <a:buNone/>
-              <a:defRPr sz="1600" b="1"/>
-            </a:lvl4pPr>
-            <a:lvl5pPr>
-              <a:buNone/>
-              <a:defRPr sz="1600" b="1"/>
-            </a:lvl5pPr>
-          </a:lstStyle>
-          <a:p>
-            <a:pPr lvl="0" eaLnBrk="1" latinLnBrk="0" hangingPunct="1"/>
-            <a:r>
-              <a:rPr kumimoji="0" lang="ru-RU" smtClean="0"/>
-              <a:t>Образец текста</a:t>
-            </a:r>
-          </a:p>
-        </p:txBody>
-      </p:sp>
-      <p:sp>
-        <p:nvSpPr>
-          <p:cNvPr id="5" name="Содержимое 4"/>
-          <p:cNvSpPr>
-            <a:spLocks noGrp="1"/>
-          </p:cNvSpPr>
-          <p:nvPr>
-            <p:ph sz="quarter" idx="2"/>
-          </p:nvPr>
-        </p:nvSpPr>
-        <p:spPr>
-          <a:xfrm>
-            <a:off x="457200" y="2362200"/>
-            <a:ext cx="4040188" cy="3763963"/>
+            <a:off x="457200" y="2449512"/>
+            <a:ext cx="4040188" cy="3951288"/>
           </a:xfrm>
         </p:spPr>
         <p:txBody>
@@ -1550,6 +1896,19 @@
             <a:lvl5pPr>
               <a:defRPr sz="1600"/>
             </a:lvl5pPr>
+            <a:lvl6pPr>
+              <a:defRPr sz="1600"/>
+            </a:lvl6pPr>
+            <a:lvl7pPr>
+              <a:defRPr sz="1600"/>
+            </a:lvl7pPr>
+            <a:lvl8pPr>
+              <a:defRPr sz="1600"/>
+            </a:lvl8pPr>
+            <a:lvl9pPr>
+              <a:defRPr sz="1600"/>
+            </a:lvl9pPr>
+            <a:extLst/>
           </a:lstStyle>
           <a:p>
             <a:pPr lvl="0" eaLnBrk="1" latinLnBrk="0" hangingPunct="1"/>
@@ -1591,18 +1950,84 @@
       </p:sp>
       <p:sp>
         <p:nvSpPr>
-          <p:cNvPr id="6" name="Содержимое 5"/>
-          <p:cNvSpPr>
-            <a:spLocks noGrp="1"/>
-          </p:cNvSpPr>
-          <p:nvPr>
-            <p:ph sz="quarter" idx="4"/>
+          <p:cNvPr id="5" name="Текст 4"/>
+          <p:cNvSpPr>
+            <a:spLocks noGrp="1"/>
+          </p:cNvSpPr>
+          <p:nvPr>
+            <p:ph type="body" sz="quarter" idx="3"/>
           </p:nvPr>
         </p:nvSpPr>
         <p:spPr>
           <a:xfrm>
-            <a:off x="4645025" y="2362200"/>
-            <a:ext cx="4041775" cy="3763963"/>
+            <a:off x="4645025" y="1698987"/>
+            <a:ext cx="4041775" cy="715355"/>
+          </a:xfrm>
+        </p:spPr>
+        <p:txBody>
+          <a:bodyPr lIns="146304" anchor="ctr"/>
+          <a:lstStyle>
+            <a:lvl1pPr marL="0" indent="0">
+              <a:buNone/>
+              <a:defRPr sz="2300" b="1" cap="all" baseline="0"/>
+            </a:lvl1pPr>
+            <a:lvl2pPr marL="457200" indent="0">
+              <a:buNone/>
+              <a:defRPr sz="2000" b="1"/>
+            </a:lvl2pPr>
+            <a:lvl3pPr marL="914400" indent="0">
+              <a:buNone/>
+              <a:defRPr sz="1800" b="1"/>
+            </a:lvl3pPr>
+            <a:lvl4pPr marL="1371600" indent="0">
+              <a:buNone/>
+              <a:defRPr sz="1600" b="1"/>
+            </a:lvl4pPr>
+            <a:lvl5pPr marL="1828800" indent="0">
+              <a:buNone/>
+              <a:defRPr sz="1600" b="1"/>
+            </a:lvl5pPr>
+            <a:lvl6pPr marL="2286000" indent="0">
+              <a:buNone/>
+              <a:defRPr sz="1600" b="1"/>
+            </a:lvl6pPr>
+            <a:lvl7pPr marL="2743200" indent="0">
+              <a:buNone/>
+              <a:defRPr sz="1600" b="1"/>
+            </a:lvl7pPr>
+            <a:lvl8pPr marL="3200400" indent="0">
+              <a:buNone/>
+              <a:defRPr sz="1600" b="1"/>
+            </a:lvl8pPr>
+            <a:lvl9pPr marL="3657600" indent="0">
+              <a:buNone/>
+              <a:defRPr sz="1600" b="1"/>
+            </a:lvl9pPr>
+            <a:extLst/>
+          </a:lstStyle>
+          <a:p>
+            <a:pPr lvl="0" eaLnBrk="1" latinLnBrk="0" hangingPunct="1"/>
+            <a:r>
+              <a:rPr kumimoji="0" lang="ru-RU" smtClean="0"/>
+              <a:t>Образец текста</a:t>
+            </a:r>
+          </a:p>
+        </p:txBody>
+      </p:sp>
+      <p:sp>
+        <p:nvSpPr>
+          <p:cNvPr id="6" name="Содержимое 5"/>
+          <p:cNvSpPr>
+            <a:spLocks noGrp="1"/>
+          </p:cNvSpPr>
+          <p:nvPr>
+            <p:ph sz="quarter" idx="4"/>
+          </p:nvPr>
+        </p:nvSpPr>
+        <p:spPr>
+          <a:xfrm>
+            <a:off x="4645025" y="2449512"/>
+            <a:ext cx="4041775" cy="3951288"/>
           </a:xfrm>
         </p:spPr>
         <p:txBody>
@@ -1623,6 +2048,19 @@
             <a:lvl5pPr>
               <a:defRPr sz="1600"/>
             </a:lvl5pPr>
+            <a:lvl6pPr>
+              <a:defRPr sz="1600"/>
+            </a:lvl6pPr>
+            <a:lvl7pPr>
+              <a:defRPr sz="1600"/>
+            </a:lvl7pPr>
+            <a:lvl8pPr>
+              <a:defRPr sz="1600"/>
+            </a:lvl8pPr>
+            <a:lvl9pPr>
+              <a:defRPr sz="1600"/>
+            </a:lvl9pPr>
+            <a:extLst/>
           </a:lstStyle>
           <a:p>
             <a:pPr lvl="0" eaLnBrk="1" latinLnBrk="0" hangingPunct="1"/>
@@ -1767,7 +2205,9 @@
         <p:spPr/>
         <p:txBody>
           <a:bodyPr/>
-          <a:lstStyle/>
+          <a:lstStyle>
+            <a:extLst/>
+          </a:lstStyle>
           <a:p>
             <a:r>
               <a:rPr kumimoji="0" lang="ru-RU" smtClean="0"/>
@@ -1853,7 +2293,7 @@
 </file>
 
 <file path=ppt/slideLayouts/slideLayout7.xml><?xml version="1.0" encoding="utf-8"?>
-<p:sldLayout xmlns:a="http://schemas.openxmlformats.org/drawingml/2006/main" xmlns:r="http://schemas.openxmlformats.org/officeDocument/2006/relationships" xmlns:p="http://schemas.openxmlformats.org/presentationml/2006/main" type="blank" preserve="1">
+<p:sldLayout xmlns:a="http://schemas.openxmlformats.org/drawingml/2006/main" xmlns:r="http://schemas.openxmlformats.org/officeDocument/2006/relationships" xmlns:p="http://schemas.openxmlformats.org/presentationml/2006/main" showMasterSp="0" type="blank" preserve="1">
   <p:cSld name="Пустой слайд">
     <p:spTree>
       <p:nvGrpSpPr>
@@ -1973,30 +2413,20 @@
         </p:nvSpPr>
         <p:spPr>
           <a:xfrm>
-            <a:off x="457200" y="273050"/>
-            <a:ext cx="3008313" cy="1162050"/>
+            <a:off x="167838" y="152400"/>
+            <a:ext cx="2523744" cy="978408"/>
           </a:xfrm>
         </p:spPr>
         <p:txBody>
-          <a:bodyPr vert="horz" anchor="b">
+          <a:bodyPr vert="horz" lIns="73152" rIns="45720" bIns="0" rtlCol="0" anchor="b">
             <a:normAutofit/>
-            <a:sp3d prstMaterial="softEdge"/>
+            <a:sp3d prstMaterial="matte"/>
           </a:bodyPr>
           <a:lstStyle>
             <a:lvl1pPr algn="l">
-              <a:buNone/>
-              <a:defRPr sz="2200" b="0">
-                <a:ln w="6350">
-                  <a:noFill/>
-                </a:ln>
-                <a:solidFill>
-                  <a:schemeClr val="accent1">
-                    <a:tint val="73000"/>
-                    <a:satMod val="180000"/>
-                  </a:schemeClr>
-                </a:solidFill>
-              </a:defRPr>
+              <a:defRPr sz="2000" b="0"/>
             </a:lvl1pPr>
+            <a:extLst/>
           </a:lstStyle>
           <a:p>
             <a:r>
@@ -2009,87 +2439,51 @@
       </p:sp>
       <p:sp>
         <p:nvSpPr>
-          <p:cNvPr id="3" name="Текст 2"/>
-          <p:cNvSpPr>
-            <a:spLocks noGrp="1"/>
-          </p:cNvSpPr>
-          <p:nvPr>
-            <p:ph type="body" idx="2"/>
+          <p:cNvPr id="3" name="Содержимое 2"/>
+          <p:cNvSpPr>
+            <a:spLocks noGrp="1"/>
+          </p:cNvSpPr>
+          <p:nvPr>
+            <p:ph idx="1"/>
           </p:nvPr>
         </p:nvSpPr>
         <p:spPr>
           <a:xfrm>
-            <a:off x="457200" y="1524000"/>
-            <a:ext cx="3008313" cy="4602163"/>
+            <a:off x="3019377" y="1743133"/>
+            <a:ext cx="5920641" cy="4558885"/>
           </a:xfrm>
         </p:spPr>
         <p:txBody>
           <a:bodyPr/>
           <a:lstStyle>
-            <a:lvl1pPr marL="0" indent="0">
-              <a:buNone/>
-              <a:defRPr sz="1400"/>
+            <a:lvl1pPr>
+              <a:defRPr sz="3200"/>
             </a:lvl1pPr>
             <a:lvl2pPr>
-              <a:buNone/>
-              <a:defRPr sz="1200"/>
+              <a:defRPr sz="2800"/>
             </a:lvl2pPr>
             <a:lvl3pPr>
-              <a:buNone/>
-              <a:defRPr sz="1000"/>
-            </a:lvl3pPr>
-            <a:lvl4pPr>
-              <a:buNone/>
-              <a:defRPr sz="900"/>
-            </a:lvl4pPr>
-            <a:lvl5pPr>
-              <a:buNone/>
-              <a:defRPr sz="900"/>
-            </a:lvl5pPr>
-          </a:lstStyle>
-          <a:p>
-            <a:pPr lvl="0" eaLnBrk="1" latinLnBrk="0" hangingPunct="1"/>
-            <a:r>
-              <a:rPr kumimoji="0" lang="ru-RU" smtClean="0"/>
-              <a:t>Образец текста</a:t>
-            </a:r>
-          </a:p>
-        </p:txBody>
-      </p:sp>
-      <p:sp>
-        <p:nvSpPr>
-          <p:cNvPr id="4" name="Содержимое 3"/>
-          <p:cNvSpPr>
-            <a:spLocks noGrp="1"/>
-          </p:cNvSpPr>
-          <p:nvPr>
-            <p:ph sz="half" idx="1"/>
-          </p:nvPr>
-        </p:nvSpPr>
-        <p:spPr>
-          <a:xfrm>
-            <a:off x="3575050" y="273050"/>
-            <a:ext cx="5111750" cy="5853113"/>
-          </a:xfrm>
-        </p:spPr>
-        <p:txBody>
-          <a:bodyPr/>
-          <a:lstStyle>
-            <a:lvl1pPr>
-              <a:defRPr sz="2600"/>
-            </a:lvl1pPr>
-            <a:lvl2pPr>
               <a:defRPr sz="2400"/>
-            </a:lvl2pPr>
-            <a:lvl3pPr>
-              <a:defRPr sz="2200"/>
             </a:lvl3pPr>
             <a:lvl4pPr>
               <a:defRPr sz="2000"/>
             </a:lvl4pPr>
             <a:lvl5pPr>
-              <a:defRPr sz="1800"/>
+              <a:defRPr sz="2000"/>
             </a:lvl5pPr>
+            <a:lvl6pPr>
+              <a:defRPr sz="2000"/>
+            </a:lvl6pPr>
+            <a:lvl7pPr>
+              <a:defRPr sz="2000"/>
+            </a:lvl7pPr>
+            <a:lvl8pPr>
+              <a:defRPr sz="2000"/>
+            </a:lvl8pPr>
+            <a:lvl9pPr>
+              <a:defRPr sz="2000"/>
+            </a:lvl9pPr>
+            <a:extLst/>
           </a:lstStyle>
           <a:p>
             <a:pPr lvl="0" eaLnBrk="1" latinLnBrk="0" hangingPunct="1"/>
@@ -2126,6 +2520,72 @@
               <a:t>Пятый уровень</a:t>
             </a:r>
             <a:endParaRPr kumimoji="0" lang="en-US"/>
+          </a:p>
+        </p:txBody>
+      </p:sp>
+      <p:sp>
+        <p:nvSpPr>
+          <p:cNvPr id="4" name="Текст 3"/>
+          <p:cNvSpPr>
+            <a:spLocks noGrp="1"/>
+          </p:cNvSpPr>
+          <p:nvPr>
+            <p:ph type="body" sz="half" idx="2"/>
+          </p:nvPr>
+        </p:nvSpPr>
+        <p:spPr>
+          <a:xfrm>
+            <a:off x="167838" y="1730018"/>
+            <a:ext cx="2468880" cy="4572000"/>
+          </a:xfrm>
+        </p:spPr>
+        <p:txBody>
+          <a:bodyPr/>
+          <a:lstStyle>
+            <a:lvl1pPr marL="0" indent="0">
+              <a:buNone/>
+              <a:defRPr sz="1400"/>
+            </a:lvl1pPr>
+            <a:lvl2pPr marL="457200" indent="0">
+              <a:buNone/>
+              <a:defRPr sz="1200"/>
+            </a:lvl2pPr>
+            <a:lvl3pPr marL="914400" indent="0">
+              <a:buNone/>
+              <a:defRPr sz="1000"/>
+            </a:lvl3pPr>
+            <a:lvl4pPr marL="1371600" indent="0">
+              <a:buNone/>
+              <a:defRPr sz="900"/>
+            </a:lvl4pPr>
+            <a:lvl5pPr marL="1828800" indent="0">
+              <a:buNone/>
+              <a:defRPr sz="900"/>
+            </a:lvl5pPr>
+            <a:lvl6pPr marL="2286000" indent="0">
+              <a:buNone/>
+              <a:defRPr sz="900"/>
+            </a:lvl6pPr>
+            <a:lvl7pPr marL="2743200" indent="0">
+              <a:buNone/>
+              <a:defRPr sz="900"/>
+            </a:lvl7pPr>
+            <a:lvl8pPr marL="3200400" indent="0">
+              <a:buNone/>
+              <a:defRPr sz="900"/>
+            </a:lvl8pPr>
+            <a:lvl9pPr marL="3657600" indent="0">
+              <a:buNone/>
+              <a:defRPr sz="900"/>
+            </a:lvl9pPr>
+            <a:extLst/>
+          </a:lstStyle>
+          <a:p>
+            <a:pPr lvl="0" eaLnBrk="1" latinLnBrk="0" hangingPunct="1"/>
+            <a:r>
+              <a:rPr kumimoji="0" lang="ru-RU" smtClean="0"/>
+              <a:t>Образец текста</a:t>
+            </a:r>
           </a:p>
         </p:txBody>
       </p:sp>
@@ -2193,6 +2653,100 @@
               <a:t>‹#›</a:t>
             </a:fld>
             <a:endParaRPr lang="ru-RU"/>
+          </a:p>
+        </p:txBody>
+      </p:sp>
+      <p:sp>
+        <p:nvSpPr>
+          <p:cNvPr id="12" name="Прямоугольник 11"/>
+          <p:cNvSpPr/>
+          <p:nvPr/>
+        </p:nvSpPr>
+        <p:spPr bwMode="invGray">
+          <a:xfrm>
+            <a:off x="2855737" y="0"/>
+            <a:ext cx="45720" cy="1453896"/>
+          </a:xfrm>
+          <a:prstGeom prst="rect">
+            <a:avLst/>
+          </a:prstGeom>
+          <a:solidFill>
+            <a:srgbClr val="FFFFFF"/>
+          </a:solidFill>
+          <a:ln w="48000" cap="flat" cmpd="thickThin" algn="ctr">
+            <a:noFill/>
+            <a:prstDash val="solid"/>
+          </a:ln>
+        </p:spPr>
+        <p:style>
+          <a:lnRef idx="2">
+            <a:schemeClr val="accent1"/>
+          </a:lnRef>
+          <a:fillRef idx="1">
+            <a:schemeClr val="accent1"/>
+          </a:fillRef>
+          <a:effectRef idx="0">
+            <a:schemeClr val="accent1"/>
+          </a:effectRef>
+          <a:fontRef idx="minor">
+            <a:schemeClr val="lt1"/>
+          </a:fontRef>
+        </p:style>
+        <p:txBody>
+          <a:bodyPr rtlCol="0" anchor="ctr"/>
+          <a:lstStyle>
+            <a:extLst/>
+          </a:lstStyle>
+          <a:p>
+            <a:pPr algn="ctr" eaLnBrk="1" latinLnBrk="0" hangingPunct="1"/>
+            <a:endParaRPr kumimoji="0" lang="en-US"/>
+          </a:p>
+        </p:txBody>
+      </p:sp>
+      <p:sp>
+        <p:nvSpPr>
+          <p:cNvPr id="9" name="Прямоугольник 8"/>
+          <p:cNvSpPr/>
+          <p:nvPr/>
+        </p:nvSpPr>
+        <p:spPr bwMode="invGray">
+          <a:xfrm>
+            <a:off x="2855737" y="0"/>
+            <a:ext cx="45720" cy="1453896"/>
+          </a:xfrm>
+          <a:prstGeom prst="rect">
+            <a:avLst/>
+          </a:prstGeom>
+          <a:solidFill>
+            <a:srgbClr val="FFFFFF"/>
+          </a:solidFill>
+          <a:ln w="48000" cap="flat" cmpd="thickThin" algn="ctr">
+            <a:noFill/>
+            <a:prstDash val="solid"/>
+          </a:ln>
+        </p:spPr>
+        <p:style>
+          <a:lnRef idx="2">
+            <a:schemeClr val="accent1"/>
+          </a:lnRef>
+          <a:fillRef idx="1">
+            <a:schemeClr val="accent1"/>
+          </a:fillRef>
+          <a:effectRef idx="0">
+            <a:schemeClr val="accent1"/>
+          </a:effectRef>
+          <a:fontRef idx="minor">
+            <a:schemeClr val="lt1"/>
+          </a:fontRef>
+        </p:style>
+        <p:txBody>
+          <a:bodyPr rtlCol="0" anchor="ctr"/>
+          <a:lstStyle>
+            <a:extLst/>
+          </a:lstStyle>
+          <a:p>
+            <a:pPr algn="ctr" eaLnBrk="1" latinLnBrk="0" hangingPunct="1"/>
+            <a:endParaRPr kumimoji="0" lang="en-US"/>
           </a:p>
         </p:txBody>
       </p:sp>
@@ -2207,274 +2761,8 @@
 <file path=ppt/slideLayouts/slideLayout9.xml><?xml version="1.0" encoding="utf-8"?>
 <p:sldLayout xmlns:a="http://schemas.openxmlformats.org/drawingml/2006/main" xmlns:r="http://schemas.openxmlformats.org/officeDocument/2006/relationships" xmlns:p="http://schemas.openxmlformats.org/presentationml/2006/main" type="picTx" preserve="1">
   <p:cSld name="Рисунок с подписью">
-    <p:spTree>
-      <p:nvGrpSpPr>
-        <p:cNvPr id="1" name=""/>
-        <p:cNvGrpSpPr/>
-        <p:nvPr/>
-      </p:nvGrpSpPr>
-      <p:grpSpPr>
-        <a:xfrm>
-          <a:off x="0" y="0"/>
-          <a:ext cx="0" cy="0"/>
-          <a:chOff x="0" y="0"/>
-          <a:chExt cx="0" cy="0"/>
-        </a:xfrm>
-      </p:grpSpPr>
-      <p:sp>
-        <p:nvSpPr>
-          <p:cNvPr id="2" name="Заголовок 1"/>
-          <p:cNvSpPr>
-            <a:spLocks noGrp="1"/>
-          </p:cNvSpPr>
-          <p:nvPr>
-            <p:ph type="title"/>
-          </p:nvPr>
-        </p:nvSpPr>
-        <p:spPr>
-          <a:xfrm>
-            <a:off x="1828800" y="609600"/>
-            <a:ext cx="5486400" cy="522288"/>
-          </a:xfrm>
-        </p:spPr>
-        <p:txBody>
-          <a:bodyPr lIns="45720" rIns="45720" bIns="0" anchor="b">
-            <a:sp3d prstMaterial="softEdge"/>
-          </a:bodyPr>
-          <a:lstStyle>
-            <a:lvl1pPr algn="ctr">
-              <a:buNone/>
-              <a:defRPr sz="2000" b="1"/>
-            </a:lvl1pPr>
-          </a:lstStyle>
-          <a:p>
-            <a:r>
-              <a:rPr kumimoji="0" lang="ru-RU" smtClean="0"/>
-              <a:t>Образец заголовка</a:t>
-            </a:r>
-            <a:endParaRPr kumimoji="0" lang="en-US"/>
-          </a:p>
-        </p:txBody>
-      </p:sp>
-      <p:sp>
-        <p:nvSpPr>
-          <p:cNvPr id="3" name="Рисунок 2"/>
-          <p:cNvSpPr>
-            <a:spLocks noGrp="1"/>
-          </p:cNvSpPr>
-          <p:nvPr>
-            <p:ph type="pic" idx="1"/>
-          </p:nvPr>
-        </p:nvSpPr>
-        <p:spPr>
-          <a:xfrm>
-            <a:off x="1828800" y="1831975"/>
-            <a:ext cx="5486400" cy="3962400"/>
-          </a:xfrm>
-          <a:solidFill>
-            <a:schemeClr val="bg2"/>
-          </a:solidFill>
-          <a:ln w="44450" cap="sq" cmpd="sng" algn="ctr">
-            <a:solidFill>
-              <a:srgbClr val="FFFFFF"/>
-            </a:solidFill>
-            <a:prstDash val="solid"/>
-            <a:miter lim="800000"/>
-          </a:ln>
-          <a:effectLst>
-            <a:outerShdw blurRad="190500" dist="228600" dir="2700000" sy="90000">
-              <a:srgbClr val="000000">
-                <a:alpha val="25000"/>
-              </a:srgbClr>
-            </a:outerShdw>
-          </a:effectLst>
-          <a:scene3d>
-            <a:camera prst="orthographicFront">
-              <a:rot lat="0" lon="0" rev="0"/>
-            </a:camera>
-            <a:lightRig rig="balanced" dir="tr">
-              <a:rot lat="0" lon="0" rev="2700000"/>
-            </a:lightRig>
-          </a:scene3d>
-          <a:sp3d prstMaterial="matte">
-            <a:contourClr>
-              <a:schemeClr val="tx2">
-                <a:shade val="50000"/>
-              </a:schemeClr>
-            </a:contourClr>
-          </a:sp3d>
-        </p:spPr>
-        <p:style>
-          <a:lnRef idx="3">
-            <a:schemeClr val="lt1"/>
-          </a:lnRef>
-          <a:fillRef idx="1">
-            <a:schemeClr val="accent1"/>
-          </a:fillRef>
-          <a:effectRef idx="1">
-            <a:schemeClr val="accent1"/>
-          </a:effectRef>
-          <a:fontRef idx="minor">
-            <a:schemeClr val="lt1"/>
-          </a:fontRef>
-        </p:style>
-        <p:txBody>
-          <a:bodyPr anchor="t"/>
-          <a:lstStyle>
-            <a:lvl1pPr indent="0">
-              <a:buNone/>
-              <a:defRPr sz="3200"/>
-            </a:lvl1pPr>
-          </a:lstStyle>
-          <a:p>
-            <a:pPr marL="0" algn="l" rtl="0" eaLnBrk="1" latinLnBrk="0" hangingPunct="1"/>
-            <a:r>
-              <a:rPr kumimoji="0" lang="ru-RU" smtClean="0">
-                <a:solidFill>
-                  <a:schemeClr val="lt1"/>
-                </a:solidFill>
-                <a:latin typeface="+mn-lt"/>
-                <a:ea typeface="+mn-ea"/>
-                <a:cs typeface="+mn-cs"/>
-              </a:rPr>
-              <a:t>Вставка рисунка</a:t>
-            </a:r>
-            <a:endParaRPr kumimoji="0" lang="en-US" dirty="0">
-              <a:solidFill>
-                <a:schemeClr val="lt1"/>
-              </a:solidFill>
-              <a:latin typeface="+mn-lt"/>
-              <a:ea typeface="+mn-ea"/>
-              <a:cs typeface="+mn-cs"/>
-            </a:endParaRPr>
-          </a:p>
-        </p:txBody>
-      </p:sp>
-      <p:sp>
-        <p:nvSpPr>
-          <p:cNvPr id="4" name="Текст 3"/>
-          <p:cNvSpPr>
-            <a:spLocks noGrp="1"/>
-          </p:cNvSpPr>
-          <p:nvPr>
-            <p:ph type="body" sz="half" idx="2"/>
-          </p:nvPr>
-        </p:nvSpPr>
-        <p:spPr>
-          <a:xfrm>
-            <a:off x="1828800" y="1166787"/>
-            <a:ext cx="5486400" cy="530352"/>
-          </a:xfrm>
-        </p:spPr>
-        <p:txBody>
-          <a:bodyPr lIns="45720" tIns="45720" rIns="45720" anchor="t"/>
-          <a:lstStyle>
-            <a:lvl1pPr marL="0" indent="0" algn="ctr">
-              <a:buNone/>
-              <a:defRPr sz="1400"/>
-            </a:lvl1pPr>
-            <a:lvl2pPr>
-              <a:defRPr sz="1200"/>
-            </a:lvl2pPr>
-            <a:lvl3pPr>
-              <a:defRPr sz="1000"/>
-            </a:lvl3pPr>
-            <a:lvl4pPr>
-              <a:defRPr sz="900"/>
-            </a:lvl4pPr>
-            <a:lvl5pPr>
-              <a:defRPr sz="900"/>
-            </a:lvl5pPr>
-          </a:lstStyle>
-          <a:p>
-            <a:pPr lvl="0" eaLnBrk="1" latinLnBrk="0" hangingPunct="1"/>
-            <a:r>
-              <a:rPr kumimoji="0" lang="ru-RU" smtClean="0"/>
-              <a:t>Образец текста</a:t>
-            </a:r>
-          </a:p>
-        </p:txBody>
-      </p:sp>
-      <p:sp>
-        <p:nvSpPr>
-          <p:cNvPr id="5" name="Дата 4"/>
-          <p:cNvSpPr>
-            <a:spLocks noGrp="1"/>
-          </p:cNvSpPr>
-          <p:nvPr>
-            <p:ph type="dt" sz="half" idx="10"/>
-          </p:nvPr>
-        </p:nvSpPr>
-        <p:spPr/>
-        <p:txBody>
-          <a:bodyPr/>
-          <a:lstStyle/>
-          <a:p>
-            <a:fld id="{5B106E36-FD25-4E2D-B0AA-010F637433A0}" type="datetimeFigureOut">
-              <a:rPr lang="ru-RU" smtClean="0"/>
-              <a:pPr/>
-              <a:t>28.02.2023</a:t>
-            </a:fld>
-            <a:endParaRPr lang="ru-RU"/>
-          </a:p>
-        </p:txBody>
-      </p:sp>
-      <p:sp>
-        <p:nvSpPr>
-          <p:cNvPr id="6" name="Нижний колонтитул 5"/>
-          <p:cNvSpPr>
-            <a:spLocks noGrp="1"/>
-          </p:cNvSpPr>
-          <p:nvPr>
-            <p:ph type="ftr" sz="quarter" idx="11"/>
-          </p:nvPr>
-        </p:nvSpPr>
-        <p:spPr/>
-        <p:txBody>
-          <a:bodyPr/>
-          <a:lstStyle/>
-          <a:p>
-            <a:endParaRPr lang="ru-RU"/>
-          </a:p>
-        </p:txBody>
-      </p:sp>
-      <p:sp>
-        <p:nvSpPr>
-          <p:cNvPr id="7" name="Номер слайда 6"/>
-          <p:cNvSpPr>
-            <a:spLocks noGrp="1"/>
-          </p:cNvSpPr>
-          <p:nvPr>
-            <p:ph type="sldNum" sz="quarter" idx="12"/>
-          </p:nvPr>
-        </p:nvSpPr>
-        <p:spPr/>
-        <p:txBody>
-          <a:bodyPr/>
-          <a:lstStyle/>
-          <a:p>
-            <a:fld id="{725C68B6-61C2-468F-89AB-4B9F7531AA68}" type="slidenum">
-              <a:rPr lang="ru-RU" smtClean="0"/>
-              <a:pPr/>
-              <a:t>‹#›</a:t>
-            </a:fld>
-            <a:endParaRPr lang="ru-RU"/>
-          </a:p>
-        </p:txBody>
-      </p:sp>
-    </p:spTree>
-  </p:cSld>
-  <p:clrMapOvr>
-    <a:masterClrMapping/>
-  </p:clrMapOvr>
-</p:sldLayout>
-</file>
-
-<file path=ppt/slideMasters/slideMaster1.xml><?xml version="1.0" encoding="utf-8"?>
-<p:sldMaster xmlns:a="http://schemas.openxmlformats.org/drawingml/2006/main" xmlns:r="http://schemas.openxmlformats.org/officeDocument/2006/relationships" xmlns:p="http://schemas.openxmlformats.org/presentationml/2006/main">
-  <p:cSld>
     <p:bg>
-      <p:bgRef idx="1003">
+      <p:bgRef idx="1001">
         <a:schemeClr val="bg2"/>
       </p:bgRef>
     </p:bg>
@@ -2494,7 +2782,7 @@
       </p:grpSpPr>
       <p:sp>
         <p:nvSpPr>
-          <p:cNvPr id="22" name="Заголовок 21"/>
+          <p:cNvPr id="2" name="Заголовок 1"/>
           <p:cNvSpPr>
             <a:spLocks noGrp="1"/>
           </p:cNvSpPr>
@@ -2504,124 +2792,312 @@
         </p:nvSpPr>
         <p:spPr>
           <a:xfrm>
-            <a:off x="457200" y="274638"/>
-            <a:ext cx="8229600" cy="1143000"/>
+            <a:off x="164592" y="155448"/>
+            <a:ext cx="2525150" cy="978408"/>
+          </a:xfrm>
+        </p:spPr>
+        <p:txBody>
+          <a:bodyPr lIns="73152" bIns="0" anchor="b">
+            <a:sp3d prstMaterial="matte"/>
+          </a:bodyPr>
+          <a:lstStyle>
+            <a:lvl1pPr algn="l">
+              <a:defRPr sz="2000" b="0"/>
+            </a:lvl1pPr>
+            <a:extLst/>
+          </a:lstStyle>
+          <a:p>
+            <a:r>
+              <a:rPr kumimoji="0" lang="ru-RU" smtClean="0"/>
+              <a:t>Образец заголовка</a:t>
+            </a:r>
+            <a:endParaRPr kumimoji="0" lang="en-US"/>
+          </a:p>
+        </p:txBody>
+      </p:sp>
+      <p:sp>
+        <p:nvSpPr>
+          <p:cNvPr id="3" name="Рисунок 2"/>
+          <p:cNvSpPr>
+            <a:spLocks noGrp="1"/>
+          </p:cNvSpPr>
+          <p:nvPr>
+            <p:ph type="pic" idx="1"/>
+          </p:nvPr>
+        </p:nvSpPr>
+        <p:spPr>
+          <a:xfrm>
+            <a:off x="2903805" y="1484808"/>
+            <a:ext cx="6247397" cy="5373192"/>
+          </a:xfrm>
+          <a:solidFill>
+            <a:schemeClr val="bg2">
+              <a:shade val="75000"/>
+            </a:schemeClr>
+          </a:solidFill>
+        </p:spPr>
+        <p:txBody>
+          <a:bodyPr/>
+          <a:lstStyle>
+            <a:lvl1pPr marL="0" indent="0">
+              <a:buNone/>
+              <a:defRPr sz="3200"/>
+            </a:lvl1pPr>
+            <a:lvl2pPr marL="457200" indent="0">
+              <a:buNone/>
+              <a:defRPr sz="2800"/>
+            </a:lvl2pPr>
+            <a:lvl3pPr marL="914400" indent="0">
+              <a:buNone/>
+              <a:defRPr sz="2400"/>
+            </a:lvl3pPr>
+            <a:lvl4pPr marL="1371600" indent="0">
+              <a:buNone/>
+              <a:defRPr sz="2000"/>
+            </a:lvl4pPr>
+            <a:lvl5pPr marL="1828800" indent="0">
+              <a:buNone/>
+              <a:defRPr sz="2000"/>
+            </a:lvl5pPr>
+            <a:lvl6pPr marL="2286000" indent="0">
+              <a:buNone/>
+              <a:defRPr sz="2000"/>
+            </a:lvl6pPr>
+            <a:lvl7pPr marL="2743200" indent="0">
+              <a:buNone/>
+              <a:defRPr sz="2000"/>
+            </a:lvl7pPr>
+            <a:lvl8pPr marL="3200400" indent="0">
+              <a:buNone/>
+              <a:defRPr sz="2000"/>
+            </a:lvl8pPr>
+            <a:lvl9pPr marL="3657600" indent="0">
+              <a:buNone/>
+              <a:defRPr sz="2000"/>
+            </a:lvl9pPr>
+            <a:extLst/>
+          </a:lstStyle>
+          <a:p>
+            <a:r>
+              <a:rPr kumimoji="0" lang="ru-RU" smtClean="0"/>
+              <a:t>Вставка рисунка</a:t>
+            </a:r>
+            <a:endParaRPr kumimoji="0" lang="en-US" dirty="0"/>
+          </a:p>
+        </p:txBody>
+      </p:sp>
+      <p:sp>
+        <p:nvSpPr>
+          <p:cNvPr id="4" name="Текст 3"/>
+          <p:cNvSpPr>
+            <a:spLocks noGrp="1"/>
+          </p:cNvSpPr>
+          <p:nvPr>
+            <p:ph type="body" sz="half" idx="2"/>
+          </p:nvPr>
+        </p:nvSpPr>
+        <p:spPr>
+          <a:xfrm>
+            <a:off x="164592" y="1728216"/>
+            <a:ext cx="2468880" cy="4572000"/>
+          </a:xfrm>
+        </p:spPr>
+        <p:txBody>
+          <a:bodyPr/>
+          <a:lstStyle>
+            <a:lvl1pPr marL="0" indent="0">
+              <a:buNone/>
+              <a:defRPr sz="1400"/>
+            </a:lvl1pPr>
+            <a:lvl2pPr marL="457200" indent="0">
+              <a:buNone/>
+              <a:defRPr sz="1200"/>
+            </a:lvl2pPr>
+            <a:lvl3pPr marL="914400" indent="0">
+              <a:buNone/>
+              <a:defRPr sz="1000"/>
+            </a:lvl3pPr>
+            <a:lvl4pPr marL="1371600" indent="0">
+              <a:buNone/>
+              <a:defRPr sz="900"/>
+            </a:lvl4pPr>
+            <a:lvl5pPr marL="1828800" indent="0">
+              <a:buNone/>
+              <a:defRPr sz="900"/>
+            </a:lvl5pPr>
+            <a:lvl6pPr marL="2286000" indent="0">
+              <a:buNone/>
+              <a:defRPr sz="900"/>
+            </a:lvl6pPr>
+            <a:lvl7pPr marL="2743200" indent="0">
+              <a:buNone/>
+              <a:defRPr sz="900"/>
+            </a:lvl7pPr>
+            <a:lvl8pPr marL="3200400" indent="0">
+              <a:buNone/>
+              <a:defRPr sz="900"/>
+            </a:lvl8pPr>
+            <a:lvl9pPr marL="3657600" indent="0">
+              <a:buNone/>
+              <a:defRPr sz="900"/>
+            </a:lvl9pPr>
+            <a:extLst/>
+          </a:lstStyle>
+          <a:p>
+            <a:pPr lvl="0" eaLnBrk="1" latinLnBrk="0" hangingPunct="1"/>
+            <a:r>
+              <a:rPr kumimoji="0" lang="ru-RU" smtClean="0"/>
+              <a:t>Образец текста</a:t>
+            </a:r>
+          </a:p>
+        </p:txBody>
+      </p:sp>
+      <p:sp>
+        <p:nvSpPr>
+          <p:cNvPr id="5" name="Дата 4"/>
+          <p:cNvSpPr>
+            <a:spLocks noGrp="1"/>
+          </p:cNvSpPr>
+          <p:nvPr>
+            <p:ph type="dt" sz="half" idx="10"/>
+          </p:nvPr>
+        </p:nvSpPr>
+        <p:spPr>
+          <a:xfrm>
+            <a:off x="164592" y="1170432"/>
+            <a:ext cx="2523744" cy="201168"/>
+          </a:xfrm>
+        </p:spPr>
+        <p:txBody>
+          <a:bodyPr/>
+          <a:lstStyle/>
+          <a:p>
+            <a:fld id="{5B106E36-FD25-4E2D-B0AA-010F637433A0}" type="datetimeFigureOut">
+              <a:rPr lang="ru-RU" smtClean="0"/>
+              <a:pPr/>
+              <a:t>28.02.2023</a:t>
+            </a:fld>
+            <a:endParaRPr lang="ru-RU"/>
+          </a:p>
+        </p:txBody>
+      </p:sp>
+      <p:sp>
+        <p:nvSpPr>
+          <p:cNvPr id="11" name="Прямоугольник 10"/>
+          <p:cNvSpPr/>
+          <p:nvPr/>
+        </p:nvSpPr>
+        <p:spPr>
+          <a:xfrm>
+            <a:off x="2855737" y="0"/>
+            <a:ext cx="45720" cy="6858000"/>
           </a:xfrm>
           <a:prstGeom prst="rect">
             <a:avLst/>
           </a:prstGeom>
+          <a:solidFill>
+            <a:srgbClr val="FFFFFF"/>
+          </a:solidFill>
+          <a:ln w="48000" cap="flat" cmpd="thickThin" algn="ctr">
+            <a:noFill/>
+            <a:prstDash val="solid"/>
+          </a:ln>
         </p:spPr>
-        <p:txBody>
-          <a:bodyPr vert="horz" anchor="ctr">
-            <a:normAutofit/>
-            <a:scene3d>
-              <a:camera prst="orthographicFront"/>
-              <a:lightRig rig="soft" dir="t">
-                <a:rot lat="0" lon="0" rev="16800000"/>
-              </a:lightRig>
-            </a:scene3d>
-            <a:sp3d prstMaterial="softEdge">
-              <a:bevelT w="38100" h="38100"/>
-            </a:sp3d>
-          </a:bodyPr>
-          <a:lstStyle/>
-          <a:p>
-            <a:r>
-              <a:rPr kumimoji="0" lang="ru-RU" smtClean="0"/>
-              <a:t>Образец заголовка</a:t>
-            </a:r>
+        <p:style>
+          <a:lnRef idx="2">
+            <a:schemeClr val="accent1"/>
+          </a:lnRef>
+          <a:fillRef idx="1">
+            <a:schemeClr val="accent1"/>
+          </a:fillRef>
+          <a:effectRef idx="0">
+            <a:schemeClr val="accent1"/>
+          </a:effectRef>
+          <a:fontRef idx="minor">
+            <a:schemeClr val="lt1"/>
+          </a:fontRef>
+        </p:style>
+        <p:txBody>
+          <a:bodyPr rtlCol="0" anchor="ctr"/>
+          <a:lstStyle>
+            <a:extLst/>
+          </a:lstStyle>
+          <a:p>
+            <a:pPr algn="ctr" eaLnBrk="1" latinLnBrk="0" hangingPunct="1"/>
             <a:endParaRPr kumimoji="0" lang="en-US"/>
           </a:p>
         </p:txBody>
       </p:sp>
       <p:sp>
         <p:nvSpPr>
-          <p:cNvPr id="13" name="Текст 12"/>
-          <p:cNvSpPr>
-            <a:spLocks noGrp="1"/>
-          </p:cNvSpPr>
-          <p:nvPr>
-            <p:ph type="body" idx="1"/>
-          </p:nvPr>
-        </p:nvSpPr>
-        <p:spPr>
+          <p:cNvPr id="9" name="Прямоугольник 8"/>
+          <p:cNvSpPr/>
+          <p:nvPr/>
+        </p:nvSpPr>
+        <p:spPr bwMode="invGray">
           <a:xfrm>
-            <a:off x="457200" y="1600200"/>
-            <a:ext cx="8229600" cy="4709160"/>
+            <a:off x="2855737" y="0"/>
+            <a:ext cx="45720" cy="6858000"/>
           </a:xfrm>
           <a:prstGeom prst="rect">
             <a:avLst/>
           </a:prstGeom>
+          <a:solidFill>
+            <a:srgbClr val="FFFFFF"/>
+          </a:solidFill>
+          <a:ln w="48000" cap="flat" cmpd="thickThin" algn="ctr">
+            <a:noFill/>
+            <a:prstDash val="solid"/>
+          </a:ln>
         </p:spPr>
-        <p:txBody>
-          <a:bodyPr vert="horz">
-            <a:normAutofit/>
-          </a:bodyPr>
-          <a:lstStyle/>
-          <a:p>
-            <a:pPr lvl="0" eaLnBrk="1" latinLnBrk="0" hangingPunct="1"/>
-            <a:r>
-              <a:rPr kumimoji="0" lang="ru-RU" smtClean="0"/>
-              <a:t>Образец текста</a:t>
-            </a:r>
-          </a:p>
-          <a:p>
-            <a:pPr lvl="1" eaLnBrk="1" latinLnBrk="0" hangingPunct="1"/>
-            <a:r>
-              <a:rPr kumimoji="0" lang="ru-RU" smtClean="0"/>
-              <a:t>Второй уровень</a:t>
-            </a:r>
-          </a:p>
-          <a:p>
-            <a:pPr lvl="2" eaLnBrk="1" latinLnBrk="0" hangingPunct="1"/>
-            <a:r>
-              <a:rPr kumimoji="0" lang="ru-RU" smtClean="0"/>
-              <a:t>Третий уровень</a:t>
-            </a:r>
-          </a:p>
-          <a:p>
-            <a:pPr lvl="3" eaLnBrk="1" latinLnBrk="0" hangingPunct="1"/>
-            <a:r>
-              <a:rPr kumimoji="0" lang="ru-RU" smtClean="0"/>
-              <a:t>Четвертый уровень</a:t>
-            </a:r>
-          </a:p>
-          <a:p>
-            <a:pPr lvl="4" eaLnBrk="1" latinLnBrk="0" hangingPunct="1"/>
-            <a:r>
-              <a:rPr kumimoji="0" lang="ru-RU" smtClean="0"/>
-              <a:t>Пятый уровень</a:t>
-            </a:r>
+        <p:style>
+          <a:lnRef idx="2">
+            <a:schemeClr val="accent1"/>
+          </a:lnRef>
+          <a:fillRef idx="1">
+            <a:schemeClr val="accent1"/>
+          </a:fillRef>
+          <a:effectRef idx="0">
+            <a:schemeClr val="accent1"/>
+          </a:effectRef>
+          <a:fontRef idx="minor">
+            <a:schemeClr val="lt1"/>
+          </a:fontRef>
+        </p:style>
+        <p:txBody>
+          <a:bodyPr rtlCol="0" anchor="ctr"/>
+          <a:lstStyle>
+            <a:extLst/>
+          </a:lstStyle>
+          <a:p>
+            <a:pPr algn="ctr" eaLnBrk="1" latinLnBrk="0" hangingPunct="1"/>
             <a:endParaRPr kumimoji="0" lang="en-US"/>
           </a:p>
         </p:txBody>
       </p:sp>
       <p:sp>
         <p:nvSpPr>
-          <p:cNvPr id="14" name="Дата 13"/>
-          <p:cNvSpPr>
-            <a:spLocks noGrp="1"/>
-          </p:cNvSpPr>
-          <p:nvPr>
-            <p:ph type="dt" sz="half" idx="2"/>
+          <p:cNvPr id="6" name="Нижний колонтитул 5"/>
+          <p:cNvSpPr>
+            <a:spLocks noGrp="1"/>
+          </p:cNvSpPr>
+          <p:nvPr>
+            <p:ph type="ftr" sz="quarter" idx="11"/>
           </p:nvPr>
         </p:nvSpPr>
         <p:spPr>
           <a:xfrm>
-            <a:off x="457200" y="6416675"/>
-            <a:ext cx="2133600" cy="365125"/>
+            <a:off x="3035808" y="1170432"/>
+            <a:ext cx="5193792" cy="201168"/>
           </a:xfrm>
-          <a:prstGeom prst="rect">
-            <a:avLst/>
-          </a:prstGeom>
         </p:spPr>
         <p:txBody>
-          <a:bodyPr vert="horz" anchor="b"/>
+          <a:bodyPr/>
           <a:lstStyle>
-            <a:lvl1pPr algn="l" eaLnBrk="1" latinLnBrk="0" hangingPunct="1">
-              <a:defRPr kumimoji="0" sz="1200">
+            <a:lvl1pPr>
+              <a:defRPr>
                 <a:solidFill>
-                  <a:schemeClr val="tx1">
+                  <a:schemeClr val="bg1">
                     <a:shade val="50000"/>
                   </a:schemeClr>
                 </a:solidFill>
@@ -2629,83 +3105,391 @@
             </a:lvl1pPr>
           </a:lstStyle>
           <a:p>
-            <a:fld id="{5B106E36-FD25-4E2D-B0AA-010F637433A0}" type="datetimeFigureOut">
+            <a:endParaRPr lang="ru-RU"/>
+          </a:p>
+        </p:txBody>
+      </p:sp>
+      <p:sp>
+        <p:nvSpPr>
+          <p:cNvPr id="7" name="Номер слайда 6"/>
+          <p:cNvSpPr>
+            <a:spLocks noGrp="1"/>
+          </p:cNvSpPr>
+          <p:nvPr>
+            <p:ph type="sldNum" sz="quarter" idx="12"/>
+          </p:nvPr>
+        </p:nvSpPr>
+        <p:spPr>
+          <a:xfrm>
+            <a:off x="8339328" y="1170432"/>
+            <a:ext cx="733864" cy="201168"/>
+          </a:xfrm>
+        </p:spPr>
+        <p:txBody>
+          <a:bodyPr/>
+          <a:lstStyle/>
+          <a:p>
+            <a:fld id="{725C68B6-61C2-468F-89AB-4B9F7531AA68}" type="slidenum">
               <a:rPr lang="ru-RU" smtClean="0"/>
               <a:pPr/>
-              <a:t>28.02.2023</a:t>
+              <a:t>‹#›</a:t>
             </a:fld>
             <a:endParaRPr lang="ru-RU"/>
           </a:p>
         </p:txBody>
       </p:sp>
-      <p:sp>
-        <p:nvSpPr>
-          <p:cNvPr id="3" name="Нижний колонтитул 2"/>
-          <p:cNvSpPr>
-            <a:spLocks noGrp="1"/>
-          </p:cNvSpPr>
-          <p:nvPr>
-            <p:ph type="ftr" sz="quarter" idx="3"/>
+    </p:spTree>
+  </p:cSld>
+  <p:clrMapOvr>
+    <a:overrideClrMapping bg1="lt1" tx1="dk1" bg2="lt2" tx2="dk2" accent1="accent1" accent2="accent2" accent3="accent3" accent4="accent4" accent5="accent5" accent6="accent6" hlink="hlink" folHlink="folHlink"/>
+  </p:clrMapOvr>
+</p:sldLayout>
+</file>
+
+<file path=ppt/slideMasters/slideMaster1.xml><?xml version="1.0" encoding="utf-8"?>
+<p:sldMaster xmlns:a="http://schemas.openxmlformats.org/drawingml/2006/main" xmlns:r="http://schemas.openxmlformats.org/officeDocument/2006/relationships" xmlns:p="http://schemas.openxmlformats.org/presentationml/2006/main">
+  <p:cSld>
+    <p:bg>
+      <p:bgRef idx="1001">
+        <a:schemeClr val="bg1"/>
+      </p:bgRef>
+    </p:bg>
+    <p:spTree>
+      <p:nvGrpSpPr>
+        <p:cNvPr id="1" name=""/>
+        <p:cNvGrpSpPr/>
+        <p:nvPr/>
+      </p:nvGrpSpPr>
+      <p:grpSpPr>
+        <a:xfrm>
+          <a:off x="0" y="0"/>
+          <a:ext cx="0" cy="0"/>
+          <a:chOff x="0" y="0"/>
+          <a:chExt cx="0" cy="0"/>
+        </a:xfrm>
+      </p:grpSpPr>
+      <p:sp>
+        <p:nvSpPr>
+          <p:cNvPr id="10" name="Прямоугольник 9"/>
+          <p:cNvSpPr/>
+          <p:nvPr/>
+        </p:nvSpPr>
+        <p:spPr bwMode="invGray">
+          <a:xfrm>
+            <a:off x="0" y="1435895"/>
+            <a:ext cx="9144000" cy="45720"/>
+          </a:xfrm>
+          <a:prstGeom prst="rect">
+            <a:avLst/>
+          </a:prstGeom>
+          <a:solidFill>
+            <a:srgbClr val="FFFFFF"/>
+          </a:solidFill>
+          <a:ln w="48000" cap="flat" cmpd="thickThin" algn="ctr">
+            <a:noFill/>
+            <a:prstDash val="solid"/>
+          </a:ln>
+          <a:effectLst>
+            <a:outerShdw blurRad="31750" dist="10160" dir="5400000" algn="tl" rotWithShape="0">
+              <a:srgbClr val="000000">
+                <a:alpha val="60000"/>
+              </a:srgbClr>
+            </a:outerShdw>
+          </a:effectLst>
+        </p:spPr>
+        <p:style>
+          <a:lnRef idx="2">
+            <a:schemeClr val="accent1"/>
+          </a:lnRef>
+          <a:fillRef idx="1">
+            <a:schemeClr val="accent1"/>
+          </a:fillRef>
+          <a:effectRef idx="0">
+            <a:schemeClr val="accent1"/>
+          </a:effectRef>
+          <a:fontRef idx="minor">
+            <a:schemeClr val="lt1"/>
+          </a:fontRef>
+        </p:style>
+        <p:txBody>
+          <a:bodyPr rtlCol="0" anchor="ctr"/>
+          <a:lstStyle>
+            <a:extLst/>
+          </a:lstStyle>
+          <a:p>
+            <a:pPr algn="ctr" eaLnBrk="1" latinLnBrk="0" hangingPunct="1"/>
+            <a:endParaRPr kumimoji="0" lang="en-US"/>
+          </a:p>
+        </p:txBody>
+      </p:sp>
+      <p:sp>
+        <p:nvSpPr>
+          <p:cNvPr id="7" name="Прямоугольник 6"/>
+          <p:cNvSpPr/>
+          <p:nvPr/>
+        </p:nvSpPr>
+        <p:spPr bwMode="ltGray">
+          <a:xfrm>
+            <a:off x="0" y="0"/>
+            <a:ext cx="9143999" cy="1433733"/>
+          </a:xfrm>
+          <a:prstGeom prst="rect">
+            <a:avLst/>
+          </a:prstGeom>
+          <a:solidFill>
+            <a:srgbClr val="000000"/>
+          </a:solidFill>
+          <a:ln w="48000" cap="flat" cmpd="thickThin" algn="ctr">
+            <a:noFill/>
+            <a:prstDash val="solid"/>
+          </a:ln>
+        </p:spPr>
+        <p:style>
+          <a:lnRef idx="2">
+            <a:schemeClr val="accent1"/>
+          </a:lnRef>
+          <a:fillRef idx="1">
+            <a:schemeClr val="accent1"/>
+          </a:fillRef>
+          <a:effectRef idx="0">
+            <a:schemeClr val="accent1"/>
+          </a:effectRef>
+          <a:fontRef idx="minor">
+            <a:schemeClr val="lt1"/>
+          </a:fontRef>
+        </p:style>
+        <p:txBody>
+          <a:bodyPr rtlCol="0" anchor="ctr"/>
+          <a:lstStyle>
+            <a:extLst/>
+          </a:lstStyle>
+          <a:p>
+            <a:pPr algn="ctr" eaLnBrk="1" latinLnBrk="0" hangingPunct="1"/>
+            <a:endParaRPr kumimoji="0" lang="en-US"/>
+          </a:p>
+        </p:txBody>
+      </p:sp>
+      <p:sp>
+        <p:nvSpPr>
+          <p:cNvPr id="2" name="Заголовок 1"/>
+          <p:cNvSpPr>
+            <a:spLocks noGrp="1"/>
+          </p:cNvSpPr>
+          <p:nvPr>
+            <p:ph type="title"/>
           </p:nvPr>
         </p:nvSpPr>
         <p:spPr>
           <a:xfrm>
-            <a:off x="3124200" y="6416675"/>
-            <a:ext cx="2895600" cy="365125"/>
+            <a:off x="457200" y="152400"/>
+            <a:ext cx="8229600" cy="1251062"/>
           </a:xfrm>
           <a:prstGeom prst="rect">
             <a:avLst/>
           </a:prstGeom>
         </p:spPr>
         <p:txBody>
-          <a:bodyPr vert="horz" anchor="b"/>
+          <a:bodyPr vert="horz" lIns="91440" rIns="45720" rtlCol="0" anchor="ctr">
+            <a:normAutofit/>
+            <a:scene3d>
+              <a:camera prst="orthographicFront"/>
+              <a:lightRig rig="threePt" dir="t">
+                <a:rot lat="0" lon="0" rev="4800000"/>
+              </a:lightRig>
+            </a:scene3d>
+            <a:sp3d prstMaterial="matte">
+              <a:bevelT w="50800" h="10160"/>
+            </a:sp3d>
+          </a:bodyPr>
           <a:lstStyle>
-            <a:lvl1pPr algn="ctr" eaLnBrk="1" latinLnBrk="0" hangingPunct="1">
-              <a:defRPr kumimoji="0" sz="1200">
-                <a:solidFill>
-                  <a:schemeClr val="tx1">
-                    <a:shade val="50000"/>
-                  </a:schemeClr>
-                </a:solidFill>
-              </a:defRPr>
-            </a:lvl1pPr>
+            <a:extLst/>
           </a:lstStyle>
           <a:p>
-            <a:endParaRPr lang="ru-RU"/>
-          </a:p>
-        </p:txBody>
-      </p:sp>
-      <p:sp>
-        <p:nvSpPr>
-          <p:cNvPr id="23" name="Номер слайда 22"/>
-          <p:cNvSpPr>
-            <a:spLocks noGrp="1"/>
-          </p:cNvSpPr>
-          <p:nvPr>
-            <p:ph type="sldNum" sz="quarter" idx="4"/>
+            <a:r>
+              <a:rPr kumimoji="0" lang="ru-RU" smtClean="0"/>
+              <a:t>Образец заголовка</a:t>
+            </a:r>
+            <a:endParaRPr kumimoji="0" lang="en-US"/>
+          </a:p>
+        </p:txBody>
+      </p:sp>
+      <p:sp>
+        <p:nvSpPr>
+          <p:cNvPr id="3" name="Текст 2"/>
+          <p:cNvSpPr>
+            <a:spLocks noGrp="1"/>
+          </p:cNvSpPr>
+          <p:nvPr>
+            <p:ph type="body" idx="1"/>
           </p:nvPr>
         </p:nvSpPr>
         <p:spPr>
           <a:xfrm>
-            <a:off x="7924800" y="6416675"/>
-            <a:ext cx="762000" cy="365125"/>
+            <a:off x="457200" y="1775191"/>
+            <a:ext cx="8229600" cy="4625609"/>
           </a:xfrm>
           <a:prstGeom prst="rect">
             <a:avLst/>
           </a:prstGeom>
         </p:spPr>
         <p:txBody>
-          <a:bodyPr vert="horz" lIns="0" rIns="0" anchor="b"/>
+          <a:bodyPr vert="horz" lIns="54864" tIns="91440" rtlCol="0">
+            <a:normAutofit/>
+          </a:bodyPr>
+          <a:lstStyle>
+            <a:extLst/>
+          </a:lstStyle>
+          <a:p>
+            <a:pPr lvl="0" eaLnBrk="1" latinLnBrk="0" hangingPunct="1"/>
+            <a:r>
+              <a:rPr kumimoji="0" lang="ru-RU" smtClean="0"/>
+              <a:t>Образец текста</a:t>
+            </a:r>
+          </a:p>
+          <a:p>
+            <a:pPr lvl="1" eaLnBrk="1" latinLnBrk="0" hangingPunct="1"/>
+            <a:r>
+              <a:rPr kumimoji="0" lang="ru-RU" smtClean="0"/>
+              <a:t>Второй уровень</a:t>
+            </a:r>
+          </a:p>
+          <a:p>
+            <a:pPr lvl="2" eaLnBrk="1" latinLnBrk="0" hangingPunct="1"/>
+            <a:r>
+              <a:rPr kumimoji="0" lang="ru-RU" smtClean="0"/>
+              <a:t>Третий уровень</a:t>
+            </a:r>
+          </a:p>
+          <a:p>
+            <a:pPr lvl="3" eaLnBrk="1" latinLnBrk="0" hangingPunct="1"/>
+            <a:r>
+              <a:rPr kumimoji="0" lang="ru-RU" smtClean="0"/>
+              <a:t>Четвертый уровень</a:t>
+            </a:r>
+          </a:p>
+          <a:p>
+            <a:pPr lvl="4" eaLnBrk="1" latinLnBrk="0" hangingPunct="1"/>
+            <a:r>
+              <a:rPr kumimoji="0" lang="ru-RU" smtClean="0"/>
+              <a:t>Пятый уровень</a:t>
+            </a:r>
+            <a:endParaRPr kumimoji="0" lang="en-US"/>
+          </a:p>
+        </p:txBody>
+      </p:sp>
+      <p:sp>
+        <p:nvSpPr>
+          <p:cNvPr id="4" name="Дата 3"/>
+          <p:cNvSpPr>
+            <a:spLocks noGrp="1"/>
+          </p:cNvSpPr>
+          <p:nvPr>
+            <p:ph type="dt" sz="half" idx="2"/>
+          </p:nvPr>
+        </p:nvSpPr>
+        <p:spPr>
+          <a:xfrm>
+            <a:off x="457200" y="6476999"/>
+            <a:ext cx="2133600" cy="274320"/>
+          </a:xfrm>
+          <a:prstGeom prst="rect">
+            <a:avLst/>
+          </a:prstGeom>
+        </p:spPr>
+        <p:txBody>
+          <a:bodyPr vert="horz" lIns="109728" rIns="45720" bIns="0" rtlCol="0" anchor="b"/>
+          <a:lstStyle>
+            <a:lvl1pPr algn="l" eaLnBrk="1" latinLnBrk="0" hangingPunct="1">
+              <a:defRPr kumimoji="0" sz="1200">
+                <a:solidFill>
+                  <a:schemeClr val="tx1">
+                    <a:tint val="95000"/>
+                  </a:schemeClr>
+                </a:solidFill>
+              </a:defRPr>
+            </a:lvl1pPr>
+            <a:extLst/>
+          </a:lstStyle>
+          <a:p>
+            <a:fld id="{5B106E36-FD25-4E2D-B0AA-010F637433A0}" type="datetimeFigureOut">
+              <a:rPr lang="ru-RU" smtClean="0"/>
+              <a:pPr/>
+              <a:t>28.02.2023</a:t>
+            </a:fld>
+            <a:endParaRPr lang="ru-RU"/>
+          </a:p>
+        </p:txBody>
+      </p:sp>
+      <p:sp>
+        <p:nvSpPr>
+          <p:cNvPr id="5" name="Нижний колонтитул 4"/>
+          <p:cNvSpPr>
+            <a:spLocks noGrp="1"/>
+          </p:cNvSpPr>
+          <p:nvPr>
+            <p:ph type="ftr" sz="quarter" idx="3"/>
+          </p:nvPr>
+        </p:nvSpPr>
+        <p:spPr>
+          <a:xfrm>
+            <a:off x="2640596" y="6476999"/>
+            <a:ext cx="5507719" cy="274320"/>
+          </a:xfrm>
+          <a:prstGeom prst="rect">
+            <a:avLst/>
+          </a:prstGeom>
+        </p:spPr>
+        <p:txBody>
+          <a:bodyPr vert="horz" lIns="45720" rIns="45720" bIns="0" rtlCol="0" anchor="b"/>
+          <a:lstStyle>
+            <a:lvl1pPr algn="l" eaLnBrk="1" latinLnBrk="0" hangingPunct="1">
+              <a:defRPr kumimoji="0" sz="1200">
+                <a:solidFill>
+                  <a:schemeClr val="tx1">
+                    <a:tint val="95000"/>
+                  </a:schemeClr>
+                </a:solidFill>
+              </a:defRPr>
+            </a:lvl1pPr>
+            <a:extLst/>
+          </a:lstStyle>
+          <a:p>
+            <a:endParaRPr lang="ru-RU"/>
+          </a:p>
+        </p:txBody>
+      </p:sp>
+      <p:sp>
+        <p:nvSpPr>
+          <p:cNvPr id="6" name="Номер слайда 5"/>
+          <p:cNvSpPr>
+            <a:spLocks noGrp="1"/>
+          </p:cNvSpPr>
+          <p:nvPr>
+            <p:ph type="sldNum" sz="quarter" idx="4"/>
+          </p:nvPr>
+        </p:nvSpPr>
+        <p:spPr>
+          <a:xfrm>
+            <a:off x="8204396" y="6476999"/>
+            <a:ext cx="733864" cy="274320"/>
+          </a:xfrm>
+          <a:prstGeom prst="rect">
+            <a:avLst/>
+          </a:prstGeom>
+        </p:spPr>
+        <p:txBody>
+          <a:bodyPr vert="horz" bIns="0" rtlCol="0" anchor="b"/>
           <a:lstStyle>
             <a:lvl1pPr algn="r" eaLnBrk="1" latinLnBrk="0" hangingPunct="1">
               <a:defRPr kumimoji="0" sz="1200">
                 <a:solidFill>
                   <a:schemeClr val="tx1">
-                    <a:shade val="50000"/>
+                    <a:tint val="95000"/>
                   </a:schemeClr>
                 </a:solidFill>
               </a:defRPr>
             </a:lvl1pPr>
+            <a:extLst/>
           </a:lstStyle>
           <a:p>
             <a:fld id="{725C68B6-61C2-468F-89AB-4B9F7531AA68}" type="slidenum">
@@ -2719,80 +3503,71 @@
       </p:sp>
     </p:spTree>
   </p:cSld>
-  <p:clrMap bg1="dk1" tx1="lt1" bg2="dk2" tx2="lt2" accent1="accent1" accent2="accent2" accent3="accent3" accent4="accent4" accent5="accent5" accent6="accent6" hlink="hlink" folHlink="folHlink"/>
+  <p:clrMap bg1="lt1" tx1="dk1" bg2="lt2" tx2="dk2" accent1="accent1" accent2="accent2" accent3="accent3" accent4="accent4" accent5="accent5" accent6="accent6" hlink="hlink" folHlink="folHlink"/>
   <p:sldLayoutIdLst>
-    <p:sldLayoutId id="2147483661" r:id="rId1"/>
-    <p:sldLayoutId id="2147483662" r:id="rId2"/>
-    <p:sldLayoutId id="2147483663" r:id="rId3"/>
-    <p:sldLayoutId id="2147483664" r:id="rId4"/>
-    <p:sldLayoutId id="2147483665" r:id="rId5"/>
-    <p:sldLayoutId id="2147483666" r:id="rId6"/>
-    <p:sldLayoutId id="2147483667" r:id="rId7"/>
-    <p:sldLayoutId id="2147483668" r:id="rId8"/>
-    <p:sldLayoutId id="2147483669" r:id="rId9"/>
-    <p:sldLayoutId id="2147483670" r:id="rId10"/>
-    <p:sldLayoutId id="2147483671" r:id="rId11"/>
+    <p:sldLayoutId id="2147483673" r:id="rId1"/>
+    <p:sldLayoutId id="2147483674" r:id="rId2"/>
+    <p:sldLayoutId id="2147483675" r:id="rId3"/>
+    <p:sldLayoutId id="2147483676" r:id="rId4"/>
+    <p:sldLayoutId id="2147483677" r:id="rId5"/>
+    <p:sldLayoutId id="2147483678" r:id="rId6"/>
+    <p:sldLayoutId id="2147483679" r:id="rId7"/>
+    <p:sldLayoutId id="2147483680" r:id="rId8"/>
+    <p:sldLayoutId id="2147483681" r:id="rId9"/>
+    <p:sldLayoutId id="2147483682" r:id="rId10"/>
+    <p:sldLayoutId id="2147483683" r:id="rId11"/>
   </p:sldLayoutIdLst>
   <p:txStyles>
     <p:titleStyle>
-      <a:lvl1pPr algn="ctr" rtl="0" eaLnBrk="1" latinLnBrk="0" hangingPunct="1">
+      <a:lvl1pPr algn="l" rtl="0" eaLnBrk="1" latinLnBrk="0" hangingPunct="1">
         <a:spcBef>
           <a:spcPct val="0"/>
         </a:spcBef>
         <a:buNone/>
-        <a:defRPr kumimoji="0" sz="4100" b="1" kern="1200" cap="none" baseline="0">
-          <a:ln w="6350">
-            <a:noFill/>
-          </a:ln>
-          <a:gradFill>
-            <a:gsLst>
-              <a:gs pos="0">
-                <a:schemeClr val="accent1">
-                  <a:tint val="73000"/>
-                  <a:satMod val="145000"/>
-                </a:schemeClr>
-              </a:gs>
-              <a:gs pos="73000">
-                <a:schemeClr val="accent1">
-                  <a:tint val="73000"/>
-                  <a:satMod val="145000"/>
-                </a:schemeClr>
-              </a:gs>
-              <a:gs pos="100000">
-                <a:schemeClr val="accent1">
-                  <a:tint val="83000"/>
-                  <a:satMod val="143000"/>
-                </a:schemeClr>
-              </a:gs>
-            </a:gsLst>
-            <a:lin ang="4800000" scaled="1"/>
-          </a:gradFill>
-          <a:effectLst>
-            <a:outerShdw blurRad="114300" dist="101600" dir="2700000" algn="tl" rotWithShape="0">
-              <a:srgbClr val="000000">
-                <a:alpha val="40000"/>
-              </a:srgbClr>
-            </a:outerShdw>
-          </a:effectLst>
+        <a:defRPr kumimoji="0" sz="4500" b="1" kern="1200">
+          <a:solidFill>
+            <a:schemeClr val="accent1">
+              <a:satMod val="150000"/>
+            </a:schemeClr>
+          </a:solidFill>
+          <a:effectLst/>
           <a:latin typeface="+mj-lt"/>
           <a:ea typeface="+mj-ea"/>
           <a:cs typeface="+mj-cs"/>
         </a:defRPr>
       </a:lvl1pPr>
+      <a:extLst/>
     </p:titleStyle>
     <p:bodyStyle>
-      <a:lvl1pPr marL="548640" indent="-411480" algn="l" rtl="0" eaLnBrk="1" latinLnBrk="0" hangingPunct="1">
+      <a:lvl1pPr marL="438912" indent="-320040" algn="l" rtl="0" eaLnBrk="1" latinLnBrk="0" hangingPunct="1">
+        <a:spcBef>
+          <a:spcPts val="0"/>
+        </a:spcBef>
+        <a:buClr>
+          <a:schemeClr val="accent1"/>
+        </a:buClr>
+        <a:buSzPct val="80000"/>
+        <a:buFont typeface="Wingdings 2"/>
+        <a:buChar char=""/>
+        <a:defRPr kumimoji="0" sz="3200" kern="1200">
+          <a:solidFill>
+            <a:schemeClr val="tx1"/>
+          </a:solidFill>
+          <a:latin typeface="+mn-lt"/>
+          <a:ea typeface="+mn-ea"/>
+          <a:cs typeface="+mn-cs"/>
+        </a:defRPr>
+      </a:lvl1pPr>
+      <a:lvl2pPr marL="731520" indent="-274320" algn="l" rtl="0" eaLnBrk="1" latinLnBrk="0" hangingPunct="1">
         <a:spcBef>
           <a:spcPct val="20000"/>
         </a:spcBef>
         <a:buClr>
-          <a:schemeClr val="tx1">
-            <a:shade val="95000"/>
-          </a:schemeClr>
+          <a:schemeClr val="accent2"/>
         </a:buClr>
-        <a:buSzPct val="65000"/>
-        <a:buFont typeface="Wingdings 2"/>
-        <a:buChar char=""/>
+        <a:buSzPct val="90000"/>
+        <a:buFont typeface="Wingdings"/>
+        <a:buChar char=""/>
         <a:defRPr kumimoji="0" sz="2800" kern="1200">
           <a:solidFill>
             <a:schemeClr val="tx1"/>
@@ -2801,17 +3576,16 @@
           <a:ea typeface="+mn-ea"/>
           <a:cs typeface="+mn-cs"/>
         </a:defRPr>
-      </a:lvl1pPr>
-      <a:lvl2pPr marL="868680" indent="-283464" algn="l" rtl="0" eaLnBrk="1" latinLnBrk="0" hangingPunct="1">
+      </a:lvl2pPr>
+      <a:lvl3pPr marL="996696" indent="-228600" algn="l" rtl="0" eaLnBrk="1" latinLnBrk="0" hangingPunct="1">
         <a:spcBef>
           <a:spcPct val="20000"/>
         </a:spcBef>
         <a:buClr>
-          <a:schemeClr val="tx1"/>
+          <a:schemeClr val="accent3"/>
         </a:buClr>
-        <a:buSzPct val="80000"/>
-        <a:buFont typeface="Wingdings 2"/>
-        <a:buChar char=""/>
+        <a:buFont typeface="Arial"/>
+        <a:buChar char="▪"/>
         <a:defRPr kumimoji="0" sz="2400" kern="1200">
           <a:solidFill>
             <a:schemeClr val="tx1"/>
@@ -2820,36 +3594,16 @@
           <a:ea typeface="+mn-ea"/>
           <a:cs typeface="+mn-cs"/>
         </a:defRPr>
-      </a:lvl2pPr>
-      <a:lvl3pPr marL="1133856" indent="-228600" algn="l" rtl="0" eaLnBrk="1" latinLnBrk="0" hangingPunct="1">
+      </a:lvl3pPr>
+      <a:lvl4pPr marL="1216152" indent="-182880" algn="l" rtl="0" eaLnBrk="1" latinLnBrk="0" hangingPunct="1">
         <a:spcBef>
           <a:spcPct val="20000"/>
         </a:spcBef>
         <a:buClr>
-          <a:schemeClr val="tx1"/>
+          <a:schemeClr val="accent4"/>
         </a:buClr>
-        <a:buSzPct val="95000"/>
-        <a:buFont typeface="Wingdings"/>
-        <a:buChar char=""/>
-        <a:defRPr kumimoji="0" sz="2200" kern="1200">
-          <a:solidFill>
-            <a:schemeClr val="tx1"/>
-          </a:solidFill>
-          <a:latin typeface="+mn-lt"/>
-          <a:ea typeface="+mn-ea"/>
-          <a:cs typeface="+mn-cs"/>
-        </a:defRPr>
-      </a:lvl3pPr>
-      <a:lvl4pPr marL="1353312" indent="-182880" algn="l" rtl="0" eaLnBrk="1" latinLnBrk="0" hangingPunct="1">
-        <a:spcBef>
-          <a:spcPct val="20000"/>
-        </a:spcBef>
-        <a:buClr>
-          <a:schemeClr val="tx1"/>
-        </a:buClr>
-        <a:buSzPct val="100000"/>
-        <a:buFont typeface="Wingdings 3"/>
-        <a:buChar char=""/>
+        <a:buFont typeface="Arial"/>
+        <a:buChar char="▪"/>
         <a:defRPr kumimoji="0" sz="2000" kern="1200">
           <a:solidFill>
             <a:schemeClr val="tx1"/>
@@ -2859,15 +3613,34 @@
           <a:cs typeface="+mn-cs"/>
         </a:defRPr>
       </a:lvl4pPr>
-      <a:lvl5pPr marL="1545336" indent="-182880" algn="l" rtl="0" eaLnBrk="1" latinLnBrk="0" hangingPunct="1">
+      <a:lvl5pPr marL="1426464" indent="-182880" algn="l" rtl="0" eaLnBrk="1" latinLnBrk="0" hangingPunct="1">
         <a:spcBef>
           <a:spcPct val="20000"/>
         </a:spcBef>
         <a:buClr>
-          <a:schemeClr val="tx1"/>
+          <a:schemeClr val="accent5"/>
         </a:buClr>
+        <a:buFont typeface="Wingdings 3"/>
+        <a:buChar char=""/>
+        <a:defRPr kumimoji="0" lang="en-US" sz="2000" kern="1200" smtClean="0">
+          <a:solidFill>
+            <a:schemeClr val="tx1"/>
+          </a:solidFill>
+          <a:latin typeface="+mn-lt"/>
+          <a:ea typeface="+mn-ea"/>
+          <a:cs typeface="+mn-cs"/>
+        </a:defRPr>
+      </a:lvl5pPr>
+      <a:lvl6pPr marL="1627632" indent="-182880" algn="l" rtl="0" eaLnBrk="1" latinLnBrk="0" hangingPunct="1">
+        <a:spcBef>
+          <a:spcPct val="20000"/>
+        </a:spcBef>
+        <a:buClr>
+          <a:schemeClr val="accent6"/>
+        </a:buClr>
+        <a:buSzPct val="100000"/>
         <a:buFont typeface="Wingdings 2"/>
-        <a:buChar char=""/>
+        <a:buChar char=""/>
         <a:defRPr kumimoji="0" sz="2000" kern="1200">
           <a:solidFill>
             <a:schemeClr val="tx1"/>
@@ -2876,16 +3649,17 @@
           <a:ea typeface="+mn-ea"/>
           <a:cs typeface="+mn-cs"/>
         </a:defRPr>
-      </a:lvl5pPr>
-      <a:lvl6pPr marL="1764792" indent="-182880" algn="l" rtl="0" eaLnBrk="1" latinLnBrk="0" hangingPunct="1">
+      </a:lvl6pPr>
+      <a:lvl7pPr marL="1828800" indent="-182880" algn="l" rtl="0" eaLnBrk="1" latinLnBrk="0" hangingPunct="1">
         <a:spcBef>
           <a:spcPct val="20000"/>
         </a:spcBef>
         <a:buClr>
-          <a:schemeClr val="tx1"/>
+          <a:schemeClr val="accent1"/>
         </a:buClr>
-        <a:buFont typeface="Wingdings 3"/>
-        <a:buChar char=""/>
+        <a:buSzPct val="100000"/>
+        <a:buFont typeface="Wingdings 2"/>
+        <a:buChar char=""/>
         <a:defRPr kumimoji="0" sz="1800" kern="1200">
           <a:solidFill>
             <a:schemeClr val="tx1"/>
@@ -2894,35 +3668,17 @@
           <a:ea typeface="+mn-ea"/>
           <a:cs typeface="+mn-cs"/>
         </a:defRPr>
-      </a:lvl6pPr>
-      <a:lvl7pPr marL="1965960" indent="-182880" algn="l" rtl="0" eaLnBrk="1" latinLnBrk="0" hangingPunct="1">
+      </a:lvl7pPr>
+      <a:lvl8pPr marL="2029968" indent="-182880" algn="l" rtl="0" eaLnBrk="1" latinLnBrk="0" hangingPunct="1">
         <a:spcBef>
           <a:spcPct val="20000"/>
         </a:spcBef>
         <a:buClr>
-          <a:schemeClr val="tx1"/>
+          <a:schemeClr val="accent2"/>
         </a:buClr>
-        <a:buFont typeface="Wingdings 2"/>
+        <a:buFont typeface="Wingdings 2" pitchFamily="18" charset="2"/>
         <a:buChar char=""/>
-        <a:defRPr kumimoji="0" sz="1600" kern="1200">
-          <a:solidFill>
-            <a:schemeClr val="tx1"/>
-          </a:solidFill>
-          <a:latin typeface="+mn-lt"/>
-          <a:ea typeface="+mn-ea"/>
-          <a:cs typeface="+mn-cs"/>
-        </a:defRPr>
-      </a:lvl7pPr>
-      <a:lvl8pPr marL="2167128" indent="-182880" algn="l" rtl="0" eaLnBrk="1" latinLnBrk="0" hangingPunct="1">
-        <a:spcBef>
-          <a:spcPct val="20000"/>
-        </a:spcBef>
-        <a:buClr>
-          <a:schemeClr val="tx1"/>
-        </a:buClr>
-        <a:buFont typeface="Wingdings 2"/>
-        <a:buChar char=""/>
-        <a:defRPr kumimoji="0" sz="1400" kern="1200">
+        <a:defRPr kumimoji="0" sz="1800" kern="1200">
           <a:solidFill>
             <a:schemeClr val="tx1"/>
           </a:solidFill>
@@ -2931,16 +3687,16 @@
           <a:cs typeface="+mn-cs"/>
         </a:defRPr>
       </a:lvl8pPr>
-      <a:lvl9pPr marL="2368296" indent="-182880" algn="l" rtl="0" eaLnBrk="1" latinLnBrk="0" hangingPunct="1">
+      <a:lvl9pPr marL="2231136" indent="-182880" algn="l" rtl="0" eaLnBrk="1" latinLnBrk="0" hangingPunct="1">
         <a:spcBef>
           <a:spcPct val="20000"/>
         </a:spcBef>
         <a:buClr>
-          <a:schemeClr val="tx1"/>
+          <a:schemeClr val="accent3"/>
         </a:buClr>
-        <a:buFont typeface="Wingdings 2"/>
+        <a:buFont typeface="Wingdings 2" pitchFamily="18" charset="2"/>
         <a:buChar char=""/>
-        <a:defRPr kumimoji="0" sz="1400" kern="1200" baseline="0">
+        <a:defRPr kumimoji="0" sz="1800" kern="1200" baseline="0">
           <a:solidFill>
             <a:schemeClr val="tx1"/>
           </a:solidFill>
@@ -2949,6 +3705,7 @@
           <a:cs typeface="+mn-cs"/>
         </a:defRPr>
       </a:lvl9pPr>
+      <a:extLst/>
     </p:bodyStyle>
     <p:otherStyle>
       <a:lvl1pPr marL="0" algn="l" rtl="0" eaLnBrk="1" latinLnBrk="0" hangingPunct="1">
@@ -3041,6 +3798,7 @@
           <a:cs typeface="+mn-cs"/>
         </a:defRPr>
       </a:lvl9pPr>
+      <a:extLst/>
     </p:otherStyle>
   </p:txStyles>
 </p:sldMaster>
@@ -3097,7 +3855,11 @@
           <a:bodyPr/>
           <a:lstStyle/>
           <a:p>
-            <a:endParaRPr lang="ru-RU"/>
+            <a:r>
+              <a:rPr lang="en-US" dirty="0" err="1" smtClean="0"/>
+              <a:t>wdwd</a:t>
+            </a:r>
+            <a:endParaRPr lang="ru-RU" dirty="0"/>
           </a:p>
         </p:txBody>
       </p:sp>
@@ -3160,6 +3922,10 @@
           <a:bodyPr/>
           <a:lstStyle/>
           <a:p>
+            <a:r>
+              <a:rPr lang="en-US" smtClean="0"/>
+              <a:t>dgdg</a:t>
+            </a:r>
             <a:endParaRPr lang="ru-RU"/>
           </a:p>
         </p:txBody>
@@ -3173,9 +3939,9 @@
 </file>
 
 <file path=ppt/theme/theme1.xml><?xml version="1.0" encoding="utf-8"?>
-<a:theme xmlns:a="http://schemas.openxmlformats.org/drawingml/2006/main" name="Апекс">
+<a:theme xmlns:a="http://schemas.openxmlformats.org/drawingml/2006/main" name="Модульная">
   <a:themeElements>
-    <a:clrScheme name="Апекс">
+    <a:clrScheme name="Модульная">
       <a:dk1>
         <a:sysClr val="windowText" lastClr="000000"/>
       </a:dk1>
@@ -3183,50 +3949,48 @@
         <a:sysClr val="window" lastClr="FFFFFF"/>
       </a:lt1>
       <a:dk2>
-        <a:srgbClr val="69676D"/>
+        <a:srgbClr val="5A6378"/>
       </a:dk2>
       <a:lt2>
-        <a:srgbClr val="C9C2D1"/>
+        <a:srgbClr val="D4D4D6"/>
       </a:lt2>
       <a:accent1>
-        <a:srgbClr val="CEB966"/>
+        <a:srgbClr val="F0AD00"/>
       </a:accent1>
       <a:accent2>
-        <a:srgbClr val="9CB084"/>
+        <a:srgbClr val="60B5CC"/>
       </a:accent2>
       <a:accent3>
-        <a:srgbClr val="6BB1C9"/>
+        <a:srgbClr val="E66C7D"/>
       </a:accent3>
       <a:accent4>
-        <a:srgbClr val="6585CF"/>
+        <a:srgbClr val="6BB76D"/>
       </a:accent4>
       <a:accent5>
-        <a:srgbClr val="7E6BC9"/>
+        <a:srgbClr val="E88651"/>
       </a:accent5>
       <a:accent6>
-        <a:srgbClr val="A379BB"/>
+        <a:srgbClr val="C64847"/>
       </a:accent6>
       <a:hlink>
-        <a:srgbClr val="410082"/>
+        <a:srgbClr val="168BBA"/>
       </a:hlink>
       <a:folHlink>
-        <a:srgbClr val="932968"/>
+        <a:srgbClr val="680000"/>
       </a:folHlink>
     </a:clrScheme>
-    <a:fontScheme name="Апекс">
+    <a:fontScheme name="Модульная">
       <a:majorFont>
-        <a:latin typeface="Lucida Sans"/>
+        <a:latin typeface="Corbel"/>
         <a:ea typeface=""/>
         <a:cs typeface=""/>
-        <a:font script="Grek" typeface="Arial"/>
-        <a:font script="Cyrl" typeface="Arial"/>
-        <a:font script="Jpan" typeface="HG丸ｺﾞｼｯｸM-PRO"/>
-        <a:font script="Hang" typeface="휴먼옛체"/>
-        <a:font script="Hans" typeface="黑体"/>
-        <a:font script="Hant" typeface="微軟正黑體"/>
+        <a:font script="Jpan" typeface="HGｺﾞｼｯｸM"/>
+        <a:font script="Hang" typeface="HY엽서L"/>
+        <a:font script="Hans" typeface="华文楷体"/>
+        <a:font script="Hant" typeface="新細明體"/>
         <a:font script="Arab" typeface="Tahoma"/>
-        <a:font script="Hebr" typeface="Levenim MT"/>
-        <a:font script="Thai" typeface="FreesiaUPC"/>
+        <a:font script="Hebr" typeface="Miriam"/>
+        <a:font script="Thai" typeface="DilleniaUPC"/>
         <a:font script="Ethi" typeface="Nyala"/>
         <a:font script="Beng" typeface="Vrinda"/>
         <a:font script="Gujr" typeface="Shruti"/>
@@ -3247,26 +4011,24 @@
         <a:font script="Laoo" typeface="DokChampa"/>
         <a:font script="Sinh" typeface="Iskoola Pota"/>
         <a:font script="Mong" typeface="Mongolian Baiti"/>
-        <a:font script="Viet" typeface="Tahoma"/>
+        <a:font script="Viet" typeface="Arial"/>
         <a:font script="Uigh" typeface="Microsoft Uighur"/>
       </a:majorFont>
       <a:minorFont>
-        <a:latin typeface="Book Antiqua"/>
+        <a:latin typeface="Corbel"/>
         <a:ea typeface=""/>
         <a:cs typeface=""/>
-        <a:font script="Grek" typeface="Times New Roman"/>
-        <a:font script="Cyrl" typeface="Times New Roman"/>
-        <a:font script="Jpan" typeface="HG明朝B"/>
-        <a:font script="Hang" typeface="돋움"/>
-        <a:font script="Hans" typeface="宋体"/>
+        <a:font script="Jpan" typeface="HGｺﾞｼｯｸM"/>
+        <a:font script="Hang" typeface="HY엽서L"/>
+        <a:font script="Hans" typeface="华文楷体"/>
         <a:font script="Hant" typeface="新細明體"/>
-        <a:font script="Arab" typeface="Times New Roman"/>
-        <a:font script="Hebr" typeface="David"/>
-        <a:font script="Thai" typeface="EucrosiaUPC"/>
+        <a:font script="Arab" typeface="Tahoma"/>
+        <a:font script="Hebr" typeface="Miriam"/>
+        <a:font script="Thai" typeface="DilleniaUPC"/>
         <a:font script="Ethi" typeface="Nyala"/>
         <a:font script="Beng" typeface="Vrinda"/>
         <a:font script="Gujr" typeface="Shruti"/>
-        <a:font script="Khmr" typeface="MoolBoran"/>
+        <a:font script="Khmr" typeface="DaunPenh"/>
         <a:font script="Knda" typeface="Tunga"/>
         <a:font script="Guru" typeface="Raavi"/>
         <a:font script="Cans" typeface="Euphemia"/>
@@ -3283,88 +4045,79 @@
         <a:font script="Laoo" typeface="DokChampa"/>
         <a:font script="Sinh" typeface="Iskoola Pota"/>
         <a:font script="Mong" typeface="Mongolian Baiti"/>
-        <a:font script="Viet" typeface="Times New Roman"/>
+        <a:font script="Viet" typeface="Arial"/>
         <a:font script="Uigh" typeface="Microsoft Uighur"/>
       </a:minorFont>
     </a:fontScheme>
-    <a:fmtScheme name="Апекс">
+    <a:fmtScheme name="Модульная">
       <a:fillStyleLst>
         <a:solidFill>
           <a:schemeClr val="phClr"/>
         </a:solidFill>
         <a:gradFill rotWithShape="1">
           <a:gsLst>
-            <a:gs pos="20000">
+            <a:gs pos="0">
               <a:schemeClr val="phClr">
-                <a:tint val="9000"/>
+                <a:tint val="50000"/>
+                <a:satMod val="300000"/>
+              </a:schemeClr>
+            </a:gs>
+            <a:gs pos="35000">
+              <a:schemeClr val="phClr">
+                <a:tint val="37000"/>
+                <a:satMod val="300000"/>
               </a:schemeClr>
             </a:gs>
             <a:gs pos="100000">
               <a:schemeClr val="phClr">
-                <a:tint val="70000"/>
-                <a:satMod val="100000"/>
+                <a:tint val="15000"/>
+                <a:satMod val="350000"/>
               </a:schemeClr>
             </a:gs>
           </a:gsLst>
-          <a:path path="circle">
-            <a:fillToRect l="-15000" t="-15000" r="115000" b="115000"/>
-          </a:path>
+          <a:lin ang="16200000" scaled="1"/>
         </a:gradFill>
         <a:gradFill rotWithShape="1">
           <a:gsLst>
             <a:gs pos="0">
               <a:schemeClr val="phClr">
-                <a:shade val="60000"/>
+                <a:shade val="47500"/>
+                <a:satMod val="137000"/>
               </a:schemeClr>
             </a:gs>
-            <a:gs pos="33000">
+            <a:gs pos="55000">
               <a:schemeClr val="phClr">
-                <a:tint val="86500"/>
-              </a:schemeClr>
-            </a:gs>
-            <a:gs pos="46750">
-              <a:schemeClr val="phClr">
-                <a:tint val="71000"/>
-                <a:satMod val="112000"/>
-              </a:schemeClr>
-            </a:gs>
-            <a:gs pos="53000">
-              <a:schemeClr val="phClr">
-                <a:tint val="71000"/>
-                <a:satMod val="112000"/>
-              </a:schemeClr>
-            </a:gs>
-            <a:gs pos="68000">
-              <a:schemeClr val="phClr">
-                <a:tint val="86000"/>
+                <a:shade val="69000"/>
+                <a:satMod val="137000"/>
               </a:schemeClr>
             </a:gs>
             <a:gs pos="100000">
               <a:schemeClr val="phClr">
-                <a:shade val="60000"/>
+                <a:shade val="98000"/>
+                <a:satMod val="137000"/>
               </a:schemeClr>
             </a:gs>
           </a:gsLst>
-          <a:lin ang="8350000" scaled="1"/>
+          <a:lin ang="16200000" scaled="0"/>
         </a:gradFill>
       </a:fillStyleLst>
       <a:lnStyleLst>
-        <a:ln w="9525" cap="flat" cmpd="sng" algn="ctr">
+        <a:ln w="6350" cap="rnd" cmpd="sng" algn="ctr">
           <a:solidFill>
             <a:schemeClr val="phClr">
-              <a:shade val="48000"/>
-              <a:satMod val="110000"/>
+              <a:shade val="95000"/>
+              <a:satMod val="105000"/>
             </a:schemeClr>
           </a:solidFill>
           <a:prstDash val="solid"/>
         </a:ln>
-        <a:ln w="25400" cap="flat" cmpd="sng" algn="ctr">
+        <a:ln w="48000" cap="flat" cmpd="thickThin" algn="ctr">
           <a:solidFill>
             <a:schemeClr val="phClr"/>
           </a:solidFill>
           <a:prstDash val="solid"/>
         </a:ln>
-        <a:ln w="38100" cap="flat" cmpd="sng" algn="ctr">
+        <a:ln w="48500" cap="flat" cmpd="thickThin" algn="ctr">
           <a:solidFill>
             <a:schemeClr val="phClr"/>
           </a:solidFill>
@@ -3374,27 +4127,27 @@
       <a:effectStyleLst>
         <a:effectStyle>
           <a:effectLst>
-            <a:outerShdw blurRad="130000" dist="101600" dir="2700000" algn="tl" rotWithShape="0">
+            <a:outerShdw blurRad="45000" dist="25000" dir="5400000" rotWithShape="0">
               <a:srgbClr val="000000">
-                <a:alpha val="35000"/>
+                <a:alpha val="38000"/>
               </a:srgbClr>
             </a:outerShdw>
           </a:effectLst>
         </a:effectStyle>
         <a:effectStyle>
           <a:effectLst>
-            <a:outerShdw blurRad="190500" dist="228600" dir="2700000" sy="90000" rotWithShape="0">
+            <a:outerShdw blurRad="39000" dist="25400" dir="5400000" rotWithShape="0">
               <a:srgbClr val="000000">
-                <a:alpha val="25500"/>
+                <a:alpha val="38000"/>
               </a:srgbClr>
             </a:outerShdw>
           </a:effectLst>
         </a:effectStyle>
         <a:effectStyle>
           <a:effectLst>
-            <a:outerShdw blurRad="190500" dist="228600" dir="2700000" sy="90000" rotWithShape="0">
+            <a:outerShdw blurRad="39000" dist="25400" dir="5400000" rotWithShape="0">
               <a:srgbClr val="000000">
-                <a:alpha val="25500"/>
+                <a:alpha val="38000"/>
               </a:srgbClr>
             </a:outerShdw>
           </a:effectLst>
@@ -3402,12 +4155,12 @@
             <a:camera prst="orthographicFront" fov="0">
               <a:rot lat="0" lon="0" rev="0"/>
             </a:camera>
-            <a:lightRig rig="soft" dir="tl">
-              <a:rot lat="0" lon="0" rev="20100000"/>
+            <a:lightRig rig="threePt" dir="t">
+              <a:rot lat="0" lon="0" rev="1800000"/>
             </a:lightRig>
           </a:scene3d>
-          <a:sp3d>
-            <a:bevelT w="50800" h="50800"/>
+          <a:sp3d prstMaterial="matte">
+            <a:bevelT h="20000"/>
           </a:sp3d>
         </a:effectStyle>
       </a:effectStyleLst>
@@ -3419,37 +4172,46 @@
           <a:gsLst>
             <a:gs pos="0">
               <a:schemeClr val="phClr">
-                <a:tint val="50000"/>
-                <a:satMod val="180000"/>
+                <a:tint val="48000"/>
+                <a:satMod val="300000"/>
+              </a:schemeClr>
+            </a:gs>
+            <a:gs pos="12000">
+              <a:schemeClr val="phClr">
+                <a:tint val="48000"/>
+                <a:satMod val="300000"/>
+              </a:schemeClr>
+            </a:gs>
+            <a:gs pos="20000">
+              <a:schemeClr val="phClr">
+                <a:tint val="49000"/>
+                <a:satMod val="300000"/>
               </a:schemeClr>
             </a:gs>
             <a:gs pos="100000">
               <a:schemeClr val="phClr">
-                <a:shade val="45000"/>
-                <a:satMod val="120000"/>
+                <a:shade val="30000"/>
               </a:schemeClr>
             </a:gs>
           </a:gsLst>
           <a:path path="circle">
-            <a:fillToRect r="100000" b="100000"/>
+            <a:fillToRect l="10000" t="-25000" r="10000" b="125000"/>
           </a:path>
         </a:gradFill>
         <a:blipFill>
           <a:blip xmlns:r="http://schemas.openxmlformats.org/officeDocument/2006/relationships" r:embed="rId1">
             <a:duotone>
               <a:schemeClr val="phClr">
-                <a:shade val="3000"/>
-                <a:satMod val="110000"/>
+                <a:shade val="75000"/>
+                <a:satMod val="105000"/>
               </a:schemeClr>
               <a:schemeClr val="phClr">
-                <a:tint val="60000"/>
-                <a:satMod val="425000"/>
+                <a:tint val="95000"/>
+                <a:satMod val="105000"/>
               </a:schemeClr>
             </a:duotone>
           </a:blip>
-          <a:stretch>
-            <a:fillRect/>
-          </a:stretch>
+          <a:tile tx="0" ty="0" sx="38000" sy="38000" flip="none" algn="tl"/>
         </a:blipFill>
       </a:bgFillStyleLst>
     </a:fmtScheme>

</xml_diff>

<commit_message>
Adding picture in presentation
</commit_message>
<xml_diff>
--- a/makarow2.pptx
+++ b/makarow2.pptx
@@ -3923,13 +3923,37 @@
           <a:lstStyle/>
           <a:p>
             <a:r>
-              <a:rPr lang="en-US" smtClean="0"/>
+              <a:rPr lang="en-US" dirty="0" err="1" smtClean="0"/>
               <a:t>dgdg</a:t>
             </a:r>
-            <a:endParaRPr lang="ru-RU"/>
-          </a:p>
-        </p:txBody>
-      </p:sp>
+            <a:endParaRPr lang="ru-RU" dirty="0"/>
+          </a:p>
+        </p:txBody>
+      </p:sp>
+      <p:pic>
+        <p:nvPicPr>
+          <p:cNvPr id="4" name="Рисунок 3" descr="22.PNG"/>
+          <p:cNvPicPr>
+            <a:picLocks noChangeAspect="1"/>
+          </p:cNvPicPr>
+          <p:nvPr/>
+        </p:nvPicPr>
+        <p:blipFill>
+          <a:blip r:embed="rId2"/>
+          <a:stretch>
+            <a:fillRect/>
+          </a:stretch>
+        </p:blipFill>
+        <p:spPr>
+          <a:xfrm>
+            <a:off x="0" y="857250"/>
+            <a:ext cx="9144000" cy="5143500"/>
+          </a:xfrm>
+          <a:prstGeom prst="rect">
+            <a:avLst/>
+          </a:prstGeom>
+        </p:spPr>
+      </p:pic>
     </p:spTree>
   </p:cSld>
   <p:clrMapOvr>

</xml_diff>

<commit_message>
Changing presentation makarow1 and word makarow2 and Creating bfbfb
</commit_message>
<xml_diff>
--- a/makarow2.pptx
+++ b/makarow2.pptx
@@ -2,7 +2,7 @@
 <file path=ppt/presentation.xml><?xml version="1.0" encoding="utf-8"?>
 <p:presentation xmlns:a="http://schemas.openxmlformats.org/drawingml/2006/main" xmlns:r="http://schemas.openxmlformats.org/officeDocument/2006/relationships" xmlns:p="http://schemas.openxmlformats.org/presentationml/2006/main" saveSubsetFonts="1">
   <p:sldMasterIdLst>
-    <p:sldMasterId id="2147483672" r:id="rId1"/>
+    <p:sldMasterId id="2147483684" r:id="rId1"/>
   </p:sldMasterIdLst>
   <p:sldIdLst>
     <p:sldId id="256" r:id="rId2"/>
@@ -109,7 +109,7 @@
 </file>
 
 <file path=ppt/slideLayouts/slideLayout1.xml><?xml version="1.0" encoding="utf-8"?>
-<p:sldLayout xmlns:a="http://schemas.openxmlformats.org/drawingml/2006/main" xmlns:r="http://schemas.openxmlformats.org/officeDocument/2006/relationships" xmlns:p="http://schemas.openxmlformats.org/presentationml/2006/main" showMasterSp="0" type="title" preserve="1">
+<p:sldLayout xmlns:a="http://schemas.openxmlformats.org/drawingml/2006/main" xmlns:r="http://schemas.openxmlformats.org/officeDocument/2006/relationships" xmlns:p="http://schemas.openxmlformats.org/presentationml/2006/main" type="title" preserve="1">
   <p:cSld name="Титульный слайд">
     <p:bg>
       <p:bgRef idx="1002">
@@ -132,85 +132,67 @@
       </p:grpSpPr>
       <p:sp>
         <p:nvSpPr>
-          <p:cNvPr id="9" name="Прямоугольник 8"/>
-          <p:cNvSpPr/>
-          <p:nvPr/>
-        </p:nvSpPr>
-        <p:spPr bwMode="ltGray">
+          <p:cNvPr id="9" name="Заголовок 8"/>
+          <p:cNvSpPr>
+            <a:spLocks noGrp="1"/>
+          </p:cNvSpPr>
+          <p:nvPr>
+            <p:ph type="ctrTitle"/>
+          </p:nvPr>
+        </p:nvSpPr>
+        <p:spPr>
           <a:xfrm>
-            <a:off x="0" y="0"/>
-            <a:ext cx="9143999" cy="5135430"/>
+            <a:off x="533400" y="1371600"/>
+            <a:ext cx="7851648" cy="1828800"/>
           </a:xfrm>
-          <a:prstGeom prst="rect">
-            <a:avLst/>
-          </a:prstGeom>
-          <a:solidFill>
-            <a:srgbClr val="000000"/>
-          </a:solidFill>
-          <a:ln w="48000" cap="flat" cmpd="thickThin" algn="ctr">
+          <a:ln>
             <a:noFill/>
-            <a:prstDash val="solid"/>
           </a:ln>
         </p:spPr>
-        <p:style>
-          <a:lnRef idx="2">
-            <a:schemeClr val="accent1"/>
-          </a:lnRef>
-          <a:fillRef idx="1">
-            <a:schemeClr val="accent1"/>
-          </a:fillRef>
-          <a:effectRef idx="0">
-            <a:schemeClr val="accent1"/>
-          </a:effectRef>
-          <a:fontRef idx="minor">
-            <a:schemeClr val="lt1"/>
-          </a:fontRef>
-        </p:style>
-        <p:txBody>
-          <a:bodyPr rtlCol="0" anchor="ctr"/>
-          <a:lstStyle>
-            <a:extLst/>
-          </a:lstStyle>
-          <a:p>
-            <a:pPr algn="ctr" eaLnBrk="1" latinLnBrk="0" hangingPunct="1"/>
-            <a:endParaRPr kumimoji="0" lang="en-US"/>
-          </a:p>
-        </p:txBody>
-      </p:sp>
-      <p:sp>
-        <p:nvSpPr>
-          <p:cNvPr id="2" name="Заголовок 1"/>
-          <p:cNvSpPr>
-            <a:spLocks noGrp="1"/>
-          </p:cNvSpPr>
-          <p:nvPr>
-            <p:ph type="ctrTitle"/>
-          </p:nvPr>
-        </p:nvSpPr>
-        <p:spPr>
-          <a:xfrm>
-            <a:off x="685800" y="3355848"/>
-            <a:ext cx="8077200" cy="1673352"/>
-          </a:xfrm>
-        </p:spPr>
-        <p:txBody>
-          <a:bodyPr vert="horz" lIns="91440" tIns="0" rIns="45720" bIns="0" rtlCol="0" anchor="t">
+        <p:txBody>
+          <a:bodyPr vert="horz" tIns="0" rIns="18288" bIns="0" anchor="b">
             <a:normAutofit/>
             <a:scene3d>
               <a:camera prst="orthographicFront"/>
-              <a:lightRig rig="threePt" dir="t">
-                <a:rot lat="0" lon="0" rev="4800000"/>
+              <a:lightRig rig="freezing" dir="t">
+                <a:rot lat="0" lon="0" rev="5640000"/>
               </a:lightRig>
             </a:scene3d>
-            <a:sp3d prstMaterial="matte">
-              <a:bevelT w="50800" h="10160"/>
+            <a:sp3d prstMaterial="flat">
+              <a:bevelT w="38100" h="38100"/>
+              <a:contourClr>
+                <a:schemeClr val="tx2"/>
+              </a:contourClr>
             </a:sp3d>
           </a:bodyPr>
           <a:lstStyle>
-            <a:lvl1pPr algn="l">
-              <a:defRPr sz="4700" b="1"/>
+            <a:lvl1pPr algn="r" rtl="0">
+              <a:spcBef>
+                <a:spcPct val="0"/>
+              </a:spcBef>
+              <a:buNone/>
+              <a:defRPr sz="5600" b="1">
+                <a:ln>
+                  <a:noFill/>
+                </a:ln>
+                <a:solidFill>
+                  <a:schemeClr val="accent3">
+                    <a:tint val="90000"/>
+                    <a:satMod val="120000"/>
+                  </a:schemeClr>
+                </a:solidFill>
+                <a:effectLst>
+                  <a:outerShdw blurRad="38100" dist="25400" dir="5400000" algn="tl" rotWithShape="0">
+                    <a:srgbClr val="000000">
+                      <a:alpha val="43000"/>
+                    </a:srgbClr>
+                  </a:outerShdw>
+                </a:effectLst>
+                <a:latin typeface="+mj-lt"/>
+                <a:ea typeface="+mj-ea"/>
+                <a:cs typeface="+mj-cs"/>
+              </a:defRPr>
             </a:lvl1pPr>
-            <a:extLst/>
           </a:lstStyle>
           <a:p>
             <a:r>
@@ -223,7 +205,7 @@
       </p:sp>
       <p:sp>
         <p:nvSpPr>
-          <p:cNvPr id="3" name="Подзаголовок 2"/>
+          <p:cNvPr id="17" name="Подзаголовок 16"/>
           <p:cNvSpPr>
             <a:spLocks noGrp="1"/>
           </p:cNvSpPr>
@@ -233,102 +215,45 @@
         </p:nvSpPr>
         <p:spPr>
           <a:xfrm>
-            <a:off x="685800" y="1828800"/>
-            <a:ext cx="8077200" cy="1499616"/>
+            <a:off x="533400" y="3228536"/>
+            <a:ext cx="7854696" cy="1752600"/>
           </a:xfrm>
         </p:spPr>
         <p:txBody>
-          <a:bodyPr lIns="118872" tIns="0" rIns="45720" bIns="0" anchor="b"/>
+          <a:bodyPr lIns="0" rIns="18288"/>
           <a:lstStyle>
-            <a:lvl1pPr marL="0" indent="0" algn="l">
+            <a:lvl1pPr marL="0" marR="45720" indent="0" algn="r">
               <a:buNone/>
-              <a:defRPr sz="2000">
+              <a:defRPr>
                 <a:solidFill>
-                  <a:srgbClr val="FFFFFF"/>
+                  <a:schemeClr val="tx1"/>
                 </a:solidFill>
               </a:defRPr>
             </a:lvl1pPr>
             <a:lvl2pPr marL="457200" indent="0" algn="ctr">
               <a:buNone/>
-              <a:defRPr>
-                <a:solidFill>
-                  <a:schemeClr val="tx1">
-                    <a:tint val="75000"/>
-                  </a:schemeClr>
-                </a:solidFill>
-              </a:defRPr>
             </a:lvl2pPr>
             <a:lvl3pPr marL="914400" indent="0" algn="ctr">
               <a:buNone/>
-              <a:defRPr>
-                <a:solidFill>
-                  <a:schemeClr val="tx1">
-                    <a:tint val="75000"/>
-                  </a:schemeClr>
-                </a:solidFill>
-              </a:defRPr>
             </a:lvl3pPr>
             <a:lvl4pPr marL="1371600" indent="0" algn="ctr">
               <a:buNone/>
-              <a:defRPr>
-                <a:solidFill>
-                  <a:schemeClr val="tx1">
-                    <a:tint val="75000"/>
-                  </a:schemeClr>
-                </a:solidFill>
-              </a:defRPr>
             </a:lvl4pPr>
             <a:lvl5pPr marL="1828800" indent="0" algn="ctr">
               <a:buNone/>
-              <a:defRPr>
-                <a:solidFill>
-                  <a:schemeClr val="tx1">
-                    <a:tint val="75000"/>
-                  </a:schemeClr>
-                </a:solidFill>
-              </a:defRPr>
             </a:lvl5pPr>
             <a:lvl6pPr marL="2286000" indent="0" algn="ctr">
               <a:buNone/>
-              <a:defRPr>
-                <a:solidFill>
-                  <a:schemeClr val="tx1">
-                    <a:tint val="75000"/>
-                  </a:schemeClr>
-                </a:solidFill>
-              </a:defRPr>
             </a:lvl6pPr>
             <a:lvl7pPr marL="2743200" indent="0" algn="ctr">
               <a:buNone/>
-              <a:defRPr>
-                <a:solidFill>
-                  <a:schemeClr val="tx1">
-                    <a:tint val="75000"/>
-                  </a:schemeClr>
-                </a:solidFill>
-              </a:defRPr>
             </a:lvl7pPr>
             <a:lvl8pPr marL="3200400" indent="0" algn="ctr">
               <a:buNone/>
-              <a:defRPr>
-                <a:solidFill>
-                  <a:schemeClr val="tx1">
-                    <a:tint val="75000"/>
-                  </a:schemeClr>
-                </a:solidFill>
-              </a:defRPr>
             </a:lvl8pPr>
             <a:lvl9pPr marL="3657600" indent="0" algn="ctr">
               <a:buNone/>
-              <a:defRPr>
-                <a:solidFill>
-                  <a:schemeClr val="tx1">
-                    <a:tint val="75000"/>
-                  </a:schemeClr>
-                </a:solidFill>
-              </a:defRPr>
             </a:lvl9pPr>
-            <a:extLst/>
           </a:lstStyle>
           <a:p>
             <a:r>
@@ -341,7 +266,7 @@
       </p:sp>
       <p:sp>
         <p:nvSpPr>
-          <p:cNvPr id="4" name="Дата 3"/>
+          <p:cNvPr id="30" name="Дата 29"/>
           <p:cNvSpPr>
             <a:spLocks noGrp="1"/>
           </p:cNvSpPr>
@@ -365,7 +290,7 @@
       </p:sp>
       <p:sp>
         <p:nvSpPr>
-          <p:cNvPr id="5" name="Нижний колонтитул 4"/>
+          <p:cNvPr id="19" name="Нижний колонтитул 18"/>
           <p:cNvSpPr>
             <a:spLocks noGrp="1"/>
           </p:cNvSpPr>
@@ -384,7 +309,7 @@
       </p:sp>
       <p:sp>
         <p:nvSpPr>
-          <p:cNvPr id="6" name="Номер слайда 5"/>
+          <p:cNvPr id="27" name="Номер слайда 26"/>
           <p:cNvSpPr>
             <a:spLocks noGrp="1"/>
           </p:cNvSpPr>
@@ -403,60 +328,6 @@
               <a:t>‹#›</a:t>
             </a:fld>
             <a:endParaRPr lang="ru-RU"/>
-          </a:p>
-        </p:txBody>
-      </p:sp>
-      <p:sp>
-        <p:nvSpPr>
-          <p:cNvPr id="10" name="Прямоугольник 9"/>
-          <p:cNvSpPr/>
-          <p:nvPr/>
-        </p:nvSpPr>
-        <p:spPr bwMode="invGray">
-          <a:xfrm>
-            <a:off x="0" y="5128334"/>
-            <a:ext cx="9144000" cy="45720"/>
-          </a:xfrm>
-          <a:prstGeom prst="rect">
-            <a:avLst/>
-          </a:prstGeom>
-          <a:solidFill>
-            <a:srgbClr val="FFFFFF"/>
-          </a:solidFill>
-          <a:ln w="48000" cap="flat" cmpd="thickThin" algn="ctr">
-            <a:noFill/>
-            <a:prstDash val="solid"/>
-          </a:ln>
-          <a:effectLst>
-            <a:outerShdw blurRad="31750" dist="10160" dir="5400000" algn="tl" rotWithShape="0">
-              <a:srgbClr val="000000">
-                <a:alpha val="60000"/>
-              </a:srgbClr>
-            </a:outerShdw>
-          </a:effectLst>
-        </p:spPr>
-        <p:style>
-          <a:lnRef idx="2">
-            <a:schemeClr val="accent1"/>
-          </a:lnRef>
-          <a:fillRef idx="1">
-            <a:schemeClr val="accent1"/>
-          </a:fillRef>
-          <a:effectRef idx="0">
-            <a:schemeClr val="accent1"/>
-          </a:effectRef>
-          <a:fontRef idx="minor">
-            <a:schemeClr val="lt1"/>
-          </a:fontRef>
-        </p:style>
-        <p:txBody>
-          <a:bodyPr rtlCol="0" anchor="ctr"/>
-          <a:lstStyle>
-            <a:extLst/>
-          </a:lstStyle>
-          <a:p>
-            <a:pPr algn="ctr" eaLnBrk="1" latinLnBrk="0" hangingPunct="1"/>
-            <a:endParaRPr kumimoji="0" lang="en-US"/>
           </a:p>
         </p:txBody>
       </p:sp>
@@ -498,9 +369,7 @@
         <p:spPr/>
         <p:txBody>
           <a:bodyPr/>
-          <a:lstStyle>
-            <a:extLst/>
-          </a:lstStyle>
+          <a:lstStyle/>
           <a:p>
             <a:r>
               <a:rPr kumimoji="0" lang="ru-RU" smtClean="0"/>
@@ -523,9 +392,7 @@
         <p:spPr/>
         <p:txBody>
           <a:bodyPr vert="eaVert"/>
-          <a:lstStyle>
-            <a:extLst/>
-          </a:lstStyle>
+          <a:lstStyle/>
           <a:p>
             <a:pPr lvl="0" eaLnBrk="1" latinLnBrk="0" hangingPunct="1"/>
             <a:r>
@@ -640,7 +507,7 @@
 </file>
 
 <file path=ppt/slideLayouts/slideLayout11.xml><?xml version="1.0" encoding="utf-8"?>
-<p:sldLayout xmlns:a="http://schemas.openxmlformats.org/drawingml/2006/main" xmlns:r="http://schemas.openxmlformats.org/officeDocument/2006/relationships" xmlns:p="http://schemas.openxmlformats.org/presentationml/2006/main" showMasterSp="0" type="vertTitleAndTx" preserve="1">
+<p:sldLayout xmlns:a="http://schemas.openxmlformats.org/drawingml/2006/main" xmlns:r="http://schemas.openxmlformats.org/officeDocument/2006/relationships" xmlns:p="http://schemas.openxmlformats.org/presentationml/2006/main" type="vertTitleAndTx" preserve="1">
   <p:cSld name="Вертикальный заголовок и текст">
     <p:spTree>
       <p:nvGrpSpPr>
@@ -658,107 +525,6 @@
       </p:grpSpPr>
       <p:sp>
         <p:nvSpPr>
-          <p:cNvPr id="9" name="Прямоугольник 8"/>
-          <p:cNvSpPr/>
-          <p:nvPr/>
-        </p:nvSpPr>
-        <p:spPr bwMode="invGray">
-          <a:xfrm>
-            <a:off x="6598920" y="0"/>
-            <a:ext cx="45720" cy="6858000"/>
-          </a:xfrm>
-          <a:prstGeom prst="rect">
-            <a:avLst/>
-          </a:prstGeom>
-          <a:solidFill>
-            <a:srgbClr val="FFFFFF"/>
-          </a:solidFill>
-          <a:ln w="48000" cap="flat" cmpd="thickThin" algn="ctr">
-            <a:noFill/>
-            <a:prstDash val="solid"/>
-          </a:ln>
-          <a:effectLst>
-            <a:outerShdw blurRad="31750" dist="10160" dir="10800000" algn="tl" rotWithShape="0">
-              <a:srgbClr val="000000">
-                <a:alpha val="60000"/>
-              </a:srgbClr>
-            </a:outerShdw>
-          </a:effectLst>
-        </p:spPr>
-        <p:style>
-          <a:lnRef idx="2">
-            <a:schemeClr val="accent1"/>
-          </a:lnRef>
-          <a:fillRef idx="1">
-            <a:schemeClr val="accent1"/>
-          </a:fillRef>
-          <a:effectRef idx="0">
-            <a:schemeClr val="accent1"/>
-          </a:effectRef>
-          <a:fontRef idx="minor">
-            <a:schemeClr val="lt1"/>
-          </a:fontRef>
-        </p:style>
-        <p:txBody>
-          <a:bodyPr rtlCol="0" anchor="ctr"/>
-          <a:lstStyle>
-            <a:extLst/>
-          </a:lstStyle>
-          <a:p>
-            <a:pPr algn="ctr" eaLnBrk="1" latinLnBrk="0" hangingPunct="1"/>
-            <a:endParaRPr kumimoji="0" lang="en-US"/>
-          </a:p>
-        </p:txBody>
-      </p:sp>
-      <p:sp>
-        <p:nvSpPr>
-          <p:cNvPr id="8" name="Прямоугольник 7"/>
-          <p:cNvSpPr/>
-          <p:nvPr/>
-        </p:nvSpPr>
-        <p:spPr bwMode="ltGray">
-          <a:xfrm>
-            <a:off x="6647687" y="0"/>
-            <a:ext cx="2514601" cy="6858000"/>
-          </a:xfrm>
-          <a:prstGeom prst="rect">
-            <a:avLst/>
-          </a:prstGeom>
-          <a:solidFill>
-            <a:srgbClr val="000000"/>
-          </a:solidFill>
-          <a:ln w="48000" cap="flat" cmpd="thickThin" algn="ctr">
-            <a:noFill/>
-            <a:prstDash val="solid"/>
-          </a:ln>
-        </p:spPr>
-        <p:style>
-          <a:lnRef idx="2">
-            <a:schemeClr val="accent1"/>
-          </a:lnRef>
-          <a:fillRef idx="1">
-            <a:schemeClr val="accent1"/>
-          </a:fillRef>
-          <a:effectRef idx="0">
-            <a:schemeClr val="accent1"/>
-          </a:effectRef>
-          <a:fontRef idx="minor">
-            <a:schemeClr val="lt1"/>
-          </a:fontRef>
-        </p:style>
-        <p:txBody>
-          <a:bodyPr rtlCol="0" anchor="ctr"/>
-          <a:lstStyle>
-            <a:extLst/>
-          </a:lstStyle>
-          <a:p>
-            <a:pPr algn="ctr" eaLnBrk="1" latinLnBrk="0" hangingPunct="1"/>
-            <a:endParaRPr kumimoji="0" lang="en-US"/>
-          </a:p>
-        </p:txBody>
-      </p:sp>
-      <p:sp>
-        <p:nvSpPr>
           <p:cNvPr id="2" name="Вертикальный заголовок 1"/>
           <p:cNvSpPr>
             <a:spLocks noGrp="1"/>
@@ -769,15 +535,13 @@
         </p:nvSpPr>
         <p:spPr>
           <a:xfrm>
-            <a:off x="6781800" y="274640"/>
-            <a:ext cx="1905000" cy="5851525"/>
+            <a:off x="6629400" y="914401"/>
+            <a:ext cx="2057400" cy="5211763"/>
           </a:xfrm>
         </p:spPr>
         <p:txBody>
           <a:bodyPr vert="eaVert"/>
-          <a:lstStyle>
-            <a:extLst/>
-          </a:lstStyle>
+          <a:lstStyle/>
           <a:p>
             <a:r>
               <a:rPr kumimoji="0" lang="ru-RU" smtClean="0"/>
@@ -799,15 +563,13 @@
         </p:nvSpPr>
         <p:spPr>
           <a:xfrm>
-            <a:off x="457200" y="304800"/>
-            <a:ext cx="6019800" cy="5851525"/>
+            <a:off x="457200" y="914401"/>
+            <a:ext cx="6019800" cy="5211763"/>
           </a:xfrm>
         </p:spPr>
         <p:txBody>
           <a:bodyPr vert="eaVert"/>
-          <a:lstStyle>
-            <a:extLst/>
-          </a:lstStyle>
+          <a:lstStyle/>
           <a:p>
             <a:pPr lvl="0" eaLnBrk="1" latinLnBrk="0" hangingPunct="1"/>
             <a:r>
@@ -880,12 +642,7 @@
             <p:ph type="ftr" sz="quarter" idx="11"/>
           </p:nvPr>
         </p:nvSpPr>
-        <p:spPr>
-          <a:xfrm>
-            <a:off x="2640597" y="6377459"/>
-            <a:ext cx="3836404" cy="365125"/>
-          </a:xfrm>
-        </p:spPr>
+        <p:spPr/>
         <p:txBody>
           <a:bodyPr/>
           <a:lstStyle/>
@@ -953,17 +710,10 @@
             <p:ph type="title"/>
           </p:nvPr>
         </p:nvSpPr>
-        <p:spPr>
-          <a:xfrm>
-            <a:off x="457200" y="155448"/>
-            <a:ext cx="8229600" cy="1252728"/>
-          </a:xfrm>
-        </p:spPr>
+        <p:spPr/>
         <p:txBody>
           <a:bodyPr/>
-          <a:lstStyle>
-            <a:extLst/>
-          </a:lstStyle>
+          <a:lstStyle/>
           <a:p>
             <a:r>
               <a:rPr kumimoji="0" lang="ru-RU" smtClean="0"/>
@@ -986,9 +736,7 @@
         <p:spPr/>
         <p:txBody>
           <a:bodyPr/>
-          <a:lstStyle>
-            <a:extLst/>
-          </a:lstStyle>
+          <a:lstStyle/>
           <a:p>
             <a:pPr lvl="0" eaLnBrk="1" latinLnBrk="0" hangingPunct="1"/>
             <a:r>
@@ -1103,7 +851,7 @@
 </file>
 
 <file path=ppt/slideLayouts/slideLayout3.xml><?xml version="1.0" encoding="utf-8"?>
-<p:sldLayout xmlns:a="http://schemas.openxmlformats.org/drawingml/2006/main" xmlns:r="http://schemas.openxmlformats.org/officeDocument/2006/relationships" xmlns:p="http://schemas.openxmlformats.org/presentationml/2006/main" showMasterSp="0" type="secHead" preserve="1">
+<p:sldLayout xmlns:a="http://schemas.openxmlformats.org/drawingml/2006/main" xmlns:r="http://schemas.openxmlformats.org/officeDocument/2006/relationships" xmlns:p="http://schemas.openxmlformats.org/presentationml/2006/main" type="secHead" preserve="1">
   <p:cSld name="Заголовок раздела">
     <p:bg>
       <p:bgRef idx="1002">
@@ -1126,139 +874,64 @@
       </p:grpSpPr>
       <p:sp>
         <p:nvSpPr>
-          <p:cNvPr id="9" name="Прямоугольник 8"/>
-          <p:cNvSpPr/>
-          <p:nvPr/>
-        </p:nvSpPr>
-        <p:spPr bwMode="ltGray">
+          <p:cNvPr id="2" name="Заголовок 1"/>
+          <p:cNvSpPr>
+            <a:spLocks noGrp="1"/>
+          </p:cNvSpPr>
+          <p:nvPr>
+            <p:ph type="title"/>
+          </p:nvPr>
+        </p:nvSpPr>
+        <p:spPr>
           <a:xfrm>
-            <a:off x="0" y="1"/>
-            <a:ext cx="9144000" cy="2602520"/>
+            <a:off x="530352" y="1316736"/>
+            <a:ext cx="7772400" cy="1362456"/>
           </a:xfrm>
-          <a:prstGeom prst="rect">
-            <a:avLst/>
-          </a:prstGeom>
-          <a:solidFill>
-            <a:srgbClr val="000000"/>
-          </a:solidFill>
-          <a:ln w="48000" cap="flat" cmpd="thickThin" algn="ctr">
+          <a:ln>
             <a:noFill/>
-            <a:prstDash val="solid"/>
           </a:ln>
         </p:spPr>
-        <p:style>
-          <a:lnRef idx="2">
-            <a:schemeClr val="accent1"/>
-          </a:lnRef>
-          <a:fillRef idx="1">
-            <a:schemeClr val="accent1"/>
-          </a:fillRef>
-          <a:effectRef idx="0">
-            <a:schemeClr val="accent1"/>
-          </a:effectRef>
-          <a:fontRef idx="minor">
-            <a:schemeClr val="lt1"/>
-          </a:fontRef>
-        </p:style>
-        <p:txBody>
-          <a:bodyPr rtlCol="0" anchor="ctr"/>
-          <a:lstStyle>
-            <a:extLst/>
-          </a:lstStyle>
-          <a:p>
-            <a:pPr algn="ctr" eaLnBrk="1" latinLnBrk="0" hangingPunct="1"/>
-            <a:endParaRPr kumimoji="0" lang="en-US"/>
-          </a:p>
-        </p:txBody>
-      </p:sp>
-      <p:sp>
-        <p:nvSpPr>
-          <p:cNvPr id="12" name="Прямоугольник 11"/>
-          <p:cNvSpPr/>
-          <p:nvPr/>
-        </p:nvSpPr>
-        <p:spPr bwMode="invGray">
-          <a:xfrm>
-            <a:off x="0" y="2602520"/>
-            <a:ext cx="9144000" cy="45720"/>
-          </a:xfrm>
-          <a:prstGeom prst="rect">
-            <a:avLst/>
-          </a:prstGeom>
-          <a:solidFill>
-            <a:srgbClr val="FFFFFF"/>
-          </a:solidFill>
-          <a:ln w="48000" cap="flat" cmpd="thickThin" algn="ctr">
-            <a:noFill/>
-            <a:prstDash val="solid"/>
-          </a:ln>
-          <a:effectLst>
-            <a:outerShdw blurRad="31750" dist="10160" dir="5400000" algn="tl" rotWithShape="0">
-              <a:srgbClr val="000000">
-                <a:alpha val="60000"/>
-              </a:srgbClr>
-            </a:outerShdw>
-          </a:effectLst>
-        </p:spPr>
-        <p:style>
-          <a:lnRef idx="2">
-            <a:schemeClr val="accent1"/>
-          </a:lnRef>
-          <a:fillRef idx="1">
-            <a:schemeClr val="accent1"/>
-          </a:fillRef>
-          <a:effectRef idx="0">
-            <a:schemeClr val="accent1"/>
-          </a:effectRef>
-          <a:fontRef idx="minor">
-            <a:schemeClr val="lt1"/>
-          </a:fontRef>
-        </p:style>
-        <p:txBody>
-          <a:bodyPr rtlCol="0" anchor="ctr"/>
-          <a:lstStyle>
-            <a:extLst/>
-          </a:lstStyle>
-          <a:p>
-            <a:pPr algn="ctr" eaLnBrk="1" latinLnBrk="0" hangingPunct="1"/>
-            <a:endParaRPr kumimoji="0" lang="en-US"/>
-          </a:p>
-        </p:txBody>
-      </p:sp>
-      <p:sp>
-        <p:nvSpPr>
-          <p:cNvPr id="2" name="Заголовок 1"/>
-          <p:cNvSpPr>
-            <a:spLocks noGrp="1"/>
-          </p:cNvSpPr>
-          <p:nvPr>
-            <p:ph type="title"/>
-          </p:nvPr>
-        </p:nvSpPr>
-        <p:spPr>
-          <a:xfrm>
-            <a:off x="749808" y="118872"/>
-            <a:ext cx="8013192" cy="1636776"/>
-          </a:xfrm>
-        </p:spPr>
-        <p:txBody>
-          <a:bodyPr vert="horz" lIns="91440" tIns="0" rIns="91440" bIns="0" rtlCol="0" anchor="b">
-            <a:normAutofit/>
+        <p:txBody>
+          <a:bodyPr vert="horz" tIns="0" bIns="0" anchor="b">
+            <a:noAutofit/>
             <a:scene3d>
               <a:camera prst="orthographicFront"/>
-              <a:lightRig rig="threePt" dir="t">
-                <a:rot lat="0" lon="0" rev="4800000"/>
+              <a:lightRig rig="freezing" dir="t">
+                <a:rot lat="0" lon="0" rev="5640000"/>
               </a:lightRig>
             </a:scene3d>
-            <a:sp3d prstMaterial="matte">
-              <a:bevelT w="50800" h="10160"/>
+            <a:sp3d prstMaterial="flat">
+              <a:bevelT w="38100" h="38100"/>
             </a:sp3d>
           </a:bodyPr>
           <a:lstStyle>
-            <a:lvl1pPr algn="l">
-              <a:defRPr sz="4700" b="1" cap="none" baseline="0"/>
+            <a:lvl1pPr algn="l" rtl="0">
+              <a:spcBef>
+                <a:spcPct val="0"/>
+              </a:spcBef>
+              <a:buNone/>
+              <a:defRPr lang="en-US" sz="5600" b="1" cap="none" baseline="0" dirty="0">
+                <a:ln w="635">
+                  <a:noFill/>
+                </a:ln>
+                <a:solidFill>
+                  <a:schemeClr val="accent4">
+                    <a:tint val="90000"/>
+                    <a:satMod val="125000"/>
+                  </a:schemeClr>
+                </a:solidFill>
+                <a:effectLst>
+                  <a:outerShdw blurRad="38100" dist="25400" dir="5400000" algn="tl" rotWithShape="0">
+                    <a:srgbClr val="000000">
+                      <a:alpha val="43000"/>
+                    </a:srgbClr>
+                  </a:outerShdw>
+                </a:effectLst>
+                <a:latin typeface="+mj-lt"/>
+                <a:ea typeface="+mj-ea"/>
+                <a:cs typeface="+mj-cs"/>
+              </a:defRPr>
             </a:lvl1pPr>
-            <a:extLst/>
           </a:lstStyle>
           <a:p>
             <a:r>
@@ -1281,22 +954,22 @@
         </p:nvSpPr>
         <p:spPr>
           <a:xfrm>
-            <a:off x="740664" y="1828800"/>
-            <a:ext cx="8022336" cy="685800"/>
+            <a:off x="530352" y="2704664"/>
+            <a:ext cx="7772400" cy="1509712"/>
           </a:xfrm>
         </p:spPr>
         <p:txBody>
-          <a:bodyPr lIns="146304" tIns="0" rIns="45720" bIns="0" anchor="t"/>
+          <a:bodyPr lIns="45720" rIns="45720" anchor="t"/>
           <a:lstStyle>
             <a:lvl1pPr marL="0" indent="0">
               <a:buNone/>
-              <a:defRPr sz="2000">
+              <a:defRPr sz="2200">
                 <a:solidFill>
-                  <a:srgbClr val="FFFFFF"/>
+                  <a:schemeClr val="tx1"/>
                 </a:solidFill>
               </a:defRPr>
             </a:lvl1pPr>
-            <a:lvl2pPr marL="457200" indent="0">
+            <a:lvl2pPr>
               <a:buNone/>
               <a:defRPr sz="1800">
                 <a:solidFill>
@@ -1306,7 +979,7 @@
                 </a:solidFill>
               </a:defRPr>
             </a:lvl2pPr>
-            <a:lvl3pPr marL="914400" indent="0">
+            <a:lvl3pPr>
               <a:buNone/>
               <a:defRPr sz="1600">
                 <a:solidFill>
@@ -1316,7 +989,7 @@
                 </a:solidFill>
               </a:defRPr>
             </a:lvl3pPr>
-            <a:lvl4pPr marL="1371600" indent="0">
+            <a:lvl4pPr>
               <a:buNone/>
               <a:defRPr sz="1400">
                 <a:solidFill>
@@ -1326,7 +999,7 @@
                 </a:solidFill>
               </a:defRPr>
             </a:lvl4pPr>
-            <a:lvl5pPr marL="1828800" indent="0">
+            <a:lvl5pPr>
               <a:buNone/>
               <a:defRPr sz="1400">
                 <a:solidFill>
@@ -1336,47 +1009,6 @@
                 </a:solidFill>
               </a:defRPr>
             </a:lvl5pPr>
-            <a:lvl6pPr marL="2286000" indent="0">
-              <a:buNone/>
-              <a:defRPr sz="1400">
-                <a:solidFill>
-                  <a:schemeClr val="tx1">
-                    <a:tint val="75000"/>
-                  </a:schemeClr>
-                </a:solidFill>
-              </a:defRPr>
-            </a:lvl6pPr>
-            <a:lvl7pPr marL="2743200" indent="0">
-              <a:buNone/>
-              <a:defRPr sz="1400">
-                <a:solidFill>
-                  <a:schemeClr val="tx1">
-                    <a:tint val="75000"/>
-                  </a:schemeClr>
-                </a:solidFill>
-              </a:defRPr>
-            </a:lvl7pPr>
-            <a:lvl8pPr marL="3200400" indent="0">
-              <a:buNone/>
-              <a:defRPr sz="1400">
-                <a:solidFill>
-                  <a:schemeClr val="tx1">
-                    <a:tint val="75000"/>
-                  </a:schemeClr>
-                </a:solidFill>
-              </a:defRPr>
-            </a:lvl8pPr>
-            <a:lvl9pPr marL="3657600" indent="0">
-              <a:buNone/>
-              <a:defRPr sz="1400">
-                <a:solidFill>
-                  <a:schemeClr val="tx1">
-                    <a:tint val="75000"/>
-                  </a:schemeClr>
-                </a:solidFill>
-              </a:defRPr>
-            </a:lvl9pPr>
-            <a:extLst/>
           </a:lstStyle>
           <a:p>
             <a:pPr lvl="0" eaLnBrk="1" latinLnBrk="0" hangingPunct="1"/>
@@ -1489,42 +1121,45 @@
             <p:ph type="title"/>
           </p:nvPr>
         </p:nvSpPr>
-        <p:spPr/>
+        <p:spPr>
+          <a:xfrm>
+            <a:off x="457200" y="704088"/>
+            <a:ext cx="8229600" cy="1143000"/>
+          </a:xfrm>
+        </p:spPr>
+        <p:txBody>
+          <a:bodyPr/>
+          <a:lstStyle/>
+          <a:p>
+            <a:r>
+              <a:rPr kumimoji="0" lang="ru-RU" smtClean="0"/>
+              <a:t>Образец заголовка</a:t>
+            </a:r>
+            <a:endParaRPr kumimoji="0" lang="en-US"/>
+          </a:p>
+        </p:txBody>
+      </p:sp>
+      <p:sp>
+        <p:nvSpPr>
+          <p:cNvPr id="3" name="Содержимое 2"/>
+          <p:cNvSpPr>
+            <a:spLocks noGrp="1"/>
+          </p:cNvSpPr>
+          <p:nvPr>
+            <p:ph sz="half" idx="1"/>
+          </p:nvPr>
+        </p:nvSpPr>
+        <p:spPr>
+          <a:xfrm>
+            <a:off x="457200" y="1920085"/>
+            <a:ext cx="4038600" cy="4434840"/>
+          </a:xfrm>
+        </p:spPr>
         <p:txBody>
           <a:bodyPr/>
           <a:lstStyle>
-            <a:extLst/>
-          </a:lstStyle>
-          <a:p>
-            <a:r>
-              <a:rPr kumimoji="0" lang="ru-RU" smtClean="0"/>
-              <a:t>Образец заголовка</a:t>
-            </a:r>
-            <a:endParaRPr kumimoji="0" lang="en-US"/>
-          </a:p>
-        </p:txBody>
-      </p:sp>
-      <p:sp>
-        <p:nvSpPr>
-          <p:cNvPr id="3" name="Содержимое 2"/>
-          <p:cNvSpPr>
-            <a:spLocks noGrp="1"/>
-          </p:cNvSpPr>
-          <p:nvPr>
-            <p:ph sz="half" idx="1"/>
-          </p:nvPr>
-        </p:nvSpPr>
-        <p:spPr>
-          <a:xfrm>
-            <a:off x="457200" y="1773936"/>
-            <a:ext cx="4038600" cy="4623816"/>
-          </a:xfrm>
-        </p:spPr>
-        <p:txBody>
-          <a:bodyPr lIns="91440"/>
-          <a:lstStyle>
             <a:lvl1pPr>
-              <a:defRPr sz="2800"/>
+              <a:defRPr sz="2600"/>
             </a:lvl1pPr>
             <a:lvl2pPr>
               <a:defRPr sz="2400"/>
@@ -1538,19 +1173,6 @@
             <a:lvl5pPr>
               <a:defRPr sz="1800"/>
             </a:lvl5pPr>
-            <a:lvl6pPr>
-              <a:defRPr sz="1800"/>
-            </a:lvl6pPr>
-            <a:lvl7pPr>
-              <a:defRPr sz="1800"/>
-            </a:lvl7pPr>
-            <a:lvl8pPr>
-              <a:defRPr sz="1800"/>
-            </a:lvl8pPr>
-            <a:lvl9pPr>
-              <a:defRPr sz="1800"/>
-            </a:lvl9pPr>
-            <a:extLst/>
           </a:lstStyle>
           <a:p>
             <a:pPr lvl="0" eaLnBrk="1" latinLnBrk="0" hangingPunct="1"/>
@@ -1602,15 +1224,15 @@
         </p:nvSpPr>
         <p:spPr>
           <a:xfrm>
-            <a:off x="4648200" y="1773936"/>
-            <a:ext cx="4038600" cy="4623816"/>
+            <a:off x="4648200" y="1920085"/>
+            <a:ext cx="4038600" cy="4434840"/>
           </a:xfrm>
         </p:spPr>
         <p:txBody>
           <a:bodyPr/>
           <a:lstStyle>
             <a:lvl1pPr>
-              <a:defRPr sz="2800"/>
+              <a:defRPr sz="2600"/>
             </a:lvl1pPr>
             <a:lvl2pPr>
               <a:defRPr sz="2400"/>
@@ -1624,19 +1246,6 @@
             <a:lvl5pPr>
               <a:defRPr sz="1800"/>
             </a:lvl5pPr>
-            <a:lvl6pPr>
-              <a:defRPr sz="1800"/>
-            </a:lvl6pPr>
-            <a:lvl7pPr>
-              <a:defRPr sz="1800"/>
-            </a:lvl7pPr>
-            <a:lvl8pPr>
-              <a:defRPr sz="1800"/>
-            </a:lvl8pPr>
-            <a:lvl9pPr>
-              <a:defRPr sz="1800"/>
-            </a:lvl9pPr>
-            <a:extLst/>
           </a:lstStyle>
           <a:p>
             <a:pPr lvl="0" eaLnBrk="1" latinLnBrk="0" hangingPunct="1"/>
@@ -1778,14 +1387,18 @@
             <p:ph type="title"/>
           </p:nvPr>
         </p:nvSpPr>
-        <p:spPr/>
-        <p:txBody>
-          <a:bodyPr/>
+        <p:spPr>
+          <a:xfrm>
+            <a:off x="457200" y="704088"/>
+            <a:ext cx="8229600" cy="1143000"/>
+          </a:xfrm>
+        </p:spPr>
+        <p:txBody>
+          <a:bodyPr tIns="45720" anchor="b"/>
           <a:lstStyle>
             <a:lvl1pPr>
               <a:defRPr/>
             </a:lvl1pPr>
-            <a:extLst/>
           </a:lstStyle>
           <a:p>
             <a:r>
@@ -1808,50 +1421,94 @@
         </p:nvSpPr>
         <p:spPr>
           <a:xfrm>
-            <a:off x="457200" y="1698987"/>
-            <a:ext cx="4040188" cy="715355"/>
+            <a:off x="457200" y="1855248"/>
+            <a:ext cx="4040188" cy="659352"/>
           </a:xfrm>
         </p:spPr>
         <p:txBody>
-          <a:bodyPr lIns="146304" anchor="ctr"/>
+          <a:bodyPr lIns="45720" tIns="0" rIns="45720" bIns="0" anchor="ctr">
+            <a:noAutofit/>
+          </a:bodyPr>
           <a:lstStyle>
             <a:lvl1pPr marL="0" indent="0">
               <a:buNone/>
-              <a:defRPr sz="2300" b="1" cap="all" baseline="0"/>
+              <a:defRPr sz="2400" b="1" cap="none" baseline="0">
+                <a:solidFill>
+                  <a:schemeClr val="tx2"/>
+                </a:solidFill>
+                <a:effectLst/>
+              </a:defRPr>
             </a:lvl1pPr>
-            <a:lvl2pPr marL="457200" indent="0">
+            <a:lvl2pPr>
               <a:buNone/>
               <a:defRPr sz="2000" b="1"/>
             </a:lvl2pPr>
-            <a:lvl3pPr marL="914400" indent="0">
+            <a:lvl3pPr>
               <a:buNone/>
               <a:defRPr sz="1800" b="1"/>
             </a:lvl3pPr>
-            <a:lvl4pPr marL="1371600" indent="0">
+            <a:lvl4pPr>
               <a:buNone/>
               <a:defRPr sz="1600" b="1"/>
             </a:lvl4pPr>
-            <a:lvl5pPr marL="1828800" indent="0">
+            <a:lvl5pPr>
               <a:buNone/>
               <a:defRPr sz="1600" b="1"/>
             </a:lvl5pPr>
-            <a:lvl6pPr marL="2286000" indent="0">
+          </a:lstStyle>
+          <a:p>
+            <a:pPr lvl="0" eaLnBrk="1" latinLnBrk="0" hangingPunct="1"/>
+            <a:r>
+              <a:rPr kumimoji="0" lang="ru-RU" smtClean="0"/>
+              <a:t>Образец текста</a:t>
+            </a:r>
+          </a:p>
+        </p:txBody>
+      </p:sp>
+      <p:sp>
+        <p:nvSpPr>
+          <p:cNvPr id="4" name="Текст 3"/>
+          <p:cNvSpPr>
+            <a:spLocks noGrp="1"/>
+          </p:cNvSpPr>
+          <p:nvPr>
+            <p:ph type="body" sz="half" idx="3"/>
+          </p:nvPr>
+        </p:nvSpPr>
+        <p:spPr>
+          <a:xfrm>
+            <a:off x="4645025" y="1859757"/>
+            <a:ext cx="4041775" cy="654843"/>
+          </a:xfrm>
+        </p:spPr>
+        <p:txBody>
+          <a:bodyPr lIns="45720" tIns="0" rIns="45720" bIns="0" anchor="ctr"/>
+          <a:lstStyle>
+            <a:lvl1pPr marL="0" indent="0">
+              <a:buNone/>
+              <a:defRPr sz="2400" b="1" cap="none" baseline="0">
+                <a:solidFill>
+                  <a:schemeClr val="tx2"/>
+                </a:solidFill>
+                <a:effectLst/>
+              </a:defRPr>
+            </a:lvl1pPr>
+            <a:lvl2pPr>
+              <a:buNone/>
+              <a:defRPr sz="2000" b="1"/>
+            </a:lvl2pPr>
+            <a:lvl3pPr>
+              <a:buNone/>
+              <a:defRPr sz="1800" b="1"/>
+            </a:lvl3pPr>
+            <a:lvl4pPr>
               <a:buNone/>
               <a:defRPr sz="1600" b="1"/>
-            </a:lvl6pPr>
-            <a:lvl7pPr marL="2743200" indent="0">
+            </a:lvl4pPr>
+            <a:lvl5pPr>
               <a:buNone/>
               <a:defRPr sz="1600" b="1"/>
-            </a:lvl7pPr>
-            <a:lvl8pPr marL="3200400" indent="0">
-              <a:buNone/>
-              <a:defRPr sz="1600" b="1"/>
-            </a:lvl8pPr>
-            <a:lvl9pPr marL="3657600" indent="0">
-              <a:buNone/>
-              <a:defRPr sz="1600" b="1"/>
-            </a:lvl9pPr>
-            <a:extLst/>
+            </a:lvl5pPr>
           </a:lstStyle>
           <a:p>
             <a:pPr lvl="0" eaLnBrk="1" latinLnBrk="0" hangingPunct="1"/>
@@ -1864,25 +1521,25 @@
       </p:sp>
       <p:sp>
         <p:nvSpPr>
-          <p:cNvPr id="4" name="Содержимое 3"/>
-          <p:cNvSpPr>
-            <a:spLocks noGrp="1"/>
-          </p:cNvSpPr>
-          <p:nvPr>
-            <p:ph sz="half" idx="2"/>
+          <p:cNvPr id="5" name="Содержимое 4"/>
+          <p:cNvSpPr>
+            <a:spLocks noGrp="1"/>
+          </p:cNvSpPr>
+          <p:nvPr>
+            <p:ph sz="quarter" idx="2"/>
           </p:nvPr>
         </p:nvSpPr>
         <p:spPr>
           <a:xfrm>
-            <a:off x="457200" y="2449512"/>
-            <a:ext cx="4040188" cy="3951288"/>
+            <a:off x="457200" y="2514600"/>
+            <a:ext cx="4040188" cy="3845720"/>
           </a:xfrm>
         </p:spPr>
         <p:txBody>
-          <a:bodyPr/>
+          <a:bodyPr tIns="0"/>
           <a:lstStyle>
             <a:lvl1pPr>
-              <a:defRPr sz="2400"/>
+              <a:defRPr sz="2200"/>
             </a:lvl1pPr>
             <a:lvl2pPr>
               <a:defRPr sz="2000"/>
@@ -1896,19 +1553,6 @@
             <a:lvl5pPr>
               <a:defRPr sz="1600"/>
             </a:lvl5pPr>
-            <a:lvl6pPr>
-              <a:defRPr sz="1600"/>
-            </a:lvl6pPr>
-            <a:lvl7pPr>
-              <a:defRPr sz="1600"/>
-            </a:lvl7pPr>
-            <a:lvl8pPr>
-              <a:defRPr sz="1600"/>
-            </a:lvl8pPr>
-            <a:lvl9pPr>
-              <a:defRPr sz="1600"/>
-            </a:lvl9pPr>
-            <a:extLst/>
           </a:lstStyle>
           <a:p>
             <a:pPr lvl="0" eaLnBrk="1" latinLnBrk="0" hangingPunct="1"/>
@@ -1950,91 +1594,25 @@
       </p:sp>
       <p:sp>
         <p:nvSpPr>
-          <p:cNvPr id="5" name="Текст 4"/>
-          <p:cNvSpPr>
-            <a:spLocks noGrp="1"/>
-          </p:cNvSpPr>
-          <p:nvPr>
-            <p:ph type="body" sz="quarter" idx="3"/>
+          <p:cNvPr id="6" name="Содержимое 5"/>
+          <p:cNvSpPr>
+            <a:spLocks noGrp="1"/>
+          </p:cNvSpPr>
+          <p:nvPr>
+            <p:ph sz="quarter" idx="4"/>
           </p:nvPr>
         </p:nvSpPr>
         <p:spPr>
           <a:xfrm>
-            <a:off x="4645025" y="1698987"/>
-            <a:ext cx="4041775" cy="715355"/>
+            <a:off x="4645025" y="2514600"/>
+            <a:ext cx="4041775" cy="3845720"/>
           </a:xfrm>
         </p:spPr>
         <p:txBody>
-          <a:bodyPr lIns="146304" anchor="ctr"/>
-          <a:lstStyle>
-            <a:lvl1pPr marL="0" indent="0">
-              <a:buNone/>
-              <a:defRPr sz="2300" b="1" cap="all" baseline="0"/>
-            </a:lvl1pPr>
-            <a:lvl2pPr marL="457200" indent="0">
-              <a:buNone/>
-              <a:defRPr sz="2000" b="1"/>
-            </a:lvl2pPr>
-            <a:lvl3pPr marL="914400" indent="0">
-              <a:buNone/>
-              <a:defRPr sz="1800" b="1"/>
-            </a:lvl3pPr>
-            <a:lvl4pPr marL="1371600" indent="0">
-              <a:buNone/>
-              <a:defRPr sz="1600" b="1"/>
-            </a:lvl4pPr>
-            <a:lvl5pPr marL="1828800" indent="0">
-              <a:buNone/>
-              <a:defRPr sz="1600" b="1"/>
-            </a:lvl5pPr>
-            <a:lvl6pPr marL="2286000" indent="0">
-              <a:buNone/>
-              <a:defRPr sz="1600" b="1"/>
-            </a:lvl6pPr>
-            <a:lvl7pPr marL="2743200" indent="0">
-              <a:buNone/>
-              <a:defRPr sz="1600" b="1"/>
-            </a:lvl7pPr>
-            <a:lvl8pPr marL="3200400" indent="0">
-              <a:buNone/>
-              <a:defRPr sz="1600" b="1"/>
-            </a:lvl8pPr>
-            <a:lvl9pPr marL="3657600" indent="0">
-              <a:buNone/>
-              <a:defRPr sz="1600" b="1"/>
-            </a:lvl9pPr>
-            <a:extLst/>
-          </a:lstStyle>
-          <a:p>
-            <a:pPr lvl="0" eaLnBrk="1" latinLnBrk="0" hangingPunct="1"/>
-            <a:r>
-              <a:rPr kumimoji="0" lang="ru-RU" smtClean="0"/>
-              <a:t>Образец текста</a:t>
-            </a:r>
-          </a:p>
-        </p:txBody>
-      </p:sp>
-      <p:sp>
-        <p:nvSpPr>
-          <p:cNvPr id="6" name="Содержимое 5"/>
-          <p:cNvSpPr>
-            <a:spLocks noGrp="1"/>
-          </p:cNvSpPr>
-          <p:nvPr>
-            <p:ph sz="quarter" idx="4"/>
-          </p:nvPr>
-        </p:nvSpPr>
-        <p:spPr>
-          <a:xfrm>
-            <a:off x="4645025" y="2449512"/>
-            <a:ext cx="4041775" cy="3951288"/>
-          </a:xfrm>
-        </p:spPr>
-        <p:txBody>
-          <a:bodyPr/>
+          <a:bodyPr tIns="0"/>
           <a:lstStyle>
             <a:lvl1pPr>
-              <a:defRPr sz="2400"/>
+              <a:defRPr sz="2200"/>
             </a:lvl1pPr>
             <a:lvl2pPr>
               <a:defRPr sz="2000"/>
@@ -2048,19 +1626,6 @@
             <a:lvl5pPr>
               <a:defRPr sz="1600"/>
             </a:lvl5pPr>
-            <a:lvl6pPr>
-              <a:defRPr sz="1600"/>
-            </a:lvl6pPr>
-            <a:lvl7pPr>
-              <a:defRPr sz="1600"/>
-            </a:lvl7pPr>
-            <a:lvl8pPr>
-              <a:defRPr sz="1600"/>
-            </a:lvl8pPr>
-            <a:lvl9pPr>
-              <a:defRPr sz="1600"/>
-            </a:lvl9pPr>
-            <a:extLst/>
           </a:lstStyle>
           <a:p>
             <a:pPr lvl="0" eaLnBrk="1" latinLnBrk="0" hangingPunct="1"/>
@@ -2202,11 +1767,46 @@
             <p:ph type="title"/>
           </p:nvPr>
         </p:nvSpPr>
-        <p:spPr/>
-        <p:txBody>
-          <a:bodyPr/>
+        <p:spPr>
+          <a:xfrm>
+            <a:off x="457200" y="704088"/>
+            <a:ext cx="8305800" cy="1143000"/>
+          </a:xfrm>
+        </p:spPr>
+        <p:txBody>
+          <a:bodyPr vert="horz" tIns="45720" bIns="0" anchor="b">
+            <a:normAutofit/>
+            <a:scene3d>
+              <a:camera prst="orthographicFront"/>
+              <a:lightRig rig="freezing" dir="t">
+                <a:rot lat="0" lon="0" rev="5640000"/>
+              </a:lightRig>
+            </a:scene3d>
+            <a:sp3d prstMaterial="flat">
+              <a:contourClr>
+                <a:schemeClr val="tx2"/>
+              </a:contourClr>
+            </a:sp3d>
+          </a:bodyPr>
           <a:lstStyle>
-            <a:extLst/>
+            <a:lvl1pPr algn="l" rtl="0">
+              <a:spcBef>
+                <a:spcPct val="0"/>
+              </a:spcBef>
+              <a:buNone/>
+              <a:defRPr sz="5000" b="0">
+                <a:ln>
+                  <a:noFill/>
+                </a:ln>
+                <a:solidFill>
+                  <a:schemeClr val="tx2"/>
+                </a:solidFill>
+                <a:effectLst/>
+                <a:latin typeface="+mj-lt"/>
+                <a:ea typeface="+mj-ea"/>
+                <a:cs typeface="+mj-cs"/>
+              </a:defRPr>
+            </a:lvl1pPr>
           </a:lstStyle>
           <a:p>
             <a:r>
@@ -2293,7 +1893,7 @@
 </file>
 
 <file path=ppt/slideLayouts/slideLayout7.xml><?xml version="1.0" encoding="utf-8"?>
-<p:sldLayout xmlns:a="http://schemas.openxmlformats.org/drawingml/2006/main" xmlns:r="http://schemas.openxmlformats.org/officeDocument/2006/relationships" xmlns:p="http://schemas.openxmlformats.org/presentationml/2006/main" showMasterSp="0" type="blank" preserve="1">
+<p:sldLayout xmlns:a="http://schemas.openxmlformats.org/drawingml/2006/main" xmlns:r="http://schemas.openxmlformats.org/officeDocument/2006/relationships" xmlns:p="http://schemas.openxmlformats.org/presentationml/2006/main" type="blank" preserve="1">
   <p:cSld name="Пустой слайд">
     <p:spTree>
       <p:nvGrpSpPr>
@@ -2413,20 +2013,33 @@
         </p:nvSpPr>
         <p:spPr>
           <a:xfrm>
-            <a:off x="167838" y="152400"/>
-            <a:ext cx="2523744" cy="978408"/>
+            <a:off x="685800" y="514352"/>
+            <a:ext cx="2743200" cy="1162050"/>
           </a:xfrm>
         </p:spPr>
         <p:txBody>
-          <a:bodyPr vert="horz" lIns="73152" rIns="45720" bIns="0" rtlCol="0" anchor="b">
-            <a:normAutofit/>
-            <a:sp3d prstMaterial="matte"/>
+          <a:bodyPr lIns="0" anchor="b">
+            <a:noAutofit/>
           </a:bodyPr>
           <a:lstStyle>
-            <a:lvl1pPr algn="l">
-              <a:defRPr sz="2000" b="0"/>
+            <a:lvl1pPr algn="l" rtl="0">
+              <a:spcBef>
+                <a:spcPct val="0"/>
+              </a:spcBef>
+              <a:buNone/>
+              <a:defRPr sz="2600" b="0">
+                <a:ln>
+                  <a:noFill/>
+                </a:ln>
+                <a:solidFill>
+                  <a:schemeClr val="tx2"/>
+                </a:solidFill>
+                <a:effectLst/>
+                <a:latin typeface="+mj-lt"/>
+                <a:ea typeface="+mj-ea"/>
+                <a:cs typeface="+mj-cs"/>
+              </a:defRPr>
             </a:lvl1pPr>
-            <a:extLst/>
           </a:lstStyle>
           <a:p>
             <a:r>
@@ -2439,28 +2052,77 @@
       </p:sp>
       <p:sp>
         <p:nvSpPr>
-          <p:cNvPr id="3" name="Содержимое 2"/>
-          <p:cNvSpPr>
-            <a:spLocks noGrp="1"/>
-          </p:cNvSpPr>
-          <p:nvPr>
-            <p:ph idx="1"/>
+          <p:cNvPr id="3" name="Текст 2"/>
+          <p:cNvSpPr>
+            <a:spLocks noGrp="1"/>
+          </p:cNvSpPr>
+          <p:nvPr>
+            <p:ph type="body" idx="2"/>
           </p:nvPr>
         </p:nvSpPr>
         <p:spPr>
           <a:xfrm>
-            <a:off x="3019377" y="1743133"/>
-            <a:ext cx="5920641" cy="4558885"/>
+            <a:off x="685800" y="1676400"/>
+            <a:ext cx="2743200" cy="4572000"/>
           </a:xfrm>
         </p:spPr>
         <p:txBody>
-          <a:bodyPr/>
+          <a:bodyPr lIns="18288" rIns="18288"/>
+          <a:lstStyle>
+            <a:lvl1pPr marL="0" indent="0" algn="l">
+              <a:buNone/>
+              <a:defRPr sz="1400"/>
+            </a:lvl1pPr>
+            <a:lvl2pPr indent="0" algn="l">
+              <a:buNone/>
+              <a:defRPr sz="1200"/>
+            </a:lvl2pPr>
+            <a:lvl3pPr indent="0" algn="l">
+              <a:buNone/>
+              <a:defRPr sz="1000"/>
+            </a:lvl3pPr>
+            <a:lvl4pPr indent="0" algn="l">
+              <a:buNone/>
+              <a:defRPr sz="900"/>
+            </a:lvl4pPr>
+            <a:lvl5pPr indent="0" algn="l">
+              <a:buNone/>
+              <a:defRPr sz="900"/>
+            </a:lvl5pPr>
+          </a:lstStyle>
+          <a:p>
+            <a:pPr lvl="0" eaLnBrk="1" latinLnBrk="0" hangingPunct="1"/>
+            <a:r>
+              <a:rPr kumimoji="0" lang="ru-RU" smtClean="0"/>
+              <a:t>Образец текста</a:t>
+            </a:r>
+          </a:p>
+        </p:txBody>
+      </p:sp>
+      <p:sp>
+        <p:nvSpPr>
+          <p:cNvPr id="4" name="Содержимое 3"/>
+          <p:cNvSpPr>
+            <a:spLocks noGrp="1"/>
+          </p:cNvSpPr>
+          <p:nvPr>
+            <p:ph sz="half" idx="1"/>
+          </p:nvPr>
+        </p:nvSpPr>
+        <p:spPr>
+          <a:xfrm>
+            <a:off x="3575050" y="1676400"/>
+            <a:ext cx="5111750" cy="4572000"/>
+          </a:xfrm>
+        </p:spPr>
+        <p:txBody>
+          <a:bodyPr tIns="0"/>
           <a:lstStyle>
             <a:lvl1pPr>
-              <a:defRPr sz="3200"/>
+              <a:defRPr sz="2800"/>
             </a:lvl1pPr>
             <a:lvl2pPr>
-              <a:defRPr sz="2800"/>
+              <a:defRPr sz="2600"/>
             </a:lvl2pPr>
             <a:lvl3pPr>
               <a:defRPr sz="2400"/>
@@ -2469,21 +2131,8 @@
               <a:defRPr sz="2000"/>
             </a:lvl4pPr>
             <a:lvl5pPr>
-              <a:defRPr sz="2000"/>
+              <a:defRPr sz="1800"/>
             </a:lvl5pPr>
-            <a:lvl6pPr>
-              <a:defRPr sz="2000"/>
-            </a:lvl6pPr>
-            <a:lvl7pPr>
-              <a:defRPr sz="2000"/>
-            </a:lvl7pPr>
-            <a:lvl8pPr>
-              <a:defRPr sz="2000"/>
-            </a:lvl8pPr>
-            <a:lvl9pPr>
-              <a:defRPr sz="2000"/>
-            </a:lvl9pPr>
-            <a:extLst/>
           </a:lstStyle>
           <a:p>
             <a:pPr lvl="0" eaLnBrk="1" latinLnBrk="0" hangingPunct="1"/>
@@ -2520,72 +2169,6 @@
               <a:t>Пятый уровень</a:t>
             </a:r>
             <a:endParaRPr kumimoji="0" lang="en-US"/>
-          </a:p>
-        </p:txBody>
-      </p:sp>
-      <p:sp>
-        <p:nvSpPr>
-          <p:cNvPr id="4" name="Текст 3"/>
-          <p:cNvSpPr>
-            <a:spLocks noGrp="1"/>
-          </p:cNvSpPr>
-          <p:nvPr>
-            <p:ph type="body" sz="half" idx="2"/>
-          </p:nvPr>
-        </p:nvSpPr>
-        <p:spPr>
-          <a:xfrm>
-            <a:off x="167838" y="1730018"/>
-            <a:ext cx="2468880" cy="4572000"/>
-          </a:xfrm>
-        </p:spPr>
-        <p:txBody>
-          <a:bodyPr/>
-          <a:lstStyle>
-            <a:lvl1pPr marL="0" indent="0">
-              <a:buNone/>
-              <a:defRPr sz="1400"/>
-            </a:lvl1pPr>
-            <a:lvl2pPr marL="457200" indent="0">
-              <a:buNone/>
-              <a:defRPr sz="1200"/>
-            </a:lvl2pPr>
-            <a:lvl3pPr marL="914400" indent="0">
-              <a:buNone/>
-              <a:defRPr sz="1000"/>
-            </a:lvl3pPr>
-            <a:lvl4pPr marL="1371600" indent="0">
-              <a:buNone/>
-              <a:defRPr sz="900"/>
-            </a:lvl4pPr>
-            <a:lvl5pPr marL="1828800" indent="0">
-              <a:buNone/>
-              <a:defRPr sz="900"/>
-            </a:lvl5pPr>
-            <a:lvl6pPr marL="2286000" indent="0">
-              <a:buNone/>
-              <a:defRPr sz="900"/>
-            </a:lvl6pPr>
-            <a:lvl7pPr marL="2743200" indent="0">
-              <a:buNone/>
-              <a:defRPr sz="900"/>
-            </a:lvl7pPr>
-            <a:lvl8pPr marL="3200400" indent="0">
-              <a:buNone/>
-              <a:defRPr sz="900"/>
-            </a:lvl8pPr>
-            <a:lvl9pPr marL="3657600" indent="0">
-              <a:buNone/>
-              <a:defRPr sz="900"/>
-            </a:lvl9pPr>
-            <a:extLst/>
-          </a:lstStyle>
-          <a:p>
-            <a:pPr lvl="0" eaLnBrk="1" latinLnBrk="0" hangingPunct="1"/>
-            <a:r>
-              <a:rPr kumimoji="0" lang="ru-RU" smtClean="0"/>
-              <a:t>Образец текста</a:t>
-            </a:r>
           </a:p>
         </p:txBody>
       </p:sp>
@@ -2653,100 +2236,6 @@
               <a:t>‹#›</a:t>
             </a:fld>
             <a:endParaRPr lang="ru-RU"/>
-          </a:p>
-        </p:txBody>
-      </p:sp>
-      <p:sp>
-        <p:nvSpPr>
-          <p:cNvPr id="12" name="Прямоугольник 11"/>
-          <p:cNvSpPr/>
-          <p:nvPr/>
-        </p:nvSpPr>
-        <p:spPr bwMode="invGray">
-          <a:xfrm>
-            <a:off x="2855737" y="0"/>
-            <a:ext cx="45720" cy="1453896"/>
-          </a:xfrm>
-          <a:prstGeom prst="rect">
-            <a:avLst/>
-          </a:prstGeom>
-          <a:solidFill>
-            <a:srgbClr val="FFFFFF"/>
-          </a:solidFill>
-          <a:ln w="48000" cap="flat" cmpd="thickThin" algn="ctr">
-            <a:noFill/>
-            <a:prstDash val="solid"/>
-          </a:ln>
-        </p:spPr>
-        <p:style>
-          <a:lnRef idx="2">
-            <a:schemeClr val="accent1"/>
-          </a:lnRef>
-          <a:fillRef idx="1">
-            <a:schemeClr val="accent1"/>
-          </a:fillRef>
-          <a:effectRef idx="0">
-            <a:schemeClr val="accent1"/>
-          </a:effectRef>
-          <a:fontRef idx="minor">
-            <a:schemeClr val="lt1"/>
-          </a:fontRef>
-        </p:style>
-        <p:txBody>
-          <a:bodyPr rtlCol="0" anchor="ctr"/>
-          <a:lstStyle>
-            <a:extLst/>
-          </a:lstStyle>
-          <a:p>
-            <a:pPr algn="ctr" eaLnBrk="1" latinLnBrk="0" hangingPunct="1"/>
-            <a:endParaRPr kumimoji="0" lang="en-US"/>
-          </a:p>
-        </p:txBody>
-      </p:sp>
-      <p:sp>
-        <p:nvSpPr>
-          <p:cNvPr id="9" name="Прямоугольник 8"/>
-          <p:cNvSpPr/>
-          <p:nvPr/>
-        </p:nvSpPr>
-        <p:spPr bwMode="invGray">
-          <a:xfrm>
-            <a:off x="2855737" y="0"/>
-            <a:ext cx="45720" cy="1453896"/>
-          </a:xfrm>
-          <a:prstGeom prst="rect">
-            <a:avLst/>
-          </a:prstGeom>
-          <a:solidFill>
-            <a:srgbClr val="FFFFFF"/>
-          </a:solidFill>
-          <a:ln w="48000" cap="flat" cmpd="thickThin" algn="ctr">
-            <a:noFill/>
-            <a:prstDash val="solid"/>
-          </a:ln>
-        </p:spPr>
-        <p:style>
-          <a:lnRef idx="2">
-            <a:schemeClr val="accent1"/>
-          </a:lnRef>
-          <a:fillRef idx="1">
-            <a:schemeClr val="accent1"/>
-          </a:fillRef>
-          <a:effectRef idx="0">
-            <a:schemeClr val="accent1"/>
-          </a:effectRef>
-          <a:fontRef idx="minor">
-            <a:schemeClr val="lt1"/>
-          </a:fontRef>
-        </p:style>
-        <p:txBody>
-          <a:bodyPr rtlCol="0" anchor="ctr"/>
-          <a:lstStyle>
-            <a:extLst/>
-          </a:lstStyle>
-          <a:p>
-            <a:pPr algn="ctr" eaLnBrk="1" latinLnBrk="0" hangingPunct="1"/>
-            <a:endParaRPr kumimoji="0" lang="en-US"/>
           </a:p>
         </p:txBody>
       </p:sp>
@@ -2759,13 +2248,8 @@
 </file>
 
 <file path=ppt/slideLayouts/slideLayout9.xml><?xml version="1.0" encoding="utf-8"?>
-<p:sldLayout xmlns:a="http://schemas.openxmlformats.org/drawingml/2006/main" xmlns:r="http://schemas.openxmlformats.org/officeDocument/2006/relationships" xmlns:p="http://schemas.openxmlformats.org/presentationml/2006/main" type="picTx" preserve="1">
+<p:sldLayout xmlns:a="http://schemas.openxmlformats.org/drawingml/2006/main" xmlns:r="http://schemas.openxmlformats.org/officeDocument/2006/relationships" xmlns:p="http://schemas.openxmlformats.org/presentationml/2006/main" showMasterSp="0" type="picTx" preserve="1">
   <p:cSld name="Рисунок с подписью">
-    <p:bg>
-      <p:bgRef idx="1001">
-        <a:schemeClr val="bg2"/>
-      </p:bgRef>
-    </p:bg>
     <p:spTree>
       <p:nvGrpSpPr>
         <p:cNvPr id="1" name=""/>
@@ -2782,417 +2266,34 @@
       </p:grpSpPr>
       <p:sp>
         <p:nvSpPr>
-          <p:cNvPr id="2" name="Заголовок 1"/>
-          <p:cNvSpPr>
-            <a:spLocks noGrp="1"/>
-          </p:cNvSpPr>
-          <p:nvPr>
-            <p:ph type="title"/>
-          </p:nvPr>
-        </p:nvSpPr>
-        <p:spPr>
-          <a:xfrm>
-            <a:off x="164592" y="155448"/>
-            <a:ext cx="2525150" cy="978408"/>
-          </a:xfrm>
-        </p:spPr>
-        <p:txBody>
-          <a:bodyPr lIns="73152" bIns="0" anchor="b">
-            <a:sp3d prstMaterial="matte"/>
-          </a:bodyPr>
-          <a:lstStyle>
-            <a:lvl1pPr algn="l">
-              <a:defRPr sz="2000" b="0"/>
-            </a:lvl1pPr>
-            <a:extLst/>
-          </a:lstStyle>
-          <a:p>
-            <a:r>
-              <a:rPr kumimoji="0" lang="ru-RU" smtClean="0"/>
-              <a:t>Образец заголовка</a:t>
-            </a:r>
-            <a:endParaRPr kumimoji="0" lang="en-US"/>
-          </a:p>
-        </p:txBody>
-      </p:sp>
-      <p:sp>
-        <p:nvSpPr>
-          <p:cNvPr id="3" name="Рисунок 2"/>
-          <p:cNvSpPr>
-            <a:spLocks noGrp="1"/>
-          </p:cNvSpPr>
-          <p:nvPr>
-            <p:ph type="pic" idx="1"/>
-          </p:nvPr>
-        </p:nvSpPr>
-        <p:spPr>
-          <a:xfrm>
-            <a:off x="2903805" y="1484808"/>
-            <a:ext cx="6247397" cy="5373192"/>
-          </a:xfrm>
-          <a:solidFill>
-            <a:schemeClr val="bg2">
-              <a:shade val="75000"/>
-            </a:schemeClr>
-          </a:solidFill>
-        </p:spPr>
-        <p:txBody>
-          <a:bodyPr/>
-          <a:lstStyle>
-            <a:lvl1pPr marL="0" indent="0">
-              <a:buNone/>
-              <a:defRPr sz="3200"/>
-            </a:lvl1pPr>
-            <a:lvl2pPr marL="457200" indent="0">
-              <a:buNone/>
-              <a:defRPr sz="2800"/>
-            </a:lvl2pPr>
-            <a:lvl3pPr marL="914400" indent="0">
-              <a:buNone/>
-              <a:defRPr sz="2400"/>
-            </a:lvl3pPr>
-            <a:lvl4pPr marL="1371600" indent="0">
-              <a:buNone/>
-              <a:defRPr sz="2000"/>
-            </a:lvl4pPr>
-            <a:lvl5pPr marL="1828800" indent="0">
-              <a:buNone/>
-              <a:defRPr sz="2000"/>
-            </a:lvl5pPr>
-            <a:lvl6pPr marL="2286000" indent="0">
-              <a:buNone/>
-              <a:defRPr sz="2000"/>
-            </a:lvl6pPr>
-            <a:lvl7pPr marL="2743200" indent="0">
-              <a:buNone/>
-              <a:defRPr sz="2000"/>
-            </a:lvl7pPr>
-            <a:lvl8pPr marL="3200400" indent="0">
-              <a:buNone/>
-              <a:defRPr sz="2000"/>
-            </a:lvl8pPr>
-            <a:lvl9pPr marL="3657600" indent="0">
-              <a:buNone/>
-              <a:defRPr sz="2000"/>
-            </a:lvl9pPr>
-            <a:extLst/>
-          </a:lstStyle>
-          <a:p>
-            <a:r>
-              <a:rPr kumimoji="0" lang="ru-RU" smtClean="0"/>
-              <a:t>Вставка рисунка</a:t>
-            </a:r>
-            <a:endParaRPr kumimoji="0" lang="en-US" dirty="0"/>
-          </a:p>
-        </p:txBody>
-      </p:sp>
-      <p:sp>
-        <p:nvSpPr>
-          <p:cNvPr id="4" name="Текст 3"/>
-          <p:cNvSpPr>
-            <a:spLocks noGrp="1"/>
-          </p:cNvSpPr>
-          <p:nvPr>
-            <p:ph type="body" sz="half" idx="2"/>
-          </p:nvPr>
-        </p:nvSpPr>
-        <p:spPr>
-          <a:xfrm>
-            <a:off x="164592" y="1728216"/>
-            <a:ext cx="2468880" cy="4572000"/>
-          </a:xfrm>
-        </p:spPr>
-        <p:txBody>
-          <a:bodyPr/>
-          <a:lstStyle>
-            <a:lvl1pPr marL="0" indent="0">
-              <a:buNone/>
-              <a:defRPr sz="1400"/>
-            </a:lvl1pPr>
-            <a:lvl2pPr marL="457200" indent="0">
-              <a:buNone/>
-              <a:defRPr sz="1200"/>
-            </a:lvl2pPr>
-            <a:lvl3pPr marL="914400" indent="0">
-              <a:buNone/>
-              <a:defRPr sz="1000"/>
-            </a:lvl3pPr>
-            <a:lvl4pPr marL="1371600" indent="0">
-              <a:buNone/>
-              <a:defRPr sz="900"/>
-            </a:lvl4pPr>
-            <a:lvl5pPr marL="1828800" indent="0">
-              <a:buNone/>
-              <a:defRPr sz="900"/>
-            </a:lvl5pPr>
-            <a:lvl6pPr marL="2286000" indent="0">
-              <a:buNone/>
-              <a:defRPr sz="900"/>
-            </a:lvl6pPr>
-            <a:lvl7pPr marL="2743200" indent="0">
-              <a:buNone/>
-              <a:defRPr sz="900"/>
-            </a:lvl7pPr>
-            <a:lvl8pPr marL="3200400" indent="0">
-              <a:buNone/>
-              <a:defRPr sz="900"/>
-            </a:lvl8pPr>
-            <a:lvl9pPr marL="3657600" indent="0">
-              <a:buNone/>
-              <a:defRPr sz="900"/>
-            </a:lvl9pPr>
-            <a:extLst/>
-          </a:lstStyle>
-          <a:p>
-            <a:pPr lvl="0" eaLnBrk="1" latinLnBrk="0" hangingPunct="1"/>
-            <a:r>
-              <a:rPr kumimoji="0" lang="ru-RU" smtClean="0"/>
-              <a:t>Образец текста</a:t>
-            </a:r>
-          </a:p>
-        </p:txBody>
-      </p:sp>
-      <p:sp>
-        <p:nvSpPr>
-          <p:cNvPr id="5" name="Дата 4"/>
-          <p:cNvSpPr>
-            <a:spLocks noGrp="1"/>
-          </p:cNvSpPr>
-          <p:nvPr>
-            <p:ph type="dt" sz="half" idx="10"/>
-          </p:nvPr>
-        </p:nvSpPr>
-        <p:spPr>
-          <a:xfrm>
-            <a:off x="164592" y="1170432"/>
-            <a:ext cx="2523744" cy="201168"/>
-          </a:xfrm>
-        </p:spPr>
-        <p:txBody>
-          <a:bodyPr/>
-          <a:lstStyle/>
-          <a:p>
-            <a:fld id="{5B106E36-FD25-4E2D-B0AA-010F637433A0}" type="datetimeFigureOut">
-              <a:rPr lang="ru-RU" smtClean="0"/>
-              <a:pPr/>
-              <a:t>28.02.2023</a:t>
-            </a:fld>
-            <a:endParaRPr lang="ru-RU"/>
-          </a:p>
-        </p:txBody>
-      </p:sp>
-      <p:sp>
-        <p:nvSpPr>
-          <p:cNvPr id="11" name="Прямоугольник 10"/>
+          <p:cNvPr id="9" name="Прямоугольник с одним вырезанным скругленным углом 8"/>
           <p:cNvSpPr/>
           <p:nvPr/>
         </p:nvSpPr>
         <p:spPr>
-          <a:xfrm>
-            <a:off x="2855737" y="0"/>
-            <a:ext cx="45720" cy="6858000"/>
+          <a:xfrm rot="420000" flipV="1">
+            <a:off x="3165753" y="1108077"/>
+            <a:ext cx="5257800" cy="4114800"/>
           </a:xfrm>
-          <a:prstGeom prst="rect">
-            <a:avLst/>
+          <a:prstGeom prst="snipRoundRect">
+            <a:avLst>
+              <a:gd name="adj1" fmla="val 0"/>
+              <a:gd name="adj2" fmla="val 3646"/>
+            </a:avLst>
           </a:prstGeom>
           <a:solidFill>
             <a:srgbClr val="FFFFFF"/>
           </a:solidFill>
-          <a:ln w="48000" cap="flat" cmpd="thickThin" algn="ctr">
-            <a:noFill/>
-            <a:prstDash val="solid"/>
-          </a:ln>
-        </p:spPr>
-        <p:style>
-          <a:lnRef idx="2">
-            <a:schemeClr val="accent1"/>
-          </a:lnRef>
-          <a:fillRef idx="1">
-            <a:schemeClr val="accent1"/>
-          </a:fillRef>
-          <a:effectRef idx="0">
-            <a:schemeClr val="accent1"/>
-          </a:effectRef>
-          <a:fontRef idx="minor">
-            <a:schemeClr val="lt1"/>
-          </a:fontRef>
-        </p:style>
-        <p:txBody>
-          <a:bodyPr rtlCol="0" anchor="ctr"/>
-          <a:lstStyle>
-            <a:extLst/>
-          </a:lstStyle>
-          <a:p>
-            <a:pPr algn="ctr" eaLnBrk="1" latinLnBrk="0" hangingPunct="1"/>
-            <a:endParaRPr kumimoji="0" lang="en-US"/>
-          </a:p>
-        </p:txBody>
-      </p:sp>
-      <p:sp>
-        <p:nvSpPr>
-          <p:cNvPr id="9" name="Прямоугольник 8"/>
-          <p:cNvSpPr/>
-          <p:nvPr/>
-        </p:nvSpPr>
-        <p:spPr bwMode="invGray">
-          <a:xfrm>
-            <a:off x="2855737" y="0"/>
-            <a:ext cx="45720" cy="6858000"/>
-          </a:xfrm>
-          <a:prstGeom prst="rect">
-            <a:avLst/>
-          </a:prstGeom>
-          <a:solidFill>
-            <a:srgbClr val="FFFFFF"/>
-          </a:solidFill>
-          <a:ln w="48000" cap="flat" cmpd="thickThin" algn="ctr">
-            <a:noFill/>
-            <a:prstDash val="solid"/>
-          </a:ln>
-        </p:spPr>
-        <p:style>
-          <a:lnRef idx="2">
-            <a:schemeClr val="accent1"/>
-          </a:lnRef>
-          <a:fillRef idx="1">
-            <a:schemeClr val="accent1"/>
-          </a:fillRef>
-          <a:effectRef idx="0">
-            <a:schemeClr val="accent1"/>
-          </a:effectRef>
-          <a:fontRef idx="minor">
-            <a:schemeClr val="lt1"/>
-          </a:fontRef>
-        </p:style>
-        <p:txBody>
-          <a:bodyPr rtlCol="0" anchor="ctr"/>
-          <a:lstStyle>
-            <a:extLst/>
-          </a:lstStyle>
-          <a:p>
-            <a:pPr algn="ctr" eaLnBrk="1" latinLnBrk="0" hangingPunct="1"/>
-            <a:endParaRPr kumimoji="0" lang="en-US"/>
-          </a:p>
-        </p:txBody>
-      </p:sp>
-      <p:sp>
-        <p:nvSpPr>
-          <p:cNvPr id="6" name="Нижний колонтитул 5"/>
-          <p:cNvSpPr>
-            <a:spLocks noGrp="1"/>
-          </p:cNvSpPr>
-          <p:nvPr>
-            <p:ph type="ftr" sz="quarter" idx="11"/>
-          </p:nvPr>
-        </p:nvSpPr>
-        <p:spPr>
-          <a:xfrm>
-            <a:off x="3035808" y="1170432"/>
-            <a:ext cx="5193792" cy="201168"/>
-          </a:xfrm>
-        </p:spPr>
-        <p:txBody>
-          <a:bodyPr/>
-          <a:lstStyle>
-            <a:lvl1pPr>
-              <a:defRPr>
-                <a:solidFill>
-                  <a:schemeClr val="bg1">
-                    <a:shade val="50000"/>
-                  </a:schemeClr>
-                </a:solidFill>
-              </a:defRPr>
-            </a:lvl1pPr>
-          </a:lstStyle>
-          <a:p>
-            <a:endParaRPr lang="ru-RU"/>
-          </a:p>
-        </p:txBody>
-      </p:sp>
-      <p:sp>
-        <p:nvSpPr>
-          <p:cNvPr id="7" name="Номер слайда 6"/>
-          <p:cNvSpPr>
-            <a:spLocks noGrp="1"/>
-          </p:cNvSpPr>
-          <p:nvPr>
-            <p:ph type="sldNum" sz="quarter" idx="12"/>
-          </p:nvPr>
-        </p:nvSpPr>
-        <p:spPr>
-          <a:xfrm>
-            <a:off x="8339328" y="1170432"/>
-            <a:ext cx="733864" cy="201168"/>
-          </a:xfrm>
-        </p:spPr>
-        <p:txBody>
-          <a:bodyPr/>
-          <a:lstStyle/>
-          <a:p>
-            <a:fld id="{725C68B6-61C2-468F-89AB-4B9F7531AA68}" type="slidenum">
-              <a:rPr lang="ru-RU" smtClean="0"/>
-              <a:pPr/>
-              <a:t>‹#›</a:t>
-            </a:fld>
-            <a:endParaRPr lang="ru-RU"/>
-          </a:p>
-        </p:txBody>
-      </p:sp>
-    </p:spTree>
-  </p:cSld>
-  <p:clrMapOvr>
-    <a:overrideClrMapping bg1="lt1" tx1="dk1" bg2="lt2" tx2="dk2" accent1="accent1" accent2="accent2" accent3="accent3" accent4="accent4" accent5="accent5" accent6="accent6" hlink="hlink" folHlink="folHlink"/>
-  </p:clrMapOvr>
-</p:sldLayout>
-</file>
-
-<file path=ppt/slideMasters/slideMaster1.xml><?xml version="1.0" encoding="utf-8"?>
-<p:sldMaster xmlns:a="http://schemas.openxmlformats.org/drawingml/2006/main" xmlns:r="http://schemas.openxmlformats.org/officeDocument/2006/relationships" xmlns:p="http://schemas.openxmlformats.org/presentationml/2006/main">
-  <p:cSld>
-    <p:bg>
-      <p:bgRef idx="1001">
-        <a:schemeClr val="bg1"/>
-      </p:bgRef>
-    </p:bg>
-    <p:spTree>
-      <p:nvGrpSpPr>
-        <p:cNvPr id="1" name=""/>
-        <p:cNvGrpSpPr/>
-        <p:nvPr/>
-      </p:nvGrpSpPr>
-      <p:grpSpPr>
-        <a:xfrm>
-          <a:off x="0" y="0"/>
-          <a:ext cx="0" cy="0"/>
-          <a:chOff x="0" y="0"/>
-          <a:chExt cx="0" cy="0"/>
-        </a:xfrm>
-      </p:grpSpPr>
-      <p:sp>
-        <p:nvSpPr>
-          <p:cNvPr id="10" name="Прямоугольник 9"/>
-          <p:cNvSpPr/>
-          <p:nvPr/>
-        </p:nvSpPr>
-        <p:spPr bwMode="invGray">
-          <a:xfrm>
-            <a:off x="0" y="1435895"/>
-            <a:ext cx="9144000" cy="45720"/>
-          </a:xfrm>
-          <a:prstGeom prst="rect">
-            <a:avLst/>
-          </a:prstGeom>
-          <a:solidFill>
-            <a:srgbClr val="FFFFFF"/>
-          </a:solidFill>
-          <a:ln w="48000" cap="flat" cmpd="thickThin" algn="ctr">
-            <a:noFill/>
+          <a:ln w="3175" cap="rnd" cmpd="sng" algn="ctr">
+            <a:solidFill>
+              <a:srgbClr val="C0C0C0"/>
+            </a:solidFill>
             <a:prstDash val="solid"/>
           </a:ln>
           <a:effectLst>
-            <a:outerShdw blurRad="31750" dist="10160" dir="5400000" algn="tl" rotWithShape="0">
+            <a:outerShdw blurRad="63500" dist="38500" dir="7500000" sx="98500" sy="100080" kx="100000" algn="tl" rotWithShape="0">
               <a:srgbClr val="000000">
-                <a:alpha val="60000"/>
+                <a:alpha val="25000"/>
               </a:srgbClr>
             </a:outerShdw>
           </a:effectLst>
@@ -3213,9 +2314,7 @@
         </p:style>
         <p:txBody>
           <a:bodyPr rtlCol="0" anchor="ctr"/>
-          <a:lstStyle>
-            <a:extLst/>
-          </a:lstStyle>
+          <a:lstStyle/>
           <a:p>
             <a:pPr algn="ctr" eaLnBrk="1" latinLnBrk="0" hangingPunct="1"/>
             <a:endParaRPr kumimoji="0" lang="en-US"/>
@@ -3224,25 +2323,35 @@
       </p:sp>
       <p:sp>
         <p:nvSpPr>
-          <p:cNvPr id="7" name="Прямоугольник 6"/>
+          <p:cNvPr id="12" name="Прямоугольный треугольник 11"/>
           <p:cNvSpPr/>
           <p:nvPr/>
         </p:nvSpPr>
-        <p:spPr bwMode="ltGray">
-          <a:xfrm>
-            <a:off x="0" y="0"/>
-            <a:ext cx="9143999" cy="1433733"/>
+        <p:spPr>
+          <a:xfrm rot="420000" flipV="1">
+            <a:off x="8004134" y="5359769"/>
+            <a:ext cx="155448" cy="155448"/>
           </a:xfrm>
-          <a:prstGeom prst="rect">
+          <a:prstGeom prst="rtTriangle">
             <a:avLst/>
           </a:prstGeom>
           <a:solidFill>
-            <a:srgbClr val="000000"/>
+            <a:srgbClr val="FFFFFF"/>
           </a:solidFill>
-          <a:ln w="48000" cap="flat" cmpd="thickThin" algn="ctr">
-            <a:noFill/>
+          <a:ln w="12700" cap="flat" cmpd="sng" algn="ctr">
+            <a:solidFill>
+              <a:srgbClr val="FFFFFF"/>
+            </a:solidFill>
             <a:prstDash val="solid"/>
+            <a:bevel/>
           </a:ln>
+          <a:effectLst>
+            <a:outerShdw blurRad="19685" dist="6350" dir="12900000" algn="tl" rotWithShape="0">
+              <a:srgbClr val="000000">
+                <a:alpha val="47000"/>
+              </a:srgbClr>
+            </a:outerShdw>
+          </a:effectLst>
         </p:spPr>
         <p:style>
           <a:lnRef idx="2">
@@ -3260,9 +2369,7 @@
         </p:style>
         <p:txBody>
           <a:bodyPr rtlCol="0" anchor="ctr"/>
-          <a:lstStyle>
-            <a:extLst/>
-          </a:lstStyle>
+          <a:lstStyle/>
           <a:p>
             <a:pPr algn="ctr" eaLnBrk="1" latinLnBrk="0" hangingPunct="1"/>
             <a:endParaRPr kumimoji="0" lang="en-US"/>
@@ -3281,29 +2388,764 @@
         </p:nvSpPr>
         <p:spPr>
           <a:xfrm>
-            <a:off x="457200" y="152400"/>
-            <a:ext cx="8229600" cy="1251062"/>
+            <a:off x="609600" y="1176996"/>
+            <a:ext cx="2212848" cy="1582621"/>
+          </a:xfrm>
+        </p:spPr>
+        <p:txBody>
+          <a:bodyPr vert="horz" lIns="45720" tIns="45720" rIns="45720" bIns="45720" anchor="b"/>
+          <a:lstStyle>
+            <a:lvl1pPr algn="l">
+              <a:buNone/>
+              <a:defRPr sz="2000" b="1">
+                <a:solidFill>
+                  <a:schemeClr val="tx2"/>
+                </a:solidFill>
+              </a:defRPr>
+            </a:lvl1pPr>
+          </a:lstStyle>
+          <a:p>
+            <a:r>
+              <a:rPr kumimoji="0" lang="ru-RU" smtClean="0"/>
+              <a:t>Образец заголовка</a:t>
+            </a:r>
+            <a:endParaRPr kumimoji="0" lang="en-US"/>
+          </a:p>
+        </p:txBody>
+      </p:sp>
+      <p:sp>
+        <p:nvSpPr>
+          <p:cNvPr id="4" name="Текст 3"/>
+          <p:cNvSpPr>
+            <a:spLocks noGrp="1"/>
+          </p:cNvSpPr>
+          <p:nvPr>
+            <p:ph type="body" sz="half" idx="2"/>
+          </p:nvPr>
+        </p:nvSpPr>
+        <p:spPr>
+          <a:xfrm>
+            <a:off x="609600" y="2828785"/>
+            <a:ext cx="2209800" cy="2179320"/>
+          </a:xfrm>
+        </p:spPr>
+        <p:txBody>
+          <a:bodyPr lIns="64008" rIns="45720" bIns="45720" anchor="t"/>
+          <a:lstStyle>
+            <a:lvl1pPr marL="0" indent="0" algn="l">
+              <a:spcBef>
+                <a:spcPts val="250"/>
+              </a:spcBef>
+              <a:buFontTx/>
+              <a:buNone/>
+              <a:defRPr sz="1300"/>
+            </a:lvl1pPr>
+            <a:lvl2pPr>
+              <a:defRPr sz="1200"/>
+            </a:lvl2pPr>
+            <a:lvl3pPr>
+              <a:defRPr sz="1000"/>
+            </a:lvl3pPr>
+            <a:lvl4pPr>
+              <a:defRPr sz="900"/>
+            </a:lvl4pPr>
+            <a:lvl5pPr>
+              <a:defRPr sz="900"/>
+            </a:lvl5pPr>
+          </a:lstStyle>
+          <a:p>
+            <a:pPr lvl="0" eaLnBrk="1" latinLnBrk="0" hangingPunct="1"/>
+            <a:r>
+              <a:rPr kumimoji="0" lang="ru-RU" smtClean="0"/>
+              <a:t>Образец текста</a:t>
+            </a:r>
+          </a:p>
+        </p:txBody>
+      </p:sp>
+      <p:sp>
+        <p:nvSpPr>
+          <p:cNvPr id="5" name="Дата 4"/>
+          <p:cNvSpPr>
+            <a:spLocks noGrp="1"/>
+          </p:cNvSpPr>
+          <p:nvPr>
+            <p:ph type="dt" sz="half" idx="10"/>
+          </p:nvPr>
+        </p:nvSpPr>
+        <p:spPr/>
+        <p:txBody>
+          <a:bodyPr/>
+          <a:lstStyle/>
+          <a:p>
+            <a:fld id="{5B106E36-FD25-4E2D-B0AA-010F637433A0}" type="datetimeFigureOut">
+              <a:rPr lang="ru-RU" smtClean="0"/>
+              <a:pPr/>
+              <a:t>28.02.2023</a:t>
+            </a:fld>
+            <a:endParaRPr lang="ru-RU"/>
+          </a:p>
+        </p:txBody>
+      </p:sp>
+      <p:sp>
+        <p:nvSpPr>
+          <p:cNvPr id="6" name="Нижний колонтитул 5"/>
+          <p:cNvSpPr>
+            <a:spLocks noGrp="1"/>
+          </p:cNvSpPr>
+          <p:nvPr>
+            <p:ph type="ftr" sz="quarter" idx="11"/>
+          </p:nvPr>
+        </p:nvSpPr>
+        <p:spPr/>
+        <p:txBody>
+          <a:bodyPr/>
+          <a:lstStyle/>
+          <a:p>
+            <a:endParaRPr lang="ru-RU"/>
+          </a:p>
+        </p:txBody>
+      </p:sp>
+      <p:sp>
+        <p:nvSpPr>
+          <p:cNvPr id="7" name="Номер слайда 6"/>
+          <p:cNvSpPr>
+            <a:spLocks noGrp="1"/>
+          </p:cNvSpPr>
+          <p:nvPr>
+            <p:ph type="sldNum" sz="quarter" idx="12"/>
+          </p:nvPr>
+        </p:nvSpPr>
+        <p:spPr>
+          <a:xfrm>
+            <a:off x="8077200" y="6356350"/>
+            <a:ext cx="609600" cy="365125"/>
+          </a:xfrm>
+        </p:spPr>
+        <p:txBody>
+          <a:bodyPr/>
+          <a:lstStyle/>
+          <a:p>
+            <a:fld id="{725C68B6-61C2-468F-89AB-4B9F7531AA68}" type="slidenum">
+              <a:rPr lang="ru-RU" smtClean="0"/>
+              <a:pPr/>
+              <a:t>‹#›</a:t>
+            </a:fld>
+            <a:endParaRPr lang="ru-RU"/>
+          </a:p>
+        </p:txBody>
+      </p:sp>
+      <p:sp>
+        <p:nvSpPr>
+          <p:cNvPr id="3" name="Рисунок 2"/>
+          <p:cNvSpPr>
+            <a:spLocks noGrp="1"/>
+          </p:cNvSpPr>
+          <p:nvPr>
+            <p:ph type="pic" idx="1"/>
+          </p:nvPr>
+        </p:nvSpPr>
+        <p:spPr>
+          <a:xfrm rot="420000">
+            <a:off x="3485793" y="1199517"/>
+            <a:ext cx="4617720" cy="3931920"/>
+          </a:xfrm>
+          <a:prstGeom prst="rect">
+            <a:avLst/>
+          </a:prstGeom>
+          <a:solidFill>
+            <a:schemeClr val="bg2"/>
+          </a:solidFill>
+          <a:ln w="3000" cap="rnd">
+            <a:solidFill>
+              <a:srgbClr val="C0C0C0"/>
+            </a:solidFill>
+            <a:round/>
+          </a:ln>
+          <a:effectLst/>
+        </p:spPr>
+        <p:txBody>
+          <a:bodyPr/>
+          <a:lstStyle>
+            <a:lvl1pPr marL="0" indent="0">
+              <a:buNone/>
+              <a:defRPr sz="3200"/>
+            </a:lvl1pPr>
+          </a:lstStyle>
+          <a:p>
+            <a:r>
+              <a:rPr kumimoji="0" lang="ru-RU" smtClean="0"/>
+              <a:t>Вставка рисунка</a:t>
+            </a:r>
+            <a:endParaRPr kumimoji="0" lang="en-US" dirty="0"/>
+          </a:p>
+        </p:txBody>
+      </p:sp>
+      <p:sp>
+        <p:nvSpPr>
+          <p:cNvPr id="10" name="Полилиния 9"/>
+          <p:cNvSpPr>
+            <a:spLocks/>
+          </p:cNvSpPr>
+          <p:nvPr/>
+        </p:nvSpPr>
+        <p:spPr bwMode="auto">
+          <a:xfrm flipV="1">
+            <a:off x="-9525" y="5816600"/>
+            <a:ext cx="9163050" cy="1041400"/>
+          </a:xfrm>
+          <a:custGeom>
+            <a:avLst>
+              <a:gd name="A1" fmla="val 0"/>
+              <a:gd name="A2" fmla="val 0"/>
+              <a:gd name="A3" fmla="val 0"/>
+              <a:gd name="A4" fmla="val 0"/>
+              <a:gd name="A5" fmla="val 0"/>
+              <a:gd name="A6" fmla="val 0"/>
+              <a:gd name="A7" fmla="val 0"/>
+              <a:gd name="A8" fmla="val 0"/>
+            </a:avLst>
+            <a:gdLst/>
+            <a:ahLst/>
+            <a:cxnLst>
+              <a:cxn ang="0">
+                <a:pos x="6" y="2"/>
+              </a:cxn>
+              <a:cxn ang="0">
+                <a:pos x="2542" y="0"/>
+              </a:cxn>
+              <a:cxn ang="0">
+                <a:pos x="4374" y="367"/>
+              </a:cxn>
+              <a:cxn ang="0">
+                <a:pos x="5766" y="55"/>
+              </a:cxn>
+              <a:cxn ang="0">
+                <a:pos x="5772" y="213"/>
+              </a:cxn>
+              <a:cxn ang="0">
+                <a:pos x="4302" y="439"/>
+              </a:cxn>
+              <a:cxn ang="0">
+                <a:pos x="1488" y="201"/>
+              </a:cxn>
+              <a:cxn ang="0">
+                <a:pos x="0" y="656"/>
+              </a:cxn>
+              <a:cxn ang="0">
+                <a:pos x="6" y="2"/>
+              </a:cxn>
+            </a:cxnLst>
+            <a:rect l="0" t="0" r="0" b="0"/>
+            <a:pathLst>
+              <a:path w="5772" h="656">
+                <a:moveTo>
+                  <a:pt x="6" y="2"/>
+                </a:moveTo>
+                <a:lnTo>
+                  <a:pt x="2542" y="0"/>
+                </a:lnTo>
+                <a:cubicBezTo>
+                  <a:pt x="2746" y="101"/>
+                  <a:pt x="3828" y="367"/>
+                  <a:pt x="4374" y="367"/>
+                </a:cubicBezTo>
+                <a:cubicBezTo>
+                  <a:pt x="4920" y="367"/>
+                  <a:pt x="5526" y="152"/>
+                  <a:pt x="5766" y="55"/>
+                </a:cubicBezTo>
+                <a:lnTo>
+                  <a:pt x="5772" y="213"/>
+                </a:lnTo>
+                <a:cubicBezTo>
+                  <a:pt x="5670" y="257"/>
+                  <a:pt x="5016" y="441"/>
+                  <a:pt x="4302" y="439"/>
+                </a:cubicBezTo>
+                <a:cubicBezTo>
+                  <a:pt x="3588" y="437"/>
+                  <a:pt x="2205" y="165"/>
+                  <a:pt x="1488" y="201"/>
+                </a:cubicBezTo>
+                <a:cubicBezTo>
+                  <a:pt x="750" y="209"/>
+                  <a:pt x="270" y="482"/>
+                  <a:pt x="0" y="656"/>
+                </a:cubicBezTo>
+                <a:lnTo>
+                  <a:pt x="6" y="2"/>
+                </a:lnTo>
+                <a:close/>
+              </a:path>
+            </a:pathLst>
+          </a:custGeom>
+          <a:gradFill>
+            <a:gsLst>
+              <a:gs pos="0">
+                <a:schemeClr val="accent2">
+                  <a:shade val="50000"/>
+                  <a:alpha val="45000"/>
+                  <a:satMod val="120000"/>
+                </a:schemeClr>
+              </a:gs>
+              <a:gs pos="100000">
+                <a:schemeClr val="accent3">
+                  <a:shade val="80000"/>
+                  <a:alpha val="55000"/>
+                  <a:satMod val="155000"/>
+                </a:schemeClr>
+              </a:gs>
+            </a:gsLst>
+            <a:lin ang="5400000" scaled="1"/>
+          </a:gradFill>
+          <a:ln w="9525" cap="flat" cmpd="sng" algn="ctr">
+            <a:noFill/>
+            <a:prstDash val="solid"/>
+            <a:round/>
+            <a:headEnd type="none" w="med" len="med"/>
+            <a:tailEnd type="none" w="med" len="med"/>
+          </a:ln>
+          <a:effectLst/>
+        </p:spPr>
+        <p:txBody>
+          <a:bodyPr vert="horz" wrap="square" lIns="91440" tIns="45720" rIns="91440" bIns="45720" anchor="t" compatLnSpc="1"/>
+          <a:lstStyle/>
+          <a:p>
+            <a:pPr marL="0" algn="l" rtl="0" eaLnBrk="1" latinLnBrk="0" hangingPunct="1"/>
+            <a:endParaRPr kumimoji="0" lang="en-US">
+              <a:solidFill>
+                <a:schemeClr val="tx1"/>
+              </a:solidFill>
+              <a:latin typeface="+mn-lt"/>
+              <a:ea typeface="+mn-ea"/>
+              <a:cs typeface="+mn-cs"/>
+            </a:endParaRPr>
+          </a:p>
+        </p:txBody>
+      </p:sp>
+      <p:sp>
+        <p:nvSpPr>
+          <p:cNvPr id="11" name="Полилиния 10"/>
+          <p:cNvSpPr>
+            <a:spLocks/>
+          </p:cNvSpPr>
+          <p:nvPr/>
+        </p:nvSpPr>
+        <p:spPr bwMode="auto">
+          <a:xfrm flipV="1">
+            <a:off x="4381500" y="6219825"/>
+            <a:ext cx="4762500" cy="638175"/>
+          </a:xfrm>
+          <a:custGeom>
+            <a:avLst>
+              <a:gd name="A1" fmla="val 0"/>
+              <a:gd name="A2" fmla="val 0"/>
+              <a:gd name="A3" fmla="val 0"/>
+              <a:gd name="A4" fmla="val 0"/>
+              <a:gd name="A5" fmla="val 0"/>
+              <a:gd name="A6" fmla="val 0"/>
+              <a:gd name="A7" fmla="val 0"/>
+              <a:gd name="A8" fmla="val 0"/>
+            </a:avLst>
+            <a:gdLst/>
+            <a:ahLst/>
+            <a:cxnLst>
+              <a:cxn ang="0">
+                <a:pos x="0" y="0"/>
+              </a:cxn>
+              <a:cxn ang="0">
+                <a:pos x="1668" y="564"/>
+              </a:cxn>
+              <a:cxn ang="0">
+                <a:pos x="3000" y="186"/>
+              </a:cxn>
+              <a:cxn ang="0">
+                <a:pos x="3000" y="6"/>
+              </a:cxn>
+              <a:cxn ang="0">
+                <a:pos x="0" y="0"/>
+              </a:cxn>
+            </a:cxnLst>
+            <a:rect l="0" t="0" r="0" b="0"/>
+            <a:pathLst>
+              <a:path w="3000" h="595">
+                <a:moveTo>
+                  <a:pt x="0" y="0"/>
+                </a:moveTo>
+                <a:cubicBezTo>
+                  <a:pt x="174" y="102"/>
+                  <a:pt x="1168" y="533"/>
+                  <a:pt x="1668" y="564"/>
+                </a:cubicBezTo>
+                <a:cubicBezTo>
+                  <a:pt x="2168" y="595"/>
+                  <a:pt x="2778" y="279"/>
+                  <a:pt x="3000" y="186"/>
+                </a:cubicBezTo>
+                <a:lnTo>
+                  <a:pt x="3000" y="6"/>
+                </a:lnTo>
+                <a:lnTo>
+                  <a:pt x="0" y="0"/>
+                </a:lnTo>
+                <a:close/>
+              </a:path>
+            </a:pathLst>
+          </a:custGeom>
+          <a:gradFill>
+            <a:gsLst>
+              <a:gs pos="0">
+                <a:schemeClr val="accent3">
+                  <a:shade val="50000"/>
+                  <a:alpha val="30000"/>
+                  <a:satMod val="130000"/>
+                </a:schemeClr>
+              </a:gs>
+              <a:gs pos="80000">
+                <a:schemeClr val="accent2">
+                  <a:shade val="75000"/>
+                  <a:alpha val="45000"/>
+                  <a:satMod val="140000"/>
+                </a:schemeClr>
+              </a:gs>
+            </a:gsLst>
+            <a:lin ang="5400000" scaled="1"/>
+          </a:gradFill>
+          <a:ln w="9525" cap="flat" cmpd="sng" algn="ctr">
+            <a:noFill/>
+            <a:prstDash val="solid"/>
+            <a:round/>
+            <a:headEnd type="none" w="med" len="med"/>
+            <a:tailEnd type="none" w="med" len="med"/>
+          </a:ln>
+          <a:effectLst/>
+        </p:spPr>
+        <p:txBody>
+          <a:bodyPr vert="horz" wrap="square" lIns="91440" tIns="45720" rIns="91440" bIns="45720" anchor="t" compatLnSpc="1"/>
+          <a:lstStyle/>
+          <a:p>
+            <a:pPr marL="0" algn="l" rtl="0" eaLnBrk="1" latinLnBrk="0" hangingPunct="1"/>
+            <a:endParaRPr kumimoji="0" lang="en-US">
+              <a:solidFill>
+                <a:schemeClr val="tx1"/>
+              </a:solidFill>
+              <a:latin typeface="+mn-lt"/>
+              <a:ea typeface="+mn-ea"/>
+              <a:cs typeface="+mn-cs"/>
+            </a:endParaRPr>
+          </a:p>
+        </p:txBody>
+      </p:sp>
+    </p:spTree>
+  </p:cSld>
+  <p:clrMapOvr>
+    <a:masterClrMapping/>
+  </p:clrMapOvr>
+</p:sldLayout>
+</file>
+
+<file path=ppt/slideMasters/slideMaster1.xml><?xml version="1.0" encoding="utf-8"?>
+<p:sldMaster xmlns:a="http://schemas.openxmlformats.org/drawingml/2006/main" xmlns:r="http://schemas.openxmlformats.org/officeDocument/2006/relationships" xmlns:p="http://schemas.openxmlformats.org/presentationml/2006/main">
+  <p:cSld>
+    <p:bg>
+      <p:bgRef idx="1003">
+        <a:schemeClr val="bg1"/>
+      </p:bgRef>
+    </p:bg>
+    <p:spTree>
+      <p:nvGrpSpPr>
+        <p:cNvPr id="1" name=""/>
+        <p:cNvGrpSpPr/>
+        <p:nvPr/>
+      </p:nvGrpSpPr>
+      <p:grpSpPr>
+        <a:xfrm>
+          <a:off x="0" y="0"/>
+          <a:ext cx="0" cy="0"/>
+          <a:chOff x="0" y="0"/>
+          <a:chExt cx="0" cy="0"/>
+        </a:xfrm>
+      </p:grpSpPr>
+      <p:sp>
+        <p:nvSpPr>
+          <p:cNvPr id="7" name="Полилиния 6"/>
+          <p:cNvSpPr>
+            <a:spLocks/>
+          </p:cNvSpPr>
+          <p:nvPr/>
+        </p:nvSpPr>
+        <p:spPr bwMode="auto">
+          <a:xfrm>
+            <a:off x="-9525" y="-7144"/>
+            <a:ext cx="9163050" cy="1041400"/>
+          </a:xfrm>
+          <a:custGeom>
+            <a:avLst>
+              <a:gd name="A1" fmla="val 0"/>
+              <a:gd name="A2" fmla="val 0"/>
+              <a:gd name="A3" fmla="val 0"/>
+              <a:gd name="A4" fmla="val 0"/>
+              <a:gd name="A5" fmla="val 0"/>
+              <a:gd name="A6" fmla="val 0"/>
+              <a:gd name="A7" fmla="val 0"/>
+              <a:gd name="A8" fmla="val 0"/>
+            </a:avLst>
+            <a:gdLst/>
+            <a:ahLst/>
+            <a:cxnLst>
+              <a:cxn ang="0">
+                <a:pos x="6" y="2"/>
+              </a:cxn>
+              <a:cxn ang="0">
+                <a:pos x="2542" y="0"/>
+              </a:cxn>
+              <a:cxn ang="0">
+                <a:pos x="4374" y="367"/>
+              </a:cxn>
+              <a:cxn ang="0">
+                <a:pos x="5766" y="55"/>
+              </a:cxn>
+              <a:cxn ang="0">
+                <a:pos x="5772" y="213"/>
+              </a:cxn>
+              <a:cxn ang="0">
+                <a:pos x="4302" y="439"/>
+              </a:cxn>
+              <a:cxn ang="0">
+                <a:pos x="1488" y="201"/>
+              </a:cxn>
+              <a:cxn ang="0">
+                <a:pos x="0" y="656"/>
+              </a:cxn>
+              <a:cxn ang="0">
+                <a:pos x="6" y="2"/>
+              </a:cxn>
+            </a:cxnLst>
+            <a:rect l="0" t="0" r="0" b="0"/>
+            <a:pathLst>
+              <a:path w="5772" h="656">
+                <a:moveTo>
+                  <a:pt x="6" y="2"/>
+                </a:moveTo>
+                <a:lnTo>
+                  <a:pt x="2542" y="0"/>
+                </a:lnTo>
+                <a:cubicBezTo>
+                  <a:pt x="2746" y="101"/>
+                  <a:pt x="3828" y="367"/>
+                  <a:pt x="4374" y="367"/>
+                </a:cubicBezTo>
+                <a:cubicBezTo>
+                  <a:pt x="4920" y="367"/>
+                  <a:pt x="5526" y="152"/>
+                  <a:pt x="5766" y="55"/>
+                </a:cubicBezTo>
+                <a:lnTo>
+                  <a:pt x="5772" y="213"/>
+                </a:lnTo>
+                <a:cubicBezTo>
+                  <a:pt x="5670" y="257"/>
+                  <a:pt x="5016" y="441"/>
+                  <a:pt x="4302" y="439"/>
+                </a:cubicBezTo>
+                <a:cubicBezTo>
+                  <a:pt x="3588" y="437"/>
+                  <a:pt x="2205" y="165"/>
+                  <a:pt x="1488" y="201"/>
+                </a:cubicBezTo>
+                <a:cubicBezTo>
+                  <a:pt x="750" y="209"/>
+                  <a:pt x="270" y="482"/>
+                  <a:pt x="0" y="656"/>
+                </a:cubicBezTo>
+                <a:lnTo>
+                  <a:pt x="6" y="2"/>
+                </a:lnTo>
+                <a:close/>
+              </a:path>
+            </a:pathLst>
+          </a:custGeom>
+          <a:gradFill>
+            <a:gsLst>
+              <a:gs pos="0">
+                <a:schemeClr val="accent2">
+                  <a:shade val="50000"/>
+                  <a:alpha val="45000"/>
+                  <a:satMod val="120000"/>
+                </a:schemeClr>
+              </a:gs>
+              <a:gs pos="100000">
+                <a:schemeClr val="accent3">
+                  <a:shade val="80000"/>
+                  <a:alpha val="55000"/>
+                  <a:satMod val="155000"/>
+                </a:schemeClr>
+              </a:gs>
+            </a:gsLst>
+            <a:lin ang="5400000" scaled="1"/>
+          </a:gradFill>
+          <a:ln w="9525" cap="flat" cmpd="sng" algn="ctr">
+            <a:noFill/>
+            <a:prstDash val="solid"/>
+            <a:round/>
+            <a:headEnd type="none" w="med" len="med"/>
+            <a:tailEnd type="none" w="med" len="med"/>
+          </a:ln>
+          <a:effectLst/>
+        </p:spPr>
+        <p:txBody>
+          <a:bodyPr vert="horz" wrap="square" lIns="91440" tIns="45720" rIns="91440" bIns="45720" anchor="t" compatLnSpc="1"/>
+          <a:lstStyle/>
+          <a:p>
+            <a:pPr marL="0" algn="l" rtl="0" eaLnBrk="1" latinLnBrk="0" hangingPunct="1"/>
+            <a:endParaRPr kumimoji="0" lang="en-US">
+              <a:solidFill>
+                <a:schemeClr val="tx1"/>
+              </a:solidFill>
+              <a:latin typeface="+mn-lt"/>
+              <a:ea typeface="+mn-ea"/>
+              <a:cs typeface="+mn-cs"/>
+            </a:endParaRPr>
+          </a:p>
+        </p:txBody>
+      </p:sp>
+      <p:sp>
+        <p:nvSpPr>
+          <p:cNvPr id="8" name="Полилиния 7"/>
+          <p:cNvSpPr>
+            <a:spLocks/>
+          </p:cNvSpPr>
+          <p:nvPr/>
+        </p:nvSpPr>
+        <p:spPr bwMode="auto">
+          <a:xfrm>
+            <a:off x="4381500" y="-7144"/>
+            <a:ext cx="4762500" cy="638175"/>
+          </a:xfrm>
+          <a:custGeom>
+            <a:avLst>
+              <a:gd name="A1" fmla="val 0"/>
+              <a:gd name="A2" fmla="val 0"/>
+              <a:gd name="A3" fmla="val 0"/>
+              <a:gd name="A4" fmla="val 0"/>
+              <a:gd name="A5" fmla="val 0"/>
+              <a:gd name="A6" fmla="val 0"/>
+              <a:gd name="A7" fmla="val 0"/>
+              <a:gd name="A8" fmla="val 0"/>
+            </a:avLst>
+            <a:gdLst/>
+            <a:ahLst/>
+            <a:cxnLst>
+              <a:cxn ang="0">
+                <a:pos x="0" y="0"/>
+              </a:cxn>
+              <a:cxn ang="0">
+                <a:pos x="1668" y="564"/>
+              </a:cxn>
+              <a:cxn ang="0">
+                <a:pos x="3000" y="186"/>
+              </a:cxn>
+              <a:cxn ang="0">
+                <a:pos x="3000" y="6"/>
+              </a:cxn>
+              <a:cxn ang="0">
+                <a:pos x="0" y="0"/>
+              </a:cxn>
+            </a:cxnLst>
+            <a:rect l="0" t="0" r="0" b="0"/>
+            <a:pathLst>
+              <a:path w="3000" h="595">
+                <a:moveTo>
+                  <a:pt x="0" y="0"/>
+                </a:moveTo>
+                <a:cubicBezTo>
+                  <a:pt x="174" y="102"/>
+                  <a:pt x="1168" y="533"/>
+                  <a:pt x="1668" y="564"/>
+                </a:cubicBezTo>
+                <a:cubicBezTo>
+                  <a:pt x="2168" y="595"/>
+                  <a:pt x="2778" y="279"/>
+                  <a:pt x="3000" y="186"/>
+                </a:cubicBezTo>
+                <a:lnTo>
+                  <a:pt x="3000" y="6"/>
+                </a:lnTo>
+                <a:lnTo>
+                  <a:pt x="0" y="0"/>
+                </a:lnTo>
+                <a:close/>
+              </a:path>
+            </a:pathLst>
+          </a:custGeom>
+          <a:gradFill>
+            <a:gsLst>
+              <a:gs pos="0">
+                <a:schemeClr val="accent3">
+                  <a:shade val="50000"/>
+                  <a:alpha val="30000"/>
+                  <a:satMod val="130000"/>
+                </a:schemeClr>
+              </a:gs>
+              <a:gs pos="80000">
+                <a:schemeClr val="accent2">
+                  <a:shade val="75000"/>
+                  <a:alpha val="45000"/>
+                  <a:satMod val="140000"/>
+                </a:schemeClr>
+              </a:gs>
+            </a:gsLst>
+            <a:lin ang="5400000" scaled="1"/>
+          </a:gradFill>
+          <a:ln w="9525" cap="flat" cmpd="sng" algn="ctr">
+            <a:noFill/>
+            <a:prstDash val="solid"/>
+            <a:round/>
+            <a:headEnd type="none" w="med" len="med"/>
+            <a:tailEnd type="none" w="med" len="med"/>
+          </a:ln>
+          <a:effectLst/>
+        </p:spPr>
+        <p:txBody>
+          <a:bodyPr vert="horz" wrap="square" lIns="91440" tIns="45720" rIns="91440" bIns="45720" anchor="t" compatLnSpc="1"/>
+          <a:lstStyle/>
+          <a:p>
+            <a:pPr marL="0" algn="l" rtl="0" eaLnBrk="1" latinLnBrk="0" hangingPunct="1"/>
+            <a:endParaRPr kumimoji="0" lang="en-US">
+              <a:solidFill>
+                <a:schemeClr val="tx1"/>
+              </a:solidFill>
+              <a:latin typeface="+mn-lt"/>
+              <a:ea typeface="+mn-ea"/>
+              <a:cs typeface="+mn-cs"/>
+            </a:endParaRPr>
+          </a:p>
+        </p:txBody>
+      </p:sp>
+      <p:sp>
+        <p:nvSpPr>
+          <p:cNvPr id="9" name="Заголовок 8"/>
+          <p:cNvSpPr>
+            <a:spLocks noGrp="1"/>
+          </p:cNvSpPr>
+          <p:nvPr>
+            <p:ph type="title"/>
+          </p:nvPr>
+        </p:nvSpPr>
+        <p:spPr>
+          <a:xfrm>
+            <a:off x="457200" y="704088"/>
+            <a:ext cx="8229600" cy="1143000"/>
           </a:xfrm>
           <a:prstGeom prst="rect">
             <a:avLst/>
           </a:prstGeom>
         </p:spPr>
         <p:txBody>
-          <a:bodyPr vert="horz" lIns="91440" rIns="45720" rtlCol="0" anchor="ctr">
+          <a:bodyPr vert="horz" lIns="0" rIns="0" bIns="0" anchor="b">
             <a:normAutofit/>
-            <a:scene3d>
-              <a:camera prst="orthographicFront"/>
-              <a:lightRig rig="threePt" dir="t">
-                <a:rot lat="0" lon="0" rev="4800000"/>
-              </a:lightRig>
-            </a:scene3d>
-            <a:sp3d prstMaterial="matte">
-              <a:bevelT w="50800" h="10160"/>
-            </a:sp3d>
           </a:bodyPr>
-          <a:lstStyle>
-            <a:extLst/>
-          </a:lstStyle>
+          <a:lstStyle/>
           <a:p>
             <a:r>
               <a:rPr kumimoji="0" lang="ru-RU" smtClean="0"/>
@@ -3315,7 +3157,7 @@
       </p:sp>
       <p:sp>
         <p:nvSpPr>
-          <p:cNvPr id="3" name="Текст 2"/>
+          <p:cNvPr id="30" name="Текст 29"/>
           <p:cNvSpPr>
             <a:spLocks noGrp="1"/>
           </p:cNvSpPr>
@@ -3325,20 +3167,18 @@
         </p:nvSpPr>
         <p:spPr>
           <a:xfrm>
-            <a:off x="457200" y="1775191"/>
-            <a:ext cx="8229600" cy="4625609"/>
+            <a:off x="457200" y="1935480"/>
+            <a:ext cx="8229600" cy="4389120"/>
           </a:xfrm>
           <a:prstGeom prst="rect">
             <a:avLst/>
           </a:prstGeom>
         </p:spPr>
         <p:txBody>
-          <a:bodyPr vert="horz" lIns="54864" tIns="91440" rtlCol="0">
+          <a:bodyPr vert="horz">
             <a:normAutofit/>
           </a:bodyPr>
-          <a:lstStyle>
-            <a:extLst/>
-          </a:lstStyle>
+          <a:lstStyle/>
           <a:p>
             <a:pPr lvl="0" eaLnBrk="1" latinLnBrk="0" hangingPunct="1"/>
             <a:r>
@@ -3379,7 +3219,7 @@
       </p:sp>
       <p:sp>
         <p:nvSpPr>
-          <p:cNvPr id="4" name="Дата 3"/>
+          <p:cNvPr id="10" name="Дата 9"/>
           <p:cNvSpPr>
             <a:spLocks noGrp="1"/>
           </p:cNvSpPr>
@@ -3389,26 +3229,25 @@
         </p:nvSpPr>
         <p:spPr>
           <a:xfrm>
-            <a:off x="457200" y="6476999"/>
-            <a:ext cx="2133600" cy="274320"/>
+            <a:off x="457200" y="6356350"/>
+            <a:ext cx="2133600" cy="365125"/>
           </a:xfrm>
           <a:prstGeom prst="rect">
             <a:avLst/>
           </a:prstGeom>
         </p:spPr>
         <p:txBody>
-          <a:bodyPr vert="horz" lIns="109728" rIns="45720" bIns="0" rtlCol="0" anchor="b"/>
+          <a:bodyPr vert="horz" lIns="0" tIns="0" rIns="0" bIns="0" anchor="b"/>
           <a:lstStyle>
             <a:lvl1pPr algn="l" eaLnBrk="1" latinLnBrk="0" hangingPunct="1">
               <a:defRPr kumimoji="0" sz="1200">
                 <a:solidFill>
-                  <a:schemeClr val="tx1">
-                    <a:tint val="95000"/>
+                  <a:schemeClr val="tx2">
+                    <a:shade val="90000"/>
                   </a:schemeClr>
                 </a:solidFill>
               </a:defRPr>
             </a:lvl1pPr>
-            <a:extLst/>
           </a:lstStyle>
           <a:p>
             <a:fld id="{5B106E36-FD25-4E2D-B0AA-010F637433A0}" type="datetimeFigureOut">
@@ -3422,7 +3261,7 @@
       </p:sp>
       <p:sp>
         <p:nvSpPr>
-          <p:cNvPr id="5" name="Нижний колонтитул 4"/>
+          <p:cNvPr id="22" name="Нижний колонтитул 21"/>
           <p:cNvSpPr>
             <a:spLocks noGrp="1"/>
           </p:cNvSpPr>
@@ -3432,26 +3271,25 @@
         </p:nvSpPr>
         <p:spPr>
           <a:xfrm>
-            <a:off x="2640596" y="6476999"/>
-            <a:ext cx="5507719" cy="274320"/>
+            <a:off x="2667000" y="6356350"/>
+            <a:ext cx="3352800" cy="365125"/>
           </a:xfrm>
           <a:prstGeom prst="rect">
             <a:avLst/>
           </a:prstGeom>
         </p:spPr>
         <p:txBody>
-          <a:bodyPr vert="horz" lIns="45720" rIns="45720" bIns="0" rtlCol="0" anchor="b"/>
+          <a:bodyPr vert="horz" lIns="0" tIns="0" rIns="0" bIns="0" anchor="b"/>
           <a:lstStyle>
             <a:lvl1pPr algn="l" eaLnBrk="1" latinLnBrk="0" hangingPunct="1">
               <a:defRPr kumimoji="0" sz="1200">
                 <a:solidFill>
-                  <a:schemeClr val="tx1">
-                    <a:tint val="95000"/>
+                  <a:schemeClr val="tx2">
+                    <a:shade val="90000"/>
                   </a:schemeClr>
                 </a:solidFill>
               </a:defRPr>
             </a:lvl1pPr>
-            <a:extLst/>
           </a:lstStyle>
           <a:p>
             <a:endParaRPr lang="ru-RU"/>
@@ -3460,7 +3298,7 @@
       </p:sp>
       <p:sp>
         <p:nvSpPr>
-          <p:cNvPr id="6" name="Номер слайда 5"/>
+          <p:cNvPr id="18" name="Номер слайда 17"/>
           <p:cNvSpPr>
             <a:spLocks noGrp="1"/>
           </p:cNvSpPr>
@@ -3470,26 +3308,25 @@
         </p:nvSpPr>
         <p:spPr>
           <a:xfrm>
-            <a:off x="8204396" y="6476999"/>
-            <a:ext cx="733864" cy="274320"/>
+            <a:off x="7924800" y="6356350"/>
+            <a:ext cx="762000" cy="365125"/>
           </a:xfrm>
           <a:prstGeom prst="rect">
             <a:avLst/>
           </a:prstGeom>
         </p:spPr>
         <p:txBody>
-          <a:bodyPr vert="horz" bIns="0" rtlCol="0" anchor="b"/>
+          <a:bodyPr vert="horz" lIns="0" tIns="0" rIns="0" bIns="0" anchor="b"/>
           <a:lstStyle>
             <a:lvl1pPr algn="r" eaLnBrk="1" latinLnBrk="0" hangingPunct="1">
               <a:defRPr kumimoji="0" sz="1200">
                 <a:solidFill>
-                  <a:schemeClr val="tx1">
-                    <a:tint val="95000"/>
+                  <a:schemeClr val="tx2">
+                    <a:shade val="90000"/>
                   </a:schemeClr>
                 </a:solidFill>
               </a:defRPr>
             </a:lvl1pPr>
-            <a:extLst/>
           </a:lstStyle>
           <a:p>
             <a:fld id="{725C68B6-61C2-468F-89AB-4B9F7531AA68}" type="slidenum">
@@ -3501,21 +3338,235 @@
           </a:p>
         </p:txBody>
       </p:sp>
+      <p:grpSp>
+        <p:nvGrpSpPr>
+          <p:cNvPr id="2" name="Группа 1"/>
+          <p:cNvGrpSpPr/>
+          <p:nvPr/>
+        </p:nvGrpSpPr>
+        <p:grpSpPr>
+          <a:xfrm>
+            <a:off x="-19017" y="202408"/>
+            <a:ext cx="9180548" cy="649224"/>
+            <a:chOff x="-19045" y="216550"/>
+            <a:chExt cx="9180548" cy="649224"/>
+          </a:xfrm>
+        </p:grpSpPr>
+        <p:sp>
+          <p:nvSpPr>
+            <p:cNvPr id="12" name="Полилиния 11"/>
+            <p:cNvSpPr>
+              <a:spLocks/>
+            </p:cNvSpPr>
+            <p:nvPr/>
+          </p:nvSpPr>
+          <p:spPr bwMode="auto">
+            <a:xfrm rot="21435692">
+              <a:off x="-19045" y="216550"/>
+              <a:ext cx="9163050" cy="649224"/>
+            </a:xfrm>
+            <a:custGeom>
+              <a:avLst>
+                <a:gd name="A1" fmla="val 0"/>
+                <a:gd name="A2" fmla="val 0"/>
+                <a:gd name="A3" fmla="val 0"/>
+                <a:gd name="A4" fmla="val 0"/>
+                <a:gd name="A5" fmla="val 0"/>
+                <a:gd name="A6" fmla="val 0"/>
+                <a:gd name="A7" fmla="val 0"/>
+                <a:gd name="A8" fmla="val 0"/>
+              </a:avLst>
+              <a:gdLst/>
+              <a:ahLst/>
+              <a:cxnLst>
+                <a:cxn ang="0">
+                  <a:pos x="0" y="966"/>
+                </a:cxn>
+                <a:cxn ang="0">
+                  <a:pos x="1608" y="282"/>
+                </a:cxn>
+                <a:cxn ang="0">
+                  <a:pos x="4110" y="1008"/>
+                </a:cxn>
+                <a:cxn ang="0">
+                  <a:pos x="5772" y="0"/>
+                </a:cxn>
+              </a:cxnLst>
+              <a:rect l="0" t="0" r="0" b="0"/>
+              <a:pathLst>
+                <a:path w="5772" h="1055">
+                  <a:moveTo>
+                    <a:pt x="0" y="966"/>
+                  </a:moveTo>
+                  <a:cubicBezTo>
+                    <a:pt x="282" y="738"/>
+                    <a:pt x="923" y="275"/>
+                    <a:pt x="1608" y="282"/>
+                  </a:cubicBezTo>
+                  <a:cubicBezTo>
+                    <a:pt x="2293" y="289"/>
+                    <a:pt x="3416" y="1055"/>
+                    <a:pt x="4110" y="1008"/>
+                  </a:cubicBezTo>
+                  <a:cubicBezTo>
+                    <a:pt x="4804" y="961"/>
+                    <a:pt x="5426" y="210"/>
+                    <a:pt x="5772" y="0"/>
+                  </a:cubicBezTo>
+                </a:path>
+              </a:pathLst>
+            </a:custGeom>
+            <a:noFill/>
+            <a:ln w="10795" cap="flat" cmpd="sng" algn="ctr">
+              <a:gradFill>
+                <a:gsLst>
+                  <a:gs pos="74000">
+                    <a:schemeClr val="accent3">
+                      <a:shade val="75000"/>
+                    </a:schemeClr>
+                  </a:gs>
+                  <a:gs pos="86000">
+                    <a:schemeClr val="tx1">
+                      <a:alpha val="29000"/>
+                    </a:schemeClr>
+                  </a:gs>
+                  <a:gs pos="16000">
+                    <a:schemeClr val="accent2">
+                      <a:shade val="75000"/>
+                      <a:alpha val="56000"/>
+                    </a:schemeClr>
+                  </a:gs>
+                </a:gsLst>
+                <a:lin ang="5400000" scaled="1"/>
+              </a:gradFill>
+              <a:prstDash val="solid"/>
+              <a:round/>
+              <a:headEnd type="none" w="med" len="med"/>
+              <a:tailEnd type="none" w="med" len="med"/>
+            </a:ln>
+            <a:effectLst/>
+          </p:spPr>
+          <p:txBody>
+            <a:bodyPr vert="horz" wrap="square" lIns="91440" tIns="45720" rIns="91440" bIns="45720" anchor="t" compatLnSpc="1"/>
+            <a:lstStyle/>
+            <a:p>
+              <a:endParaRPr kumimoji="0" lang="en-US"/>
+            </a:p>
+          </p:txBody>
+        </p:sp>
+        <p:sp>
+          <p:nvSpPr>
+            <p:cNvPr id="13" name="Полилиния 12"/>
+            <p:cNvSpPr>
+              <a:spLocks/>
+            </p:cNvSpPr>
+            <p:nvPr/>
+          </p:nvSpPr>
+          <p:spPr bwMode="auto">
+            <a:xfrm rot="21435692">
+              <a:off x="-14309" y="290003"/>
+              <a:ext cx="9175812" cy="530352"/>
+            </a:xfrm>
+            <a:custGeom>
+              <a:avLst>
+                <a:gd name="A1" fmla="val 0"/>
+                <a:gd name="A2" fmla="val 0"/>
+                <a:gd name="A3" fmla="val 0"/>
+                <a:gd name="A4" fmla="val 0"/>
+                <a:gd name="A5" fmla="val 0"/>
+                <a:gd name="A6" fmla="val 0"/>
+                <a:gd name="A7" fmla="val 0"/>
+                <a:gd name="A8" fmla="val 0"/>
+              </a:avLst>
+              <a:gdLst/>
+              <a:ahLst/>
+              <a:cxnLst>
+                <a:cxn ang="0">
+                  <a:pos x="0" y="732"/>
+                </a:cxn>
+                <a:cxn ang="0">
+                  <a:pos x="1638" y="228"/>
+                </a:cxn>
+                <a:cxn ang="0">
+                  <a:pos x="4122" y="816"/>
+                </a:cxn>
+                <a:cxn ang="0">
+                  <a:pos x="5766" y="0"/>
+                </a:cxn>
+              </a:cxnLst>
+              <a:rect l="0" t="0" r="0" b="0"/>
+              <a:pathLst>
+                <a:path w="5766" h="854">
+                  <a:moveTo>
+                    <a:pt x="0" y="732"/>
+                  </a:moveTo>
+                  <a:cubicBezTo>
+                    <a:pt x="273" y="647"/>
+                    <a:pt x="951" y="214"/>
+                    <a:pt x="1638" y="228"/>
+                  </a:cubicBezTo>
+                  <a:cubicBezTo>
+                    <a:pt x="2325" y="242"/>
+                    <a:pt x="3434" y="854"/>
+                    <a:pt x="4122" y="816"/>
+                  </a:cubicBezTo>
+                  <a:cubicBezTo>
+                    <a:pt x="4810" y="778"/>
+                    <a:pt x="5424" y="170"/>
+                    <a:pt x="5766" y="0"/>
+                  </a:cubicBezTo>
+                </a:path>
+              </a:pathLst>
+            </a:custGeom>
+            <a:noFill/>
+            <a:ln w="9525" cap="flat" cmpd="sng" algn="ctr">
+              <a:gradFill>
+                <a:gsLst>
+                  <a:gs pos="74000">
+                    <a:schemeClr val="accent4"/>
+                  </a:gs>
+                  <a:gs pos="44000">
+                    <a:schemeClr val="accent1"/>
+                  </a:gs>
+                  <a:gs pos="33000">
+                    <a:schemeClr val="accent2">
+                      <a:alpha val="56000"/>
+                    </a:schemeClr>
+                  </a:gs>
+                </a:gsLst>
+                <a:lin ang="5400000" scaled="1"/>
+              </a:gradFill>
+              <a:prstDash val="solid"/>
+              <a:round/>
+              <a:headEnd type="none" w="med" len="med"/>
+              <a:tailEnd type="none" w="med" len="med"/>
+            </a:ln>
+            <a:effectLst/>
+          </p:spPr>
+          <p:txBody>
+            <a:bodyPr vert="horz" wrap="square" lIns="91440" tIns="45720" rIns="91440" bIns="45720" anchor="t" compatLnSpc="1"/>
+            <a:lstStyle/>
+            <a:p>
+              <a:endParaRPr kumimoji="0" lang="en-US"/>
+            </a:p>
+          </p:txBody>
+        </p:sp>
+      </p:grpSp>
     </p:spTree>
   </p:cSld>
   <p:clrMap bg1="lt1" tx1="dk1" bg2="lt2" tx2="dk2" accent1="accent1" accent2="accent2" accent3="accent3" accent4="accent4" accent5="accent5" accent6="accent6" hlink="hlink" folHlink="folHlink"/>
   <p:sldLayoutIdLst>
-    <p:sldLayoutId id="2147483673" r:id="rId1"/>
-    <p:sldLayoutId id="2147483674" r:id="rId2"/>
-    <p:sldLayoutId id="2147483675" r:id="rId3"/>
-    <p:sldLayoutId id="2147483676" r:id="rId4"/>
-    <p:sldLayoutId id="2147483677" r:id="rId5"/>
-    <p:sldLayoutId id="2147483678" r:id="rId6"/>
-    <p:sldLayoutId id="2147483679" r:id="rId7"/>
-    <p:sldLayoutId id="2147483680" r:id="rId8"/>
-    <p:sldLayoutId id="2147483681" r:id="rId9"/>
-    <p:sldLayoutId id="2147483682" r:id="rId10"/>
-    <p:sldLayoutId id="2147483683" r:id="rId11"/>
+    <p:sldLayoutId id="2147483685" r:id="rId1"/>
+    <p:sldLayoutId id="2147483686" r:id="rId2"/>
+    <p:sldLayoutId id="2147483687" r:id="rId3"/>
+    <p:sldLayoutId id="2147483688" r:id="rId4"/>
+    <p:sldLayoutId id="2147483689" r:id="rId5"/>
+    <p:sldLayoutId id="2147483690" r:id="rId6"/>
+    <p:sldLayoutId id="2147483691" r:id="rId7"/>
+    <p:sldLayoutId id="2147483692" r:id="rId8"/>
+    <p:sldLayoutId id="2147483693" r:id="rId9"/>
+    <p:sldLayoutId id="2147483694" r:id="rId10"/>
+    <p:sldLayoutId id="2147483695" r:id="rId11"/>
   </p:sldLayoutIdLst>
   <p:txStyles>
     <p:titleStyle>
@@ -3524,11 +3575,12 @@
           <a:spcPct val="0"/>
         </a:spcBef>
         <a:buNone/>
-        <a:defRPr kumimoji="0" sz="4500" b="1" kern="1200">
+        <a:defRPr kumimoji="0" sz="5000" b="0" kern="1200">
+          <a:ln>
+            <a:noFill/>
+          </a:ln>
           <a:solidFill>
-            <a:schemeClr val="accent1">
-              <a:satMod val="150000"/>
-            </a:schemeClr>
+            <a:schemeClr val="tx2"/>
           </a:solidFill>
           <a:effectLst/>
           <a:latin typeface="+mj-lt"/>
@@ -3536,20 +3588,19 @@
           <a:cs typeface="+mj-cs"/>
         </a:defRPr>
       </a:lvl1pPr>
-      <a:extLst/>
     </p:titleStyle>
     <p:bodyStyle>
-      <a:lvl1pPr marL="438912" indent="-320040" algn="l" rtl="0" eaLnBrk="1" latinLnBrk="0" hangingPunct="1">
+      <a:lvl1pPr marL="274320" indent="-274320" algn="l" rtl="0" eaLnBrk="1" latinLnBrk="0" hangingPunct="1">
         <a:spcBef>
-          <a:spcPts val="0"/>
+          <a:spcPct val="20000"/>
         </a:spcBef>
         <a:buClr>
-          <a:schemeClr val="accent1"/>
+          <a:schemeClr val="accent3"/>
         </a:buClr>
-        <a:buSzPct val="80000"/>
+        <a:buSzPct val="95000"/>
         <a:buFont typeface="Wingdings 2"/>
-        <a:buChar char=""/>
-        <a:defRPr kumimoji="0" sz="3200" kern="1200">
+        <a:buChar char=""/>
+        <a:defRPr kumimoji="0" sz="2600" kern="1200">
           <a:solidFill>
             <a:schemeClr val="tx1"/>
           </a:solidFill>
@@ -3558,17 +3609,17 @@
           <a:cs typeface="+mn-cs"/>
         </a:defRPr>
       </a:lvl1pPr>
-      <a:lvl2pPr marL="731520" indent="-274320" algn="l" rtl="0" eaLnBrk="1" latinLnBrk="0" hangingPunct="1">
+      <a:lvl2pPr marL="640080" indent="-246888" algn="l" rtl="0" eaLnBrk="1" latinLnBrk="0" hangingPunct="1">
         <a:spcBef>
           <a:spcPct val="20000"/>
         </a:spcBef>
         <a:buClr>
-          <a:schemeClr val="accent2"/>
+          <a:schemeClr val="accent1"/>
         </a:buClr>
-        <a:buSzPct val="90000"/>
-        <a:buFont typeface="Wingdings"/>
-        <a:buChar char=""/>
-        <a:defRPr kumimoji="0" sz="2800" kern="1200">
+        <a:buSzPct val="85000"/>
+        <a:buFont typeface="Wingdings 2"/>
+        <a:buChar char=""/>
+        <a:defRPr kumimoji="0" sz="2400" kern="1200">
           <a:solidFill>
             <a:schemeClr val="tx1"/>
           </a:solidFill>
@@ -3577,16 +3628,17 @@
           <a:cs typeface="+mn-cs"/>
         </a:defRPr>
       </a:lvl2pPr>
-      <a:lvl3pPr marL="996696" indent="-228600" algn="l" rtl="0" eaLnBrk="1" latinLnBrk="0" hangingPunct="1">
+      <a:lvl3pPr marL="914400" indent="-246888" algn="l" rtl="0" eaLnBrk="1" latinLnBrk="0" hangingPunct="1">
         <a:spcBef>
           <a:spcPct val="20000"/>
         </a:spcBef>
         <a:buClr>
-          <a:schemeClr val="accent3"/>
+          <a:schemeClr val="accent2"/>
         </a:buClr>
-        <a:buFont typeface="Arial"/>
-        <a:buChar char="▪"/>
-        <a:defRPr kumimoji="0" sz="2400" kern="1200">
+        <a:buSzPct val="70000"/>
+        <a:buFont typeface="Wingdings 2"/>
+        <a:buChar char=""/>
+        <a:defRPr kumimoji="0" sz="2100" kern="1200">
           <a:solidFill>
             <a:schemeClr val="tx1"/>
           </a:solidFill>
@@ -3595,15 +3647,16 @@
           <a:cs typeface="+mn-cs"/>
         </a:defRPr>
       </a:lvl3pPr>
-      <a:lvl4pPr marL="1216152" indent="-182880" algn="l" rtl="0" eaLnBrk="1" latinLnBrk="0" hangingPunct="1">
+      <a:lvl4pPr marL="1188720" indent="-210312" algn="l" rtl="0" eaLnBrk="1" latinLnBrk="0" hangingPunct="1">
         <a:spcBef>
           <a:spcPct val="20000"/>
         </a:spcBef>
         <a:buClr>
-          <a:schemeClr val="accent4"/>
+          <a:schemeClr val="accent3"/>
         </a:buClr>
-        <a:buFont typeface="Arial"/>
-        <a:buChar char="▪"/>
+        <a:buSzPct val="65000"/>
+        <a:buFont typeface="Wingdings 2"/>
+        <a:buChar char=""/>
         <a:defRPr kumimoji="0" sz="2000" kern="1200">
           <a:solidFill>
             <a:schemeClr val="tx1"/>
@@ -3613,16 +3666,17 @@
           <a:cs typeface="+mn-cs"/>
         </a:defRPr>
       </a:lvl4pPr>
-      <a:lvl5pPr marL="1426464" indent="-182880" algn="l" rtl="0" eaLnBrk="1" latinLnBrk="0" hangingPunct="1">
+      <a:lvl5pPr marL="1463040" indent="-210312" algn="l" rtl="0" eaLnBrk="1" latinLnBrk="0" hangingPunct="1">
         <a:spcBef>
           <a:spcPct val="20000"/>
         </a:spcBef>
         <a:buClr>
-          <a:schemeClr val="accent5"/>
+          <a:schemeClr val="accent4"/>
         </a:buClr>
-        <a:buFont typeface="Wingdings 3"/>
-        <a:buChar char=""/>
-        <a:defRPr kumimoji="0" lang="en-US" sz="2000" kern="1200" smtClean="0">
+        <a:buSzPct val="65000"/>
+        <a:buFont typeface="Wingdings 2"/>
+        <a:buChar char=""/>
+        <a:defRPr kumimoji="0" sz="2000" kern="1200">
           <a:solidFill>
             <a:schemeClr val="tx1"/>
           </a:solidFill>
@@ -3631,17 +3685,17 @@
           <a:cs typeface="+mn-cs"/>
         </a:defRPr>
       </a:lvl5pPr>
-      <a:lvl6pPr marL="1627632" indent="-182880" algn="l" rtl="0" eaLnBrk="1" latinLnBrk="0" hangingPunct="1">
+      <a:lvl6pPr marL="1737360" indent="-210312" algn="l" rtl="0" eaLnBrk="1" latinLnBrk="0" hangingPunct="1">
         <a:spcBef>
           <a:spcPct val="20000"/>
         </a:spcBef>
         <a:buClr>
-          <a:schemeClr val="accent6"/>
+          <a:schemeClr val="accent5"/>
         </a:buClr>
-        <a:buSzPct val="100000"/>
+        <a:buSzPct val="80000"/>
         <a:buFont typeface="Wingdings 2"/>
-        <a:buChar char=""/>
-        <a:defRPr kumimoji="0" sz="2000" kern="1200">
+        <a:buChar char=""/>
+        <a:defRPr kumimoji="0" sz="1800" kern="1200">
           <a:solidFill>
             <a:schemeClr val="tx1"/>
           </a:solidFill>
@@ -3650,17 +3704,17 @@
           <a:cs typeface="+mn-cs"/>
         </a:defRPr>
       </a:lvl6pPr>
-      <a:lvl7pPr marL="1828800" indent="-182880" algn="l" rtl="0" eaLnBrk="1" latinLnBrk="0" hangingPunct="1">
+      <a:lvl7pPr marL="1920240" indent="-182880" algn="l" rtl="0" eaLnBrk="1" latinLnBrk="0" hangingPunct="1">
         <a:spcBef>
           <a:spcPct val="20000"/>
         </a:spcBef>
         <a:buClr>
-          <a:schemeClr val="accent1"/>
+          <a:schemeClr val="accent6"/>
         </a:buClr>
-        <a:buSzPct val="100000"/>
+        <a:buSzPct val="80000"/>
         <a:buFont typeface="Wingdings 2"/>
-        <a:buChar char=""/>
-        <a:defRPr kumimoji="0" sz="1800" kern="1200">
+        <a:buChar char=""/>
+        <a:defRPr kumimoji="0" sz="1600" kern="1200" baseline="0">
           <a:solidFill>
             <a:schemeClr val="tx1"/>
           </a:solidFill>
@@ -3669,16 +3723,15 @@
           <a:cs typeface="+mn-cs"/>
         </a:defRPr>
       </a:lvl7pPr>
-      <a:lvl8pPr marL="2029968" indent="-182880" algn="l" rtl="0" eaLnBrk="1" latinLnBrk="0" hangingPunct="1">
+      <a:lvl8pPr marL="2194560" indent="-182880" algn="l" rtl="0" eaLnBrk="1" latinLnBrk="0" hangingPunct="1">
         <a:spcBef>
           <a:spcPct val="20000"/>
         </a:spcBef>
         <a:buClr>
-          <a:schemeClr val="accent2"/>
+          <a:schemeClr val="tx2"/>
         </a:buClr>
-        <a:buFont typeface="Wingdings 2" pitchFamily="18" charset="2"/>
-        <a:buChar char=""/>
-        <a:defRPr kumimoji="0" sz="1800" kern="1200">
+        <a:buChar char="•"/>
+        <a:defRPr kumimoji="0" sz="1600" kern="1200">
           <a:solidFill>
             <a:schemeClr val="tx1"/>
           </a:solidFill>
@@ -3687,16 +3740,16 @@
           <a:cs typeface="+mn-cs"/>
         </a:defRPr>
       </a:lvl8pPr>
-      <a:lvl9pPr marL="2231136" indent="-182880" algn="l" rtl="0" eaLnBrk="1" latinLnBrk="0" hangingPunct="1">
+      <a:lvl9pPr marL="2468880" indent="-182880" algn="l" rtl="0" eaLnBrk="1" latinLnBrk="0" hangingPunct="1">
         <a:spcBef>
           <a:spcPct val="20000"/>
         </a:spcBef>
         <a:buClr>
-          <a:schemeClr val="accent3"/>
+          <a:schemeClr val="tx2"/>
         </a:buClr>
-        <a:buFont typeface="Wingdings 2" pitchFamily="18" charset="2"/>
-        <a:buChar char=""/>
-        <a:defRPr kumimoji="0" sz="1800" kern="1200" baseline="0">
+        <a:buFontTx/>
+        <a:buChar char="•"/>
+        <a:defRPr kumimoji="0" sz="1400" kern="1200" baseline="0">
           <a:solidFill>
             <a:schemeClr val="tx1"/>
           </a:solidFill>
@@ -3705,7 +3758,6 @@
           <a:cs typeface="+mn-cs"/>
         </a:defRPr>
       </a:lvl9pPr>
-      <a:extLst/>
     </p:bodyStyle>
     <p:otherStyle>
       <a:lvl1pPr marL="0" algn="l" rtl="0" eaLnBrk="1" latinLnBrk="0" hangingPunct="1">
@@ -3798,7 +3850,6 @@
           <a:cs typeface="+mn-cs"/>
         </a:defRPr>
       </a:lvl9pPr>
-      <a:extLst/>
     </p:otherStyle>
   </p:txStyles>
 </p:sldMaster>
@@ -3836,7 +3887,11 @@
           <a:bodyPr/>
           <a:lstStyle/>
           <a:p>
-            <a:endParaRPr lang="ru-RU"/>
+            <a:r>
+              <a:rPr lang="en-US" dirty="0" err="1" smtClean="0"/>
+              <a:t>egegew</a:t>
+            </a:r>
+            <a:endParaRPr lang="ru-RU" dirty="0"/>
           </a:p>
         </p:txBody>
       </p:sp>
@@ -3963,9 +4018,9 @@
 </file>
 
 <file path=ppt/theme/theme1.xml><?xml version="1.0" encoding="utf-8"?>
-<a:theme xmlns:a="http://schemas.openxmlformats.org/drawingml/2006/main" name="Модульная">
+<a:theme xmlns:a="http://schemas.openxmlformats.org/drawingml/2006/main" name="Поток">
   <a:themeElements>
-    <a:clrScheme name="Модульная">
+    <a:clrScheme name="Поток">
       <a:dk1>
         <a:sysClr val="windowText" lastClr="000000"/>
       </a:dk1>
@@ -3973,48 +4028,48 @@
         <a:sysClr val="window" lastClr="FFFFFF"/>
       </a:lt1>
       <a:dk2>
-        <a:srgbClr val="5A6378"/>
+        <a:srgbClr val="04617B"/>
       </a:dk2>
       <a:lt2>
-        <a:srgbClr val="D4D4D6"/>
+        <a:srgbClr val="DBF5F9"/>
       </a:lt2>
       <a:accent1>
-        <a:srgbClr val="F0AD00"/>
+        <a:srgbClr val="0F6FC6"/>
       </a:accent1>
       <a:accent2>
-        <a:srgbClr val="60B5CC"/>
+        <a:srgbClr val="009DD9"/>
       </a:accent2>
       <a:accent3>
-        <a:srgbClr val="E66C7D"/>
+        <a:srgbClr val="0BD0D9"/>
       </a:accent3>
       <a:accent4>
-        <a:srgbClr val="6BB76D"/>
+        <a:srgbClr val="10CF9B"/>
       </a:accent4>
       <a:accent5>
-        <a:srgbClr val="E88651"/>
+        <a:srgbClr val="7CCA62"/>
       </a:accent5>
       <a:accent6>
-        <a:srgbClr val="C64847"/>
+        <a:srgbClr val="A5C249"/>
       </a:accent6>
       <a:hlink>
-        <a:srgbClr val="168BBA"/>
+        <a:srgbClr val="E2D700"/>
       </a:hlink>
       <a:folHlink>
-        <a:srgbClr val="680000"/>
+        <a:srgbClr val="85DFD0"/>
       </a:folHlink>
     </a:clrScheme>
-    <a:fontScheme name="Модульная">
+    <a:fontScheme name="Поток">
       <a:majorFont>
-        <a:latin typeface="Corbel"/>
+        <a:latin typeface="Calibri"/>
         <a:ea typeface=""/>
         <a:cs typeface=""/>
-        <a:font script="Jpan" typeface="HGｺﾞｼｯｸM"/>
-        <a:font script="Hang" typeface="HY엽서L"/>
-        <a:font script="Hans" typeface="华文楷体"/>
-        <a:font script="Hant" typeface="新細明體"/>
-        <a:font script="Arab" typeface="Tahoma"/>
-        <a:font script="Hebr" typeface="Miriam"/>
-        <a:font script="Thai" typeface="DilleniaUPC"/>
+        <a:font script="Jpan" typeface="ＭＳ Ｐゴシック"/>
+        <a:font script="Hang" typeface="HY중고딕"/>
+        <a:font script="Hans" typeface="隶书"/>
+        <a:font script="Hant" typeface="微軟正黑體"/>
+        <a:font script="Arab" typeface="Traditional Arabic"/>
+        <a:font script="Hebr" typeface="Arial"/>
+        <a:font script="Thai" typeface="Cordia New"/>
         <a:font script="Ethi" typeface="Nyala"/>
         <a:font script="Beng" typeface="Vrinda"/>
         <a:font script="Gujr" typeface="Shruti"/>
@@ -4039,20 +4094,20 @@
         <a:font script="Uigh" typeface="Microsoft Uighur"/>
       </a:majorFont>
       <a:minorFont>
-        <a:latin typeface="Corbel"/>
+        <a:latin typeface="Constantia"/>
         <a:ea typeface=""/>
         <a:cs typeface=""/>
-        <a:font script="Jpan" typeface="HGｺﾞｼｯｸM"/>
-        <a:font script="Hang" typeface="HY엽서L"/>
-        <a:font script="Hans" typeface="华文楷体"/>
+        <a:font script="Jpan" typeface="HGP明朝E"/>
+        <a:font script="Hang" typeface="HY신명조"/>
+        <a:font script="Hans" typeface="宋体"/>
         <a:font script="Hant" typeface="新細明體"/>
-        <a:font script="Arab" typeface="Tahoma"/>
-        <a:font script="Hebr" typeface="Miriam"/>
-        <a:font script="Thai" typeface="DilleniaUPC"/>
+        <a:font script="Arab" typeface="Majalla UI"/>
+        <a:font script="Hebr" typeface="David"/>
+        <a:font script="Thai" typeface="Browallia New"/>
         <a:font script="Ethi" typeface="Nyala"/>
         <a:font script="Beng" typeface="Vrinda"/>
         <a:font script="Gujr" typeface="Shruti"/>
-        <a:font script="Khmr" typeface="DaunPenh"/>
+        <a:font script="Khmr" typeface="MoolBoran"/>
         <a:font script="Knda" typeface="Tunga"/>
         <a:font script="Guru" typeface="Raavi"/>
         <a:font script="Cans" typeface="Euphemia"/>
@@ -4069,11 +4124,11 @@
         <a:font script="Laoo" typeface="DokChampa"/>
         <a:font script="Sinh" typeface="Iskoola Pota"/>
         <a:font script="Mong" typeface="Mongolian Baiti"/>
-        <a:font script="Viet" typeface="Arial"/>
+        <a:font script="Viet" typeface="Times New Roman"/>
         <a:font script="Uigh" typeface="Microsoft Uighur"/>
       </a:minorFont>
     </a:fontScheme>
-    <a:fmtScheme name="Модульная">
+    <a:fmtScheme name="Поток">
       <a:fillStyleLst>
         <a:solidFill>
           <a:schemeClr val="phClr"/>
@@ -4082,66 +4137,77 @@
           <a:gsLst>
             <a:gs pos="0">
               <a:schemeClr val="phClr">
-                <a:tint val="50000"/>
-                <a:satMod val="300000"/>
+                <a:tint val="70000"/>
+                <a:satMod val="130000"/>
               </a:schemeClr>
             </a:gs>
-            <a:gs pos="35000">
+            <a:gs pos="43000">
               <a:schemeClr val="phClr">
-                <a:tint val="37000"/>
-                <a:satMod val="300000"/>
+                <a:tint val="44000"/>
+                <a:satMod val="165000"/>
+              </a:schemeClr>
+            </a:gs>
+            <a:gs pos="93000">
+              <a:schemeClr val="phClr">
+                <a:tint val="15000"/>
+                <a:satMod val="165000"/>
               </a:schemeClr>
             </a:gs>
             <a:gs pos="100000">
               <a:schemeClr val="phClr">
-                <a:tint val="15000"/>
-                <a:satMod val="350000"/>
+                <a:tint val="5000"/>
+                <a:satMod val="250000"/>
               </a:schemeClr>
             </a:gs>
           </a:gsLst>
-          <a:lin ang="16200000" scaled="1"/>
+          <a:path path="circle">
+            <a:fillToRect l="50000" t="130000" r="50000" b="-30000"/>
+          </a:path>
         </a:gradFill>
         <a:gradFill rotWithShape="1">
           <a:gsLst>
             <a:gs pos="0">
               <a:schemeClr val="phClr">
-                <a:shade val="47500"/>
-                <a:satMod val="137000"/>
+                <a:tint val="98000"/>
+                <a:shade val="25000"/>
+                <a:satMod val="250000"/>
               </a:schemeClr>
             </a:gs>
-            <a:gs pos="55000">
+            <a:gs pos="68000">
               <a:schemeClr val="phClr">
-                <a:shade val="69000"/>
-                <a:satMod val="137000"/>
+                <a:tint val="86000"/>
+                <a:satMod val="115000"/>
               </a:schemeClr>
             </a:gs>
             <a:gs pos="100000">
               <a:schemeClr val="phClr">
-                <a:shade val="98000"/>
-                <a:satMod val="137000"/>
+                <a:tint val="50000"/>
+                <a:satMod val="150000"/>
               </a:schemeClr>
             </a:gs>
           </a:gsLst>
-          <a:lin ang="16200000" scaled="0"/>
+          <a:path path="circle">
+            <a:fillToRect l="50000" t="130000" r="50000" b="-30000"/>
+          </a:path>
         </a:gradFill>
       </a:fillStyleLst>
       <a:lnStyleLst>
-        <a:ln w="6350" cap="rnd" cmpd="sng" algn="ctr">
+        <a:ln w="9525" cap="flat" cmpd="sng" algn="ctr">
           <a:solidFill>
             <a:schemeClr val="phClr">
-              <a:shade val="95000"/>
-              <a:satMod val="105000"/>
+              <a:shade val="50000"/>
+              <a:satMod val="103000"/>
             </a:schemeClr>
           </a:solidFill>
           <a:prstDash val="solid"/>
         </a:ln>
-        <a:ln w="48000" cap="flat" cmpd="thickThin" algn="ctr">
+        <a:ln w="25400" cap="flat" cmpd="sng" algn="ctr">
           <a:solidFill>
             <a:schemeClr val="phClr"/>
           </a:solidFill>
           <a:prstDash val="solid"/>
         </a:ln>
-        <a:ln w="48500" cap="flat" cmpd="thickThin" algn="ctr">
+        <a:ln w="38100" cap="flat" cmpd="sng" algn="ctr">
           <a:solidFill>
             <a:schemeClr val="phClr"/>
           </a:solidFill>
@@ -4151,40 +4217,46 @@
       <a:effectStyleLst>
         <a:effectStyle>
           <a:effectLst>
-            <a:outerShdw blurRad="45000" dist="25000" dir="5400000" rotWithShape="0">
-              <a:srgbClr val="000000">
-                <a:alpha val="38000"/>
-              </a:srgbClr>
+            <a:outerShdw blurRad="57150" dist="38100" dir="5400000" algn="ctr" rotWithShape="0">
+              <a:schemeClr val="phClr">
+                <a:shade val="9000"/>
+                <a:satMod val="105000"/>
+                <a:alpha val="48000"/>
+              </a:schemeClr>
             </a:outerShdw>
           </a:effectLst>
         </a:effectStyle>
         <a:effectStyle>
           <a:effectLst>
-            <a:outerShdw blurRad="39000" dist="25400" dir="5400000" rotWithShape="0">
-              <a:srgbClr val="000000">
-                <a:alpha val="38000"/>
-              </a:srgbClr>
+            <a:outerShdw blurRad="57150" dist="38100" dir="5400000" algn="ctr" rotWithShape="0">
+              <a:schemeClr val="phClr">
+                <a:shade val="9000"/>
+                <a:satMod val="105000"/>
+                <a:alpha val="48000"/>
+              </a:schemeClr>
             </a:outerShdw>
           </a:effectLst>
         </a:effectStyle>
         <a:effectStyle>
           <a:effectLst>
-            <a:outerShdw blurRad="39000" dist="25400" dir="5400000" rotWithShape="0">
-              <a:srgbClr val="000000">
-                <a:alpha val="38000"/>
-              </a:srgbClr>
+            <a:outerShdw blurRad="57150" dist="38100" dir="5400000" algn="ctr" rotWithShape="0">
+              <a:schemeClr val="phClr">
+                <a:shade val="9000"/>
+                <a:satMod val="105000"/>
+                <a:alpha val="48000"/>
+              </a:schemeClr>
             </a:outerShdw>
           </a:effectLst>
           <a:scene3d>
             <a:camera prst="orthographicFront" fov="0">
               <a:rot lat="0" lon="0" rev="0"/>
             </a:camera>
-            <a:lightRig rig="threePt" dir="t">
-              <a:rot lat="0" lon="0" rev="1800000"/>
+            <a:lightRig rig="glow" dir="tl">
+              <a:rot lat="0" lon="0" rev="900000"/>
             </a:lightRig>
           </a:scene3d>
-          <a:sp3d prstMaterial="matte">
-            <a:bevelT h="20000"/>
+          <a:sp3d prstMaterial="powder">
+            <a:bevelT w="25400" h="38100"/>
           </a:sp3d>
         </a:effectStyle>
       </a:effectStyleLst>
@@ -4196,46 +4268,41 @@
           <a:gsLst>
             <a:gs pos="0">
               <a:schemeClr val="phClr">
-                <a:tint val="48000"/>
-                <a:satMod val="300000"/>
+                <a:tint val="80000"/>
+                <a:satMod val="400000"/>
               </a:schemeClr>
             </a:gs>
-            <a:gs pos="12000">
+            <a:gs pos="25000">
               <a:schemeClr val="phClr">
-                <a:tint val="48000"/>
-                <a:satMod val="300000"/>
-              </a:schemeClr>
-            </a:gs>
-            <a:gs pos="20000">
-              <a:schemeClr val="phClr">
-                <a:tint val="49000"/>
-                <a:satMod val="300000"/>
+                <a:tint val="83000"/>
+                <a:satMod val="320000"/>
               </a:schemeClr>
             </a:gs>
             <a:gs pos="100000">
               <a:schemeClr val="phClr">
-                <a:shade val="30000"/>
+                <a:shade val="15000"/>
+                <a:satMod val="320000"/>
               </a:schemeClr>
             </a:gs>
           </a:gsLst>
           <a:path path="circle">
-            <a:fillToRect l="10000" t="-25000" r="10000" b="125000"/>
+            <a:fillToRect l="10000" t="110000" r="10000" b="100000"/>
           </a:path>
         </a:gradFill>
         <a:blipFill>
           <a:blip xmlns:r="http://schemas.openxmlformats.org/officeDocument/2006/relationships" r:embed="rId1">
             <a:duotone>
               <a:schemeClr val="phClr">
-                <a:shade val="75000"/>
-                <a:satMod val="105000"/>
+                <a:shade val="90000"/>
+                <a:satMod val="150000"/>
               </a:schemeClr>
               <a:schemeClr val="phClr">
-                <a:tint val="95000"/>
-                <a:satMod val="105000"/>
+                <a:tint val="88000"/>
+                <a:satMod val="150000"/>
               </a:schemeClr>
             </a:duotone>
           </a:blip>
-          <a:tile tx="0" ty="0" sx="38000" sy="38000" flip="none" algn="tl"/>
+          <a:tile tx="0" ty="0" sx="65000" sy="65000" flip="none" algn="tl"/>
         </a:blipFill>
       </a:bgFillStyleLst>
     </a:fmtScheme>

</xml_diff>